<commit_message>
Commit manuscript outline Nov19 2021
</commit_message>
<xml_diff>
--- a/Manuscript/HypothesisFigure/Hypothesis figure.pptx
+++ b/Manuscript/HypothesisFigure/Hypothesis figure.pptx
@@ -5,10 +5,12 @@
     <p:sldMasterId id="2147483672" r:id="rId1"/>
   </p:sldMasterIdLst>
   <p:sldIdLst>
-    <p:sldId id="257" r:id="rId2"/>
-    <p:sldId id="258" r:id="rId3"/>
-    <p:sldId id="259" r:id="rId4"/>
-    <p:sldId id="260" r:id="rId5"/>
+    <p:sldId id="261" r:id="rId2"/>
+    <p:sldId id="262" r:id="rId3"/>
+    <p:sldId id="257" r:id="rId4"/>
+    <p:sldId id="258" r:id="rId5"/>
+    <p:sldId id="259" r:id="rId6"/>
+    <p:sldId id="260" r:id="rId7"/>
   </p:sldIdLst>
   <p:sldSz cx="3060700" cy="3060700"/>
   <p:notesSz cx="6858000" cy="9144000"/>
@@ -108,6 +110,28 @@
     </a:lvl9pPr>
   </p:defaultTextStyle>
   <p:extLst>
+    <p:ext uri="{521415D9-36F7-43E2-AB2F-B90AF26B5E84}">
+      <p14:sectionLst xmlns:p14="http://schemas.microsoft.com/office/powerpoint/2010/main">
+        <p14:section name="New" id="{4886557C-3F54-4BF4-B095-09820EC5E6CD}">
+          <p14:sldIdLst>
+            <p14:sldId id="261"/>
+            <p14:sldId id="262"/>
+          </p14:sldIdLst>
+        </p14:section>
+        <p14:section name="Old" id="{3C6F7185-41D4-412D-AFBA-AC2B28C1CD30}">
+          <p14:sldIdLst>
+            <p14:sldId id="257"/>
+            <p14:sldId id="258"/>
+          </p14:sldIdLst>
+        </p14:section>
+        <p14:section name="Figures for outline" id="{C71342BD-D6CD-43AA-BCF3-0BF4A11CBEA6}">
+          <p14:sldIdLst>
+            <p14:sldId id="259"/>
+            <p14:sldId id="260"/>
+          </p14:sldIdLst>
+        </p14:section>
+      </p14:sectionLst>
+    </p:ext>
     <p:ext uri="{EFAFB233-063F-42B5-8137-9DF3F51BA10A}">
       <p15:sldGuideLst xmlns:p15="http://schemas.microsoft.com/office/powerpoint/2012/main"/>
     </p:ext>
@@ -118,7 +142,7 @@
 <file path=ppt/revisionInfo.xml><?xml version="1.0" encoding="utf-8"?>
 <p1510:revInfo xmlns:a="http://schemas.openxmlformats.org/drawingml/2006/main" xmlns:r="http://schemas.openxmlformats.org/officeDocument/2006/relationships" xmlns:p1510="http://schemas.microsoft.com/office/powerpoint/2015/10/main">
   <p1510:revLst>
-    <p1510:client id="{8CD588F1-FACF-41D5-B468-3A100B5EE959}" v="57" dt="2021-11-19T19:24:25.566"/>
+    <p1510:client id="{8CD588F1-FACF-41D5-B468-3A100B5EE959}" v="83" dt="2021-11-19T21:01:04.993"/>
   </p1510:revLst>
 </p1510:revInfo>
 </file>
@@ -127,8 +151,8 @@
 <pc:chgInfo xmlns:a="http://schemas.openxmlformats.org/drawingml/2006/main" xmlns:r="http://schemas.openxmlformats.org/officeDocument/2006/relationships" xmlns:ac="http://schemas.microsoft.com/office/drawing/2013/main/command" xmlns:pc="http://schemas.microsoft.com/office/powerpoint/2013/main/command">
   <pc:docChgLst>
     <pc:chgData name="Firnaaz Ahamed" userId="354af85a-496a-464c-a30e-ea50a64145d9" providerId="ADAL" clId="{8CD588F1-FACF-41D5-B468-3A100B5EE959}"/>
-    <pc:docChg chg="undo custSel addSld delSld modSld">
-      <pc:chgData name="Firnaaz Ahamed" userId="354af85a-496a-464c-a30e-ea50a64145d9" providerId="ADAL" clId="{8CD588F1-FACF-41D5-B468-3A100B5EE959}" dt="2021-11-19T19:24:25.565" v="678" actId="164"/>
+    <pc:docChg chg="undo custSel addSld delSld modSld addSection modSection">
+      <pc:chgData name="Firnaaz Ahamed" userId="354af85a-496a-464c-a30e-ea50a64145d9" providerId="ADAL" clId="{8CD588F1-FACF-41D5-B468-3A100B5EE959}" dt="2021-11-19T21:01:04.993" v="910"/>
       <pc:docMkLst>
         <pc:docMk/>
       </pc:docMkLst>
@@ -7619,6 +7643,380 @@
             <pc:docMk/>
             <pc:sldMk cId="2861725624" sldId="260"/>
             <ac:cxnSpMk id="136" creationId="{FBB518A7-9CF0-4A83-AE01-2DC0FF3DE476}"/>
+          </ac:cxnSpMkLst>
+        </pc:cxnChg>
+      </pc:sldChg>
+      <pc:sldChg chg="addSp delSp modSp add mod">
+        <pc:chgData name="Firnaaz Ahamed" userId="354af85a-496a-464c-a30e-ea50a64145d9" providerId="ADAL" clId="{8CD588F1-FACF-41D5-B468-3A100B5EE959}" dt="2021-11-19T20:56:28.797" v="907" actId="1076"/>
+        <pc:sldMkLst>
+          <pc:docMk/>
+          <pc:sldMk cId="1731914088" sldId="261"/>
+        </pc:sldMkLst>
+        <pc:spChg chg="del">
+          <ac:chgData name="Firnaaz Ahamed" userId="354af85a-496a-464c-a30e-ea50a64145d9" providerId="ADAL" clId="{8CD588F1-FACF-41D5-B468-3A100B5EE959}" dt="2021-11-19T20:41:19.297" v="685" actId="478"/>
+          <ac:spMkLst>
+            <pc:docMk/>
+            <pc:sldMk cId="1731914088" sldId="261"/>
+            <ac:spMk id="4" creationId="{44003264-D3A6-4796-BC91-D7C0F4135A10}"/>
+          </ac:spMkLst>
+        </pc:spChg>
+        <pc:spChg chg="mod">
+          <ac:chgData name="Firnaaz Ahamed" userId="354af85a-496a-464c-a30e-ea50a64145d9" providerId="ADAL" clId="{8CD588F1-FACF-41D5-B468-3A100B5EE959}" dt="2021-11-19T20:48:45.933" v="727" actId="14100"/>
+          <ac:spMkLst>
+            <pc:docMk/>
+            <pc:sldMk cId="1731914088" sldId="261"/>
+            <ac:spMk id="17" creationId="{F83B2A11-4C38-4506-BDAA-0871D8867DFA}"/>
+          </ac:spMkLst>
+        </pc:spChg>
+        <pc:spChg chg="del">
+          <ac:chgData name="Firnaaz Ahamed" userId="354af85a-496a-464c-a30e-ea50a64145d9" providerId="ADAL" clId="{8CD588F1-FACF-41D5-B468-3A100B5EE959}" dt="2021-11-19T20:46:37.114" v="691" actId="478"/>
+          <ac:spMkLst>
+            <pc:docMk/>
+            <pc:sldMk cId="1731914088" sldId="261"/>
+            <ac:spMk id="47" creationId="{BCF00FD3-4931-4A4A-8390-CF982706A671}"/>
+          </ac:spMkLst>
+        </pc:spChg>
+        <pc:spChg chg="add mod">
+          <ac:chgData name="Firnaaz Ahamed" userId="354af85a-496a-464c-a30e-ea50a64145d9" providerId="ADAL" clId="{8CD588F1-FACF-41D5-B468-3A100B5EE959}" dt="2021-11-19T20:56:22.691" v="906" actId="164"/>
+          <ac:spMkLst>
+            <pc:docMk/>
+            <pc:sldMk cId="1731914088" sldId="261"/>
+            <ac:spMk id="95" creationId="{7CB7B696-DABC-499F-8BBF-B10BE41F5D46}"/>
+          </ac:spMkLst>
+        </pc:spChg>
+        <pc:spChg chg="add mod">
+          <ac:chgData name="Firnaaz Ahamed" userId="354af85a-496a-464c-a30e-ea50a64145d9" providerId="ADAL" clId="{8CD588F1-FACF-41D5-B468-3A100B5EE959}" dt="2021-11-19T20:56:22.691" v="906" actId="164"/>
+          <ac:spMkLst>
+            <pc:docMk/>
+            <pc:sldMk cId="1731914088" sldId="261"/>
+            <ac:spMk id="96" creationId="{8431D85C-7999-41E1-B680-2D9568C88614}"/>
+          </ac:spMkLst>
+        </pc:spChg>
+        <pc:spChg chg="add mod">
+          <ac:chgData name="Firnaaz Ahamed" userId="354af85a-496a-464c-a30e-ea50a64145d9" providerId="ADAL" clId="{8CD588F1-FACF-41D5-B468-3A100B5EE959}" dt="2021-11-19T20:56:22.691" v="906" actId="164"/>
+          <ac:spMkLst>
+            <pc:docMk/>
+            <pc:sldMk cId="1731914088" sldId="261"/>
+            <ac:spMk id="119" creationId="{CBD9BC47-DD22-4B58-9F6D-9C53E156AFDD}"/>
+          </ac:spMkLst>
+        </pc:spChg>
+        <pc:spChg chg="mod">
+          <ac:chgData name="Firnaaz Ahamed" userId="354af85a-496a-464c-a30e-ea50a64145d9" providerId="ADAL" clId="{8CD588F1-FACF-41D5-B468-3A100B5EE959}" dt="2021-11-19T20:48:56.457" v="730" actId="114"/>
+          <ac:spMkLst>
+            <pc:docMk/>
+            <pc:sldMk cId="1731914088" sldId="261"/>
+            <ac:spMk id="332" creationId="{C63F1F8D-DCC2-4E20-AE2B-5325577236C6}"/>
+          </ac:spMkLst>
+        </pc:spChg>
+        <pc:spChg chg="mod">
+          <ac:chgData name="Firnaaz Ahamed" userId="354af85a-496a-464c-a30e-ea50a64145d9" providerId="ADAL" clId="{8CD588F1-FACF-41D5-B468-3A100B5EE959}" dt="2021-11-19T20:48:26.009" v="721" actId="114"/>
+          <ac:spMkLst>
+            <pc:docMk/>
+            <pc:sldMk cId="1731914088" sldId="261"/>
+            <ac:spMk id="334" creationId="{79890705-6EE6-45A7-85D5-F651E3BCEE97}"/>
+          </ac:spMkLst>
+        </pc:spChg>
+        <pc:spChg chg="mod">
+          <ac:chgData name="Firnaaz Ahamed" userId="354af85a-496a-464c-a30e-ea50a64145d9" providerId="ADAL" clId="{8CD588F1-FACF-41D5-B468-3A100B5EE959}" dt="2021-11-19T20:48:48.187" v="728" actId="1076"/>
+          <ac:spMkLst>
+            <pc:docMk/>
+            <pc:sldMk cId="1731914088" sldId="261"/>
+            <ac:spMk id="335" creationId="{F4651F4D-3AB3-4AF9-ABE6-39E2BEE15F6B}"/>
+          </ac:spMkLst>
+        </pc:spChg>
+        <pc:spChg chg="del">
+          <ac:chgData name="Firnaaz Ahamed" userId="354af85a-496a-464c-a30e-ea50a64145d9" providerId="ADAL" clId="{8CD588F1-FACF-41D5-B468-3A100B5EE959}" dt="2021-11-19T20:46:19.270" v="687" actId="478"/>
+          <ac:spMkLst>
+            <pc:docMk/>
+            <pc:sldMk cId="1731914088" sldId="261"/>
+            <ac:spMk id="337" creationId="{2C11AFF9-47C2-453A-AAE2-7F1BE41A7789}"/>
+          </ac:spMkLst>
+        </pc:spChg>
+        <pc:spChg chg="mod">
+          <ac:chgData name="Firnaaz Ahamed" userId="354af85a-496a-464c-a30e-ea50a64145d9" providerId="ADAL" clId="{8CD588F1-FACF-41D5-B468-3A100B5EE959}" dt="2021-11-19T20:49:20.215" v="738" actId="1076"/>
+          <ac:spMkLst>
+            <pc:docMk/>
+            <pc:sldMk cId="1731914088" sldId="261"/>
+            <ac:spMk id="338" creationId="{66C77E62-98C3-4BE8-9D88-16BE5F1B7442}"/>
+          </ac:spMkLst>
+        </pc:spChg>
+        <pc:spChg chg="mod">
+          <ac:chgData name="Firnaaz Ahamed" userId="354af85a-496a-464c-a30e-ea50a64145d9" providerId="ADAL" clId="{8CD588F1-FACF-41D5-B468-3A100B5EE959}" dt="2021-11-19T20:49:39.135" v="743" actId="1076"/>
+          <ac:spMkLst>
+            <pc:docMk/>
+            <pc:sldMk cId="1731914088" sldId="261"/>
+            <ac:spMk id="339" creationId="{9E9A6C43-8B35-45EB-8296-A3DE9F6462E0}"/>
+          </ac:spMkLst>
+        </pc:spChg>
+        <pc:spChg chg="mod">
+          <ac:chgData name="Firnaaz Ahamed" userId="354af85a-496a-464c-a30e-ea50a64145d9" providerId="ADAL" clId="{8CD588F1-FACF-41D5-B468-3A100B5EE959}" dt="2021-11-19T20:50:07.930" v="750" actId="1076"/>
+          <ac:spMkLst>
+            <pc:docMk/>
+            <pc:sldMk cId="1731914088" sldId="261"/>
+            <ac:spMk id="345" creationId="{A581DDD7-B073-4C27-A6F8-9C79FD9F10FD}"/>
+          </ac:spMkLst>
+        </pc:spChg>
+        <pc:spChg chg="mod">
+          <ac:chgData name="Firnaaz Ahamed" userId="354af85a-496a-464c-a30e-ea50a64145d9" providerId="ADAL" clId="{8CD588F1-FACF-41D5-B468-3A100B5EE959}" dt="2021-11-19T20:50:32.583" v="756" actId="1076"/>
+          <ac:spMkLst>
+            <pc:docMk/>
+            <pc:sldMk cId="1731914088" sldId="261"/>
+            <ac:spMk id="346" creationId="{0736E469-6E0C-4647-8F03-B6BFFBFC39D2}"/>
+          </ac:spMkLst>
+        </pc:spChg>
+        <pc:spChg chg="del">
+          <ac:chgData name="Firnaaz Ahamed" userId="354af85a-496a-464c-a30e-ea50a64145d9" providerId="ADAL" clId="{8CD588F1-FACF-41D5-B468-3A100B5EE959}" dt="2021-11-19T20:56:12.501" v="905" actId="478"/>
+          <ac:spMkLst>
+            <pc:docMk/>
+            <pc:sldMk cId="1731914088" sldId="261"/>
+            <ac:spMk id="390" creationId="{066056E7-37F8-4DCE-81C2-05F820FA273A}"/>
+          </ac:spMkLst>
+        </pc:spChg>
+        <pc:spChg chg="mod">
+          <ac:chgData name="Firnaaz Ahamed" userId="354af85a-496a-464c-a30e-ea50a64145d9" providerId="ADAL" clId="{8CD588F1-FACF-41D5-B468-3A100B5EE959}" dt="2021-11-19T20:49:48.459" v="745" actId="1076"/>
+          <ac:spMkLst>
+            <pc:docMk/>
+            <pc:sldMk cId="1731914088" sldId="261"/>
+            <ac:spMk id="408" creationId="{D855E67D-5817-4B5C-B27E-89953D7EEBA2}"/>
+          </ac:spMkLst>
+        </pc:spChg>
+        <pc:spChg chg="del">
+          <ac:chgData name="Firnaaz Ahamed" userId="354af85a-496a-464c-a30e-ea50a64145d9" providerId="ADAL" clId="{8CD588F1-FACF-41D5-B468-3A100B5EE959}" dt="2021-11-19T20:46:18.436" v="686" actId="478"/>
+          <ac:spMkLst>
+            <pc:docMk/>
+            <pc:sldMk cId="1731914088" sldId="261"/>
+            <ac:spMk id="453" creationId="{903B9B44-C3D4-4AC7-A894-42FD2C01FB8A}"/>
+          </ac:spMkLst>
+        </pc:spChg>
+        <pc:spChg chg="del">
+          <ac:chgData name="Firnaaz Ahamed" userId="354af85a-496a-464c-a30e-ea50a64145d9" providerId="ADAL" clId="{8CD588F1-FACF-41D5-B468-3A100B5EE959}" dt="2021-11-19T20:46:37.892" v="692" actId="478"/>
+          <ac:spMkLst>
+            <pc:docMk/>
+            <pc:sldMk cId="1731914088" sldId="261"/>
+            <ac:spMk id="456" creationId="{31ACE671-6983-4E06-B142-062651ABD9B6}"/>
+          </ac:spMkLst>
+        </pc:spChg>
+        <pc:spChg chg="del mod">
+          <ac:chgData name="Firnaaz Ahamed" userId="354af85a-496a-464c-a30e-ea50a64145d9" providerId="ADAL" clId="{8CD588F1-FACF-41D5-B468-3A100B5EE959}" dt="2021-11-19T20:46:56.676" v="698" actId="478"/>
+          <ac:spMkLst>
+            <pc:docMk/>
+            <pc:sldMk cId="1731914088" sldId="261"/>
+            <ac:spMk id="464" creationId="{B3EC522F-FBEA-4451-AE10-2D404037A1B5}"/>
+          </ac:spMkLst>
+        </pc:spChg>
+        <pc:spChg chg="del">
+          <ac:chgData name="Firnaaz Ahamed" userId="354af85a-496a-464c-a30e-ea50a64145d9" providerId="ADAL" clId="{8CD588F1-FACF-41D5-B468-3A100B5EE959}" dt="2021-11-19T20:52:24.304" v="838" actId="478"/>
+          <ac:spMkLst>
+            <pc:docMk/>
+            <pc:sldMk cId="1731914088" sldId="261"/>
+            <ac:spMk id="471" creationId="{0A798509-E113-4025-A540-80036EDF895A}"/>
+          </ac:spMkLst>
+        </pc:spChg>
+        <pc:spChg chg="mod">
+          <ac:chgData name="Firnaaz Ahamed" userId="354af85a-496a-464c-a30e-ea50a64145d9" providerId="ADAL" clId="{8CD588F1-FACF-41D5-B468-3A100B5EE959}" dt="2021-11-19T20:50:24.991" v="753" actId="14100"/>
+          <ac:spMkLst>
+            <pc:docMk/>
+            <pc:sldMk cId="1731914088" sldId="261"/>
+            <ac:spMk id="475" creationId="{E719F99C-CAEC-4269-9F6B-61B061B7B40D}"/>
+          </ac:spMkLst>
+        </pc:spChg>
+        <pc:spChg chg="del topLvl">
+          <ac:chgData name="Firnaaz Ahamed" userId="354af85a-496a-464c-a30e-ea50a64145d9" providerId="ADAL" clId="{8CD588F1-FACF-41D5-B468-3A100B5EE959}" dt="2021-11-19T20:47:01.618" v="700" actId="478"/>
+          <ac:spMkLst>
+            <pc:docMk/>
+            <pc:sldMk cId="1731914088" sldId="261"/>
+            <ac:spMk id="497" creationId="{40D80CC8-4DD8-4055-8884-A09895841F60}"/>
+          </ac:spMkLst>
+        </pc:spChg>
+        <pc:grpChg chg="mod">
+          <ac:chgData name="Firnaaz Ahamed" userId="354af85a-496a-464c-a30e-ea50a64145d9" providerId="ADAL" clId="{8CD588F1-FACF-41D5-B468-3A100B5EE959}" dt="2021-11-19T20:56:22.691" v="906" actId="164"/>
+          <ac:grpSpMkLst>
+            <pc:docMk/>
+            <pc:sldMk cId="1731914088" sldId="261"/>
+            <ac:grpSpMk id="28" creationId="{3BCA9BD0-C81E-4971-8C75-82A8FFA31F9C}"/>
+          </ac:grpSpMkLst>
+        </pc:grpChg>
+        <pc:grpChg chg="mod">
+          <ac:chgData name="Firnaaz Ahamed" userId="354af85a-496a-464c-a30e-ea50a64145d9" providerId="ADAL" clId="{8CD588F1-FACF-41D5-B468-3A100B5EE959}" dt="2021-11-19T20:56:22.691" v="906" actId="164"/>
+          <ac:grpSpMkLst>
+            <pc:docMk/>
+            <pc:sldMk cId="1731914088" sldId="261"/>
+            <ac:grpSpMk id="34" creationId="{6E4C3CC8-2249-40EE-89FE-33BD613D4F11}"/>
+          </ac:grpSpMkLst>
+        </pc:grpChg>
+        <pc:grpChg chg="add mod">
+          <ac:chgData name="Firnaaz Ahamed" userId="354af85a-496a-464c-a30e-ea50a64145d9" providerId="ADAL" clId="{8CD588F1-FACF-41D5-B468-3A100B5EE959}" dt="2021-11-19T20:56:28.797" v="907" actId="1076"/>
+          <ac:grpSpMkLst>
+            <pc:docMk/>
+            <pc:sldMk cId="1731914088" sldId="261"/>
+            <ac:grpSpMk id="39" creationId="{0F3D7477-0414-4496-9ADB-066F9883C25B}"/>
+          </ac:grpSpMkLst>
+        </pc:grpChg>
+        <pc:grpChg chg="mod">
+          <ac:chgData name="Firnaaz Ahamed" userId="354af85a-496a-464c-a30e-ea50a64145d9" providerId="ADAL" clId="{8CD588F1-FACF-41D5-B468-3A100B5EE959}" dt="2021-11-19T20:56:22.691" v="906" actId="164"/>
+          <ac:grpSpMkLst>
+            <pc:docMk/>
+            <pc:sldMk cId="1731914088" sldId="261"/>
+            <ac:grpSpMk id="48" creationId="{1199C9EE-D42A-454A-96A9-6D3041C3AFDB}"/>
+          </ac:grpSpMkLst>
+        </pc:grpChg>
+        <pc:grpChg chg="mod topLvl">
+          <ac:chgData name="Firnaaz Ahamed" userId="354af85a-496a-464c-a30e-ea50a64145d9" providerId="ADAL" clId="{8CD588F1-FACF-41D5-B468-3A100B5EE959}" dt="2021-11-19T20:56:22.691" v="906" actId="164"/>
+          <ac:grpSpMkLst>
+            <pc:docMk/>
+            <pc:sldMk cId="1731914088" sldId="261"/>
+            <ac:grpSpMk id="455" creationId="{246497D9-05FC-4927-BBB0-DC4BB211DDEF}"/>
+          </ac:grpSpMkLst>
+        </pc:grpChg>
+        <pc:grpChg chg="del">
+          <ac:chgData name="Firnaaz Ahamed" userId="354af85a-496a-464c-a30e-ea50a64145d9" providerId="ADAL" clId="{8CD588F1-FACF-41D5-B468-3A100B5EE959}" dt="2021-11-19T20:47:01.618" v="700" actId="478"/>
+          <ac:grpSpMkLst>
+            <pc:docMk/>
+            <pc:sldMk cId="1731914088" sldId="261"/>
+            <ac:grpSpMk id="458" creationId="{E872025C-6592-4676-AC52-AF5251B10B11}"/>
+          </ac:grpSpMkLst>
+        </pc:grpChg>
+        <pc:grpChg chg="del">
+          <ac:chgData name="Firnaaz Ahamed" userId="354af85a-496a-464c-a30e-ea50a64145d9" providerId="ADAL" clId="{8CD588F1-FACF-41D5-B468-3A100B5EE959}" dt="2021-11-19T20:46:38.664" v="693" actId="478"/>
+          <ac:grpSpMkLst>
+            <pc:docMk/>
+            <pc:sldMk cId="1731914088" sldId="261"/>
+            <ac:grpSpMk id="460" creationId="{4157406A-8930-4CBB-9F11-F0A74AFD4AA7}"/>
+          </ac:grpSpMkLst>
+        </pc:grpChg>
+        <pc:grpChg chg="del">
+          <ac:chgData name="Firnaaz Ahamed" userId="354af85a-496a-464c-a30e-ea50a64145d9" providerId="ADAL" clId="{8CD588F1-FACF-41D5-B468-3A100B5EE959}" dt="2021-11-19T20:52:24.304" v="838" actId="478"/>
+          <ac:grpSpMkLst>
+            <pc:docMk/>
+            <pc:sldMk cId="1731914088" sldId="261"/>
+            <ac:grpSpMk id="469" creationId="{013ACD37-8AA7-4182-95FC-72AE68023471}"/>
+          </ac:grpSpMkLst>
+        </pc:grpChg>
+        <pc:cxnChg chg="add mod">
+          <ac:chgData name="Firnaaz Ahamed" userId="354af85a-496a-464c-a30e-ea50a64145d9" providerId="ADAL" clId="{8CD588F1-FACF-41D5-B468-3A100B5EE959}" dt="2021-11-19T20:56:22.691" v="906" actId="164"/>
+          <ac:cxnSpMkLst>
+            <pc:docMk/>
+            <pc:sldMk cId="1731914088" sldId="261"/>
+            <ac:cxnSpMk id="6" creationId="{6B011C6F-0CD1-427F-856D-03FD6037B3DB}"/>
+          </ac:cxnSpMkLst>
+        </pc:cxnChg>
+        <pc:cxnChg chg="add mod">
+          <ac:chgData name="Firnaaz Ahamed" userId="354af85a-496a-464c-a30e-ea50a64145d9" providerId="ADAL" clId="{8CD588F1-FACF-41D5-B468-3A100B5EE959}" dt="2021-11-19T20:56:22.691" v="906" actId="164"/>
+          <ac:cxnSpMkLst>
+            <pc:docMk/>
+            <pc:sldMk cId="1731914088" sldId="261"/>
+            <ac:cxnSpMk id="13" creationId="{C6485855-3D61-4CEA-A0FF-17574A9C84B4}"/>
+          </ac:cxnSpMkLst>
+        </pc:cxnChg>
+        <pc:cxnChg chg="del mod">
+          <ac:chgData name="Firnaaz Ahamed" userId="354af85a-496a-464c-a30e-ea50a64145d9" providerId="ADAL" clId="{8CD588F1-FACF-41D5-B468-3A100B5EE959}" dt="2021-11-19T20:46:57.576" v="699" actId="478"/>
+          <ac:cxnSpMkLst>
+            <pc:docMk/>
+            <pc:sldMk cId="1731914088" sldId="261"/>
+            <ac:cxnSpMk id="52" creationId="{1E6813EE-45A4-43A5-8A83-76A984363AF8}"/>
+          </ac:cxnSpMkLst>
+        </pc:cxnChg>
+        <pc:cxnChg chg="del">
+          <ac:chgData name="Firnaaz Ahamed" userId="354af85a-496a-464c-a30e-ea50a64145d9" providerId="ADAL" clId="{8CD588F1-FACF-41D5-B468-3A100B5EE959}" dt="2021-11-19T20:52:32.728" v="841" actId="478"/>
+          <ac:cxnSpMkLst>
+            <pc:docMk/>
+            <pc:sldMk cId="1731914088" sldId="261"/>
+            <ac:cxnSpMk id="59" creationId="{8DAF043E-4901-427F-950F-622BBDB0504D}"/>
+          </ac:cxnSpMkLst>
+        </pc:cxnChg>
+        <pc:cxnChg chg="add mod">
+          <ac:chgData name="Firnaaz Ahamed" userId="354af85a-496a-464c-a30e-ea50a64145d9" providerId="ADAL" clId="{8CD588F1-FACF-41D5-B468-3A100B5EE959}" dt="2021-11-19T20:56:22.691" v="906" actId="164"/>
+          <ac:cxnSpMkLst>
+            <pc:docMk/>
+            <pc:sldMk cId="1731914088" sldId="261"/>
+            <ac:cxnSpMk id="91" creationId="{7956D468-02D5-4FA0-928D-03F0D6BB102F}"/>
+          </ac:cxnSpMkLst>
+        </pc:cxnChg>
+        <pc:cxnChg chg="add mod">
+          <ac:chgData name="Firnaaz Ahamed" userId="354af85a-496a-464c-a30e-ea50a64145d9" providerId="ADAL" clId="{8CD588F1-FACF-41D5-B468-3A100B5EE959}" dt="2021-11-19T20:56:22.691" v="906" actId="164"/>
+          <ac:cxnSpMkLst>
+            <pc:docMk/>
+            <pc:sldMk cId="1731914088" sldId="261"/>
+            <ac:cxnSpMk id="94" creationId="{C9A329E5-45A1-401B-BE17-ADB03718EA2E}"/>
+          </ac:cxnSpMkLst>
+        </pc:cxnChg>
+        <pc:cxnChg chg="add del mod">
+          <ac:chgData name="Firnaaz Ahamed" userId="354af85a-496a-464c-a30e-ea50a64145d9" providerId="ADAL" clId="{8CD588F1-FACF-41D5-B468-3A100B5EE959}" dt="2021-11-19T20:54:54.909" v="862" actId="478"/>
+          <ac:cxnSpMkLst>
+            <pc:docMk/>
+            <pc:sldMk cId="1731914088" sldId="261"/>
+            <ac:cxnSpMk id="109" creationId="{FF5B9A11-0581-447A-AAE3-88DF25AA1DBB}"/>
+          </ac:cxnSpMkLst>
+        </pc:cxnChg>
+        <pc:cxnChg chg="add mod">
+          <ac:chgData name="Firnaaz Ahamed" userId="354af85a-496a-464c-a30e-ea50a64145d9" providerId="ADAL" clId="{8CD588F1-FACF-41D5-B468-3A100B5EE959}" dt="2021-11-19T20:56:22.691" v="906" actId="164"/>
+          <ac:cxnSpMkLst>
+            <pc:docMk/>
+            <pc:sldMk cId="1731914088" sldId="261"/>
+            <ac:cxnSpMk id="115" creationId="{464C995C-707E-4C63-8E74-F25F39B7295F}"/>
+          </ac:cxnSpMkLst>
+        </pc:cxnChg>
+        <pc:cxnChg chg="del">
+          <ac:chgData name="Firnaaz Ahamed" userId="354af85a-496a-464c-a30e-ea50a64145d9" providerId="ADAL" clId="{8CD588F1-FACF-41D5-B468-3A100B5EE959}" dt="2021-11-19T20:52:29.684" v="839" actId="478"/>
+          <ac:cxnSpMkLst>
+            <pc:docMk/>
+            <pc:sldMk cId="1731914088" sldId="261"/>
+            <ac:cxnSpMk id="491" creationId="{AC296707-0798-4109-B560-3E4774E3E6AB}"/>
+          </ac:cxnSpMkLst>
+        </pc:cxnChg>
+        <pc:cxnChg chg="del">
+          <ac:chgData name="Firnaaz Ahamed" userId="354af85a-496a-464c-a30e-ea50a64145d9" providerId="ADAL" clId="{8CD588F1-FACF-41D5-B468-3A100B5EE959}" dt="2021-11-19T20:52:31.371" v="840" actId="478"/>
+          <ac:cxnSpMkLst>
+            <pc:docMk/>
+            <pc:sldMk cId="1731914088" sldId="261"/>
+            <ac:cxnSpMk id="492" creationId="{EC961151-3ED9-49DD-8976-2562630FC94A}"/>
+          </ac:cxnSpMkLst>
+        </pc:cxnChg>
+      </pc:sldChg>
+      <pc:sldChg chg="addSp delSp modSp add mod">
+        <pc:chgData name="Firnaaz Ahamed" userId="354af85a-496a-464c-a30e-ea50a64145d9" providerId="ADAL" clId="{8CD588F1-FACF-41D5-B468-3A100B5EE959}" dt="2021-11-19T21:01:04.993" v="910"/>
+        <pc:sldMkLst>
+          <pc:docMk/>
+          <pc:sldMk cId="2408328518" sldId="262"/>
+        </pc:sldMkLst>
+        <pc:grpChg chg="del">
+          <ac:chgData name="Firnaaz Ahamed" userId="354af85a-496a-464c-a30e-ea50a64145d9" providerId="ADAL" clId="{8CD588F1-FACF-41D5-B468-3A100B5EE959}" dt="2021-11-19T21:00:19.119" v="909" actId="478"/>
+          <ac:grpSpMkLst>
+            <pc:docMk/>
+            <pc:sldMk cId="2408328518" sldId="262"/>
+            <ac:grpSpMk id="39" creationId="{0F3D7477-0414-4496-9ADB-066F9883C25B}"/>
+          </ac:grpSpMkLst>
+        </pc:grpChg>
+        <pc:picChg chg="add mod">
+          <ac:chgData name="Firnaaz Ahamed" userId="354af85a-496a-464c-a30e-ea50a64145d9" providerId="ADAL" clId="{8CD588F1-FACF-41D5-B468-3A100B5EE959}" dt="2021-11-19T21:01:04.993" v="910"/>
+          <ac:picMkLst>
+            <pc:docMk/>
+            <pc:sldMk cId="2408328518" sldId="262"/>
+            <ac:picMk id="3" creationId="{F403DEA9-E5E5-4BBD-A7C8-85146474615E}"/>
+          </ac:picMkLst>
+        </pc:picChg>
+        <pc:cxnChg chg="mod">
+          <ac:chgData name="Firnaaz Ahamed" userId="354af85a-496a-464c-a30e-ea50a64145d9" providerId="ADAL" clId="{8CD588F1-FACF-41D5-B468-3A100B5EE959}" dt="2021-11-19T21:00:19.119" v="909" actId="478"/>
+          <ac:cxnSpMkLst>
+            <pc:docMk/>
+            <pc:sldMk cId="2408328518" sldId="262"/>
+            <ac:cxnSpMk id="6" creationId="{6B011C6F-0CD1-427F-856D-03FD6037B3DB}"/>
+          </ac:cxnSpMkLst>
+        </pc:cxnChg>
+        <pc:cxnChg chg="mod">
+          <ac:chgData name="Firnaaz Ahamed" userId="354af85a-496a-464c-a30e-ea50a64145d9" providerId="ADAL" clId="{8CD588F1-FACF-41D5-B468-3A100B5EE959}" dt="2021-11-19T21:00:19.119" v="909" actId="478"/>
+          <ac:cxnSpMkLst>
+            <pc:docMk/>
+            <pc:sldMk cId="2408328518" sldId="262"/>
+            <ac:cxnSpMk id="13" creationId="{C6485855-3D61-4CEA-A0FF-17574A9C84B4}"/>
+          </ac:cxnSpMkLst>
+        </pc:cxnChg>
+        <pc:cxnChg chg="mod">
+          <ac:chgData name="Firnaaz Ahamed" userId="354af85a-496a-464c-a30e-ea50a64145d9" providerId="ADAL" clId="{8CD588F1-FACF-41D5-B468-3A100B5EE959}" dt="2021-11-19T21:00:19.119" v="909" actId="478"/>
+          <ac:cxnSpMkLst>
+            <pc:docMk/>
+            <pc:sldMk cId="2408328518" sldId="262"/>
+            <ac:cxnSpMk id="115" creationId="{464C995C-707E-4C63-8E74-F25F39B7295F}"/>
           </ac:cxnSpMkLst>
         </pc:cxnChg>
       </pc:sldChg>
@@ -13595,6 +13993,4153 @@
 </file>
 
 <file path=ppt/slides/slide1.xml><?xml version="1.0" encoding="utf-8"?>
+<p:sld xmlns:a="http://schemas.openxmlformats.org/drawingml/2006/main" xmlns:r="http://schemas.openxmlformats.org/officeDocument/2006/relationships" xmlns:p="http://schemas.openxmlformats.org/presentationml/2006/main">
+  <p:cSld>
+    <p:spTree>
+      <p:nvGrpSpPr>
+        <p:cNvPr id="1" name=""/>
+        <p:cNvGrpSpPr/>
+        <p:nvPr/>
+      </p:nvGrpSpPr>
+      <p:grpSpPr>
+        <a:xfrm>
+          <a:off x="0" y="0"/>
+          <a:ext cx="0" cy="0"/>
+          <a:chOff x="0" y="0"/>
+          <a:chExt cx="0" cy="0"/>
+        </a:xfrm>
+      </p:grpSpPr>
+      <p:grpSp>
+        <p:nvGrpSpPr>
+          <p:cNvPr id="39" name="Group 38">
+            <a:extLst>
+              <a:ext uri="{FF2B5EF4-FFF2-40B4-BE49-F238E27FC236}">
+                <a16:creationId xmlns:a16="http://schemas.microsoft.com/office/drawing/2014/main" id="{0F3D7477-0414-4496-9ADB-066F9883C25B}"/>
+              </a:ext>
+            </a:extLst>
+          </p:cNvPr>
+          <p:cNvGrpSpPr/>
+          <p:nvPr/>
+        </p:nvGrpSpPr>
+        <p:grpSpPr>
+          <a:xfrm>
+            <a:off x="27472" y="284032"/>
+            <a:ext cx="3005756" cy="2492635"/>
+            <a:chOff x="-81541" y="290231"/>
+            <a:chExt cx="3005756" cy="2492635"/>
+          </a:xfrm>
+        </p:grpSpPr>
+        <p:grpSp>
+          <p:nvGrpSpPr>
+            <p:cNvPr id="34" name="Group 33">
+              <a:extLst>
+                <a:ext uri="{FF2B5EF4-FFF2-40B4-BE49-F238E27FC236}">
+                  <a16:creationId xmlns:a16="http://schemas.microsoft.com/office/drawing/2014/main" id="{6E4C3CC8-2249-40EE-89FE-33BD613D4F11}"/>
+                </a:ext>
+              </a:extLst>
+            </p:cNvPr>
+            <p:cNvGrpSpPr/>
+            <p:nvPr/>
+          </p:nvGrpSpPr>
+          <p:grpSpPr>
+            <a:xfrm>
+              <a:off x="-81541" y="290231"/>
+              <a:ext cx="1616755" cy="588256"/>
+              <a:chOff x="-300398" y="405062"/>
+              <a:chExt cx="1616755" cy="588256"/>
+            </a:xfrm>
+          </p:grpSpPr>
+          <p:sp>
+            <p:nvSpPr>
+              <p:cNvPr id="15" name="Oval 14">
+                <a:extLst>
+                  <a:ext uri="{FF2B5EF4-FFF2-40B4-BE49-F238E27FC236}">
+                    <a16:creationId xmlns:a16="http://schemas.microsoft.com/office/drawing/2014/main" id="{DAB7B647-D7C0-4E95-9EB6-D4F63F9CB540}"/>
+                  </a:ext>
+                </a:extLst>
+              </p:cNvPr>
+              <p:cNvSpPr/>
+              <p:nvPr/>
+            </p:nvSpPr>
+            <p:spPr>
+              <a:xfrm>
+                <a:off x="252663" y="405062"/>
+                <a:ext cx="413084" cy="401053"/>
+              </a:xfrm>
+              <a:prstGeom prst="ellipse">
+                <a:avLst/>
+              </a:prstGeom>
+              <a:solidFill>
+                <a:srgbClr val="00B0F0"/>
+              </a:solidFill>
+              <a:ln>
+                <a:noFill/>
+              </a:ln>
+            </p:spPr>
+            <p:style>
+              <a:lnRef idx="2">
+                <a:schemeClr val="accent1">
+                  <a:shade val="50000"/>
+                </a:schemeClr>
+              </a:lnRef>
+              <a:fillRef idx="1">
+                <a:schemeClr val="accent1"/>
+              </a:fillRef>
+              <a:effectRef idx="0">
+                <a:schemeClr val="accent1"/>
+              </a:effectRef>
+              <a:fontRef idx="minor">
+                <a:schemeClr val="lt1"/>
+              </a:fontRef>
+            </p:style>
+            <p:txBody>
+              <a:bodyPr rtlCol="0" anchor="ctr"/>
+              <a:lstStyle/>
+              <a:p>
+                <a:pPr algn="ctr"/>
+                <a:endParaRPr lang="en-MY"/>
+              </a:p>
+            </p:txBody>
+          </p:sp>
+          <p:sp>
+            <p:nvSpPr>
+              <p:cNvPr id="16" name="TextBox 15">
+                <a:extLst>
+                  <a:ext uri="{FF2B5EF4-FFF2-40B4-BE49-F238E27FC236}">
+                    <a16:creationId xmlns:a16="http://schemas.microsoft.com/office/drawing/2014/main" id="{AC5AF798-6FD6-4E26-9E34-DD5CC8776914}"/>
+                  </a:ext>
+                </a:extLst>
+              </p:cNvPr>
+              <p:cNvSpPr txBox="1"/>
+              <p:nvPr/>
+            </p:nvSpPr>
+            <p:spPr>
+              <a:xfrm>
+                <a:off x="283208" y="405062"/>
+                <a:ext cx="332210" cy="184666"/>
+              </a:xfrm>
+              <a:prstGeom prst="rect">
+                <a:avLst/>
+              </a:prstGeom>
+              <a:noFill/>
+            </p:spPr>
+            <p:txBody>
+              <a:bodyPr wrap="square" rtlCol="0">
+                <a:spAutoFit/>
+              </a:bodyPr>
+              <a:lstStyle/>
+              <a:p>
+                <a:r>
+                  <a:rPr lang="en-US" sz="600" dirty="0">
+                    <a:solidFill>
+                      <a:schemeClr val="bg1"/>
+                    </a:solidFill>
+                  </a:rPr>
+                  <a:t>OM</a:t>
+                </a:r>
+                <a:r>
+                  <a:rPr lang="en-US" sz="600" baseline="-25000" dirty="0">
+                    <a:solidFill>
+                      <a:schemeClr val="bg1"/>
+                    </a:solidFill>
+                  </a:rPr>
+                  <a:t>1</a:t>
+                </a:r>
+                <a:endParaRPr lang="en-MY" sz="600" baseline="-25000" dirty="0">
+                  <a:solidFill>
+                    <a:schemeClr val="bg1"/>
+                  </a:solidFill>
+                </a:endParaRPr>
+              </a:p>
+            </p:txBody>
+          </p:sp>
+          <p:sp>
+            <p:nvSpPr>
+              <p:cNvPr id="332" name="TextBox 331">
+                <a:extLst>
+                  <a:ext uri="{FF2B5EF4-FFF2-40B4-BE49-F238E27FC236}">
+                    <a16:creationId xmlns:a16="http://schemas.microsoft.com/office/drawing/2014/main" id="{C63F1F8D-DCC2-4E20-AE2B-5325577236C6}"/>
+                  </a:ext>
+                </a:extLst>
+              </p:cNvPr>
+              <p:cNvSpPr txBox="1"/>
+              <p:nvPr/>
+            </p:nvSpPr>
+            <p:spPr>
+              <a:xfrm>
+                <a:off x="209716" y="522518"/>
+                <a:ext cx="332210" cy="184666"/>
+              </a:xfrm>
+              <a:prstGeom prst="rect">
+                <a:avLst/>
+              </a:prstGeom>
+              <a:noFill/>
+            </p:spPr>
+            <p:txBody>
+              <a:bodyPr wrap="square" rtlCol="0">
+                <a:spAutoFit/>
+              </a:bodyPr>
+              <a:lstStyle/>
+              <a:p>
+                <a:r>
+                  <a:rPr lang="en-US" sz="600" dirty="0" err="1">
+                    <a:solidFill>
+                      <a:schemeClr val="bg1"/>
+                    </a:solidFill>
+                  </a:rPr>
+                  <a:t>OM</a:t>
+                </a:r>
+                <a:r>
+                  <a:rPr lang="en-US" sz="600" i="1" baseline="-25000" dirty="0" err="1">
+                    <a:solidFill>
+                      <a:schemeClr val="bg1"/>
+                    </a:solidFill>
+                  </a:rPr>
+                  <a:t>i</a:t>
+                </a:r>
+                <a:endParaRPr lang="en-MY" sz="600" i="1" baseline="-25000" dirty="0">
+                  <a:solidFill>
+                    <a:schemeClr val="bg1"/>
+                  </a:solidFill>
+                </a:endParaRPr>
+              </a:p>
+            </p:txBody>
+          </p:sp>
+          <p:sp>
+            <p:nvSpPr>
+              <p:cNvPr id="333" name="TextBox 332">
+                <a:extLst>
+                  <a:ext uri="{FF2B5EF4-FFF2-40B4-BE49-F238E27FC236}">
+                    <a16:creationId xmlns:a16="http://schemas.microsoft.com/office/drawing/2014/main" id="{C29B9659-B4A4-4C31-9758-239162C9B8DE}"/>
+                  </a:ext>
+                </a:extLst>
+              </p:cNvPr>
+              <p:cNvSpPr txBox="1"/>
+              <p:nvPr/>
+            </p:nvSpPr>
+            <p:spPr>
+              <a:xfrm>
+                <a:off x="324318" y="621449"/>
+                <a:ext cx="332210" cy="184666"/>
+              </a:xfrm>
+              <a:prstGeom prst="rect">
+                <a:avLst/>
+              </a:prstGeom>
+              <a:noFill/>
+            </p:spPr>
+            <p:txBody>
+              <a:bodyPr wrap="square" rtlCol="0">
+                <a:spAutoFit/>
+              </a:bodyPr>
+              <a:lstStyle/>
+              <a:p>
+                <a:r>
+                  <a:rPr lang="en-US" sz="600" dirty="0">
+                    <a:solidFill>
+                      <a:schemeClr val="bg1"/>
+                    </a:solidFill>
+                  </a:rPr>
+                  <a:t>OM</a:t>
+                </a:r>
+                <a:r>
+                  <a:rPr lang="en-US" sz="600" baseline="-25000" dirty="0">
+                    <a:solidFill>
+                      <a:schemeClr val="bg1"/>
+                    </a:solidFill>
+                  </a:rPr>
+                  <a:t>3</a:t>
+                </a:r>
+                <a:endParaRPr lang="en-MY" sz="600" baseline="-25000" dirty="0">
+                  <a:solidFill>
+                    <a:schemeClr val="bg1"/>
+                  </a:solidFill>
+                </a:endParaRPr>
+              </a:p>
+            </p:txBody>
+          </p:sp>
+          <p:sp>
+            <p:nvSpPr>
+              <p:cNvPr id="334" name="TextBox 333">
+                <a:extLst>
+                  <a:ext uri="{FF2B5EF4-FFF2-40B4-BE49-F238E27FC236}">
+                    <a16:creationId xmlns:a16="http://schemas.microsoft.com/office/drawing/2014/main" id="{79890705-6EE6-45A7-85D5-F651E3BCEE97}"/>
+                  </a:ext>
+                </a:extLst>
+              </p:cNvPr>
+              <p:cNvSpPr txBox="1"/>
+              <p:nvPr/>
+            </p:nvSpPr>
+            <p:spPr>
+              <a:xfrm>
+                <a:off x="414411" y="503994"/>
+                <a:ext cx="332210" cy="184666"/>
+              </a:xfrm>
+              <a:prstGeom prst="rect">
+                <a:avLst/>
+              </a:prstGeom>
+              <a:noFill/>
+            </p:spPr>
+            <p:txBody>
+              <a:bodyPr wrap="square" rtlCol="0">
+                <a:spAutoFit/>
+              </a:bodyPr>
+              <a:lstStyle/>
+              <a:p>
+                <a:r>
+                  <a:rPr lang="en-US" sz="600" dirty="0">
+                    <a:solidFill>
+                      <a:schemeClr val="bg1"/>
+                    </a:solidFill>
+                  </a:rPr>
+                  <a:t>OM</a:t>
+                </a:r>
+                <a:r>
+                  <a:rPr lang="en-US" sz="600" baseline="-25000" dirty="0">
+                    <a:solidFill>
+                      <a:schemeClr val="bg1"/>
+                    </a:solidFill>
+                  </a:rPr>
+                  <a:t>2</a:t>
+                </a:r>
+                <a:endParaRPr lang="en-MY" sz="600" baseline="-25000" dirty="0">
+                  <a:solidFill>
+                    <a:schemeClr val="bg1"/>
+                  </a:solidFill>
+                </a:endParaRPr>
+              </a:p>
+            </p:txBody>
+          </p:sp>
+          <p:sp>
+            <p:nvSpPr>
+              <p:cNvPr id="335" name="TextBox 334">
+                <a:extLst>
+                  <a:ext uri="{FF2B5EF4-FFF2-40B4-BE49-F238E27FC236}">
+                    <a16:creationId xmlns:a16="http://schemas.microsoft.com/office/drawing/2014/main" id="{F4651F4D-3AB3-4AF9-ABE6-39E2BEE15F6B}"/>
+                  </a:ext>
+                </a:extLst>
+              </p:cNvPr>
+              <p:cNvSpPr txBox="1"/>
+              <p:nvPr/>
+            </p:nvSpPr>
+            <p:spPr>
+              <a:xfrm>
+                <a:off x="143429" y="808652"/>
+                <a:ext cx="606300" cy="184666"/>
+              </a:xfrm>
+              <a:prstGeom prst="rect">
+                <a:avLst/>
+              </a:prstGeom>
+              <a:noFill/>
+            </p:spPr>
+            <p:txBody>
+              <a:bodyPr wrap="square" rtlCol="0">
+                <a:spAutoFit/>
+              </a:bodyPr>
+              <a:lstStyle/>
+              <a:p>
+                <a:pPr algn="ctr"/>
+                <a:r>
+                  <a:rPr lang="en-US" sz="600" dirty="0" err="1"/>
+                  <a:t>C</a:t>
+                </a:r>
+                <a:r>
+                  <a:rPr lang="en-US" sz="600" baseline="-25000" dirty="0" err="1"/>
+                  <a:t>a</a:t>
+                </a:r>
+                <a:r>
+                  <a:rPr lang="en-US" sz="600" dirty="0" err="1"/>
+                  <a:t>H</a:t>
+                </a:r>
+                <a:r>
+                  <a:rPr lang="en-US" sz="600" baseline="-25000" dirty="0" err="1"/>
+                  <a:t>b</a:t>
+                </a:r>
+                <a:r>
+                  <a:rPr lang="en-US" sz="600" dirty="0" err="1"/>
+                  <a:t>N</a:t>
+                </a:r>
+                <a:r>
+                  <a:rPr lang="en-US" sz="600" baseline="-25000" dirty="0" err="1"/>
+                  <a:t>c</a:t>
+                </a:r>
+                <a:r>
+                  <a:rPr lang="en-US" sz="600" dirty="0" err="1"/>
+                  <a:t>O</a:t>
+                </a:r>
+                <a:r>
+                  <a:rPr lang="en-US" sz="600" baseline="-25000" dirty="0" err="1"/>
+                  <a:t>d</a:t>
+                </a:r>
+                <a:r>
+                  <a:rPr lang="en-US" sz="600" dirty="0" err="1"/>
+                  <a:t>P</a:t>
+                </a:r>
+                <a:r>
+                  <a:rPr lang="en-US" sz="600" baseline="-25000" dirty="0" err="1"/>
+                  <a:t>e</a:t>
+                </a:r>
+                <a:r>
+                  <a:rPr lang="en-US" sz="600" dirty="0" err="1"/>
+                  <a:t>S</a:t>
+                </a:r>
+                <a:r>
+                  <a:rPr lang="en-US" sz="600" baseline="-25000" dirty="0" err="1"/>
+                  <a:t>f</a:t>
+                </a:r>
+                <a:endParaRPr lang="en-MY" sz="600" baseline="-25000" dirty="0"/>
+              </a:p>
+            </p:txBody>
+          </p:sp>
+          <p:sp>
+            <p:nvSpPr>
+              <p:cNvPr id="17" name="Arrow: Curved Down 16">
+                <a:extLst>
+                  <a:ext uri="{FF2B5EF4-FFF2-40B4-BE49-F238E27FC236}">
+                    <a16:creationId xmlns:a16="http://schemas.microsoft.com/office/drawing/2014/main" id="{F83B2A11-4C38-4506-BDAA-0871D8867DFA}"/>
+                  </a:ext>
+                </a:extLst>
+              </p:cNvPr>
+              <p:cNvSpPr/>
+              <p:nvPr/>
+            </p:nvSpPr>
+            <p:spPr>
+              <a:xfrm rot="17078536" flipH="1">
+                <a:off x="1563" y="665288"/>
+                <a:ext cx="321196" cy="184666"/>
+              </a:xfrm>
+              <a:prstGeom prst="curvedDownArrow">
+                <a:avLst>
+                  <a:gd name="adj1" fmla="val 28507"/>
+                  <a:gd name="adj2" fmla="val 66159"/>
+                  <a:gd name="adj3" fmla="val 25000"/>
+                </a:avLst>
+              </a:prstGeom>
+              <a:solidFill>
+                <a:schemeClr val="bg1">
+                  <a:lumMod val="75000"/>
+                </a:schemeClr>
+              </a:solidFill>
+              <a:ln>
+                <a:noFill/>
+              </a:ln>
+            </p:spPr>
+            <p:style>
+              <a:lnRef idx="2">
+                <a:schemeClr val="accent1">
+                  <a:shade val="50000"/>
+                </a:schemeClr>
+              </a:lnRef>
+              <a:fillRef idx="1">
+                <a:schemeClr val="accent1"/>
+              </a:fillRef>
+              <a:effectRef idx="0">
+                <a:schemeClr val="accent1"/>
+              </a:effectRef>
+              <a:fontRef idx="minor">
+                <a:schemeClr val="lt1"/>
+              </a:fontRef>
+            </p:style>
+            <p:txBody>
+              <a:bodyPr rtlCol="0" anchor="ctr"/>
+              <a:lstStyle/>
+              <a:p>
+                <a:pPr algn="ctr"/>
+                <a:endParaRPr lang="en-MY">
+                  <a:solidFill>
+                    <a:schemeClr val="tx1"/>
+                  </a:solidFill>
+                </a:endParaRPr>
+              </a:p>
+            </p:txBody>
+          </p:sp>
+          <p:sp>
+            <p:nvSpPr>
+              <p:cNvPr id="338" name="Rectangle: Rounded Corners 337">
+                <a:extLst>
+                  <a:ext uri="{FF2B5EF4-FFF2-40B4-BE49-F238E27FC236}">
+                    <a16:creationId xmlns:a16="http://schemas.microsoft.com/office/drawing/2014/main" id="{66C77E62-98C3-4BE8-9D88-16BE5F1B7442}"/>
+                  </a:ext>
+                </a:extLst>
+              </p:cNvPr>
+              <p:cNvSpPr/>
+              <p:nvPr/>
+            </p:nvSpPr>
+            <p:spPr>
+              <a:xfrm>
+                <a:off x="590028" y="492625"/>
+                <a:ext cx="726329" cy="216387"/>
+              </a:xfrm>
+              <a:prstGeom prst="roundRect">
+                <a:avLst/>
+              </a:prstGeom>
+              <a:noFill/>
+              <a:ln>
+                <a:noFill/>
+              </a:ln>
+            </p:spPr>
+            <p:style>
+              <a:lnRef idx="2">
+                <a:schemeClr val="accent1">
+                  <a:shade val="50000"/>
+                </a:schemeClr>
+              </a:lnRef>
+              <a:fillRef idx="1">
+                <a:schemeClr val="accent1"/>
+              </a:fillRef>
+              <a:effectRef idx="0">
+                <a:schemeClr val="accent1"/>
+              </a:effectRef>
+              <a:fontRef idx="minor">
+                <a:schemeClr val="lt1"/>
+              </a:fontRef>
+            </p:style>
+            <p:txBody>
+              <a:bodyPr rtlCol="0" anchor="ctr"/>
+              <a:lstStyle/>
+              <a:p>
+                <a:r>
+                  <a:rPr lang="en-US" sz="600" dirty="0">
+                    <a:solidFill>
+                      <a:schemeClr val="tx1"/>
+                    </a:solidFill>
+                  </a:rPr>
+                  <a:t>WHONDRS 2019 FTICR-MS data</a:t>
+                </a:r>
+                <a:endParaRPr lang="en-MY" sz="600" dirty="0">
+                  <a:solidFill>
+                    <a:schemeClr val="tx1"/>
+                  </a:solidFill>
+                </a:endParaRPr>
+              </a:p>
+            </p:txBody>
+          </p:sp>
+          <p:sp>
+            <p:nvSpPr>
+              <p:cNvPr id="339" name="Rectangle: Rounded Corners 338">
+                <a:extLst>
+                  <a:ext uri="{FF2B5EF4-FFF2-40B4-BE49-F238E27FC236}">
+                    <a16:creationId xmlns:a16="http://schemas.microsoft.com/office/drawing/2014/main" id="{9E9A6C43-8B35-45EB-8296-A3DE9F6462E0}"/>
+                  </a:ext>
+                </a:extLst>
+              </p:cNvPr>
+              <p:cNvSpPr/>
+              <p:nvPr/>
+            </p:nvSpPr>
+            <p:spPr>
+              <a:xfrm>
+                <a:off x="-300398" y="723411"/>
+                <a:ext cx="561995" cy="216387"/>
+              </a:xfrm>
+              <a:prstGeom prst="roundRect">
+                <a:avLst/>
+              </a:prstGeom>
+              <a:noFill/>
+              <a:ln>
+                <a:noFill/>
+              </a:ln>
+            </p:spPr>
+            <p:style>
+              <a:lnRef idx="2">
+                <a:schemeClr val="accent1">
+                  <a:shade val="50000"/>
+                </a:schemeClr>
+              </a:lnRef>
+              <a:fillRef idx="1">
+                <a:schemeClr val="accent1"/>
+              </a:fillRef>
+              <a:effectRef idx="0">
+                <a:schemeClr val="accent1"/>
+              </a:effectRef>
+              <a:fontRef idx="minor">
+                <a:schemeClr val="lt1"/>
+              </a:fontRef>
+            </p:style>
+            <p:txBody>
+              <a:bodyPr rtlCol="0" anchor="ctr"/>
+              <a:lstStyle/>
+              <a:p>
+                <a:r>
+                  <a:rPr lang="en-US" sz="500" dirty="0" err="1">
+                    <a:solidFill>
+                      <a:schemeClr val="tx1"/>
+                    </a:solidFill>
+                  </a:rPr>
+                  <a:t>OMs’</a:t>
+                </a:r>
+                <a:r>
+                  <a:rPr lang="en-US" sz="500" dirty="0">
+                    <a:solidFill>
+                      <a:schemeClr val="tx1"/>
+                    </a:solidFill>
+                  </a:rPr>
+                  <a:t> elemental compositions</a:t>
+                </a:r>
+                <a:endParaRPr lang="en-MY" sz="500" dirty="0">
+                  <a:solidFill>
+                    <a:schemeClr val="tx1"/>
+                  </a:solidFill>
+                </a:endParaRPr>
+              </a:p>
+            </p:txBody>
+          </p:sp>
+        </p:grpSp>
+        <p:grpSp>
+          <p:nvGrpSpPr>
+            <p:cNvPr id="28" name="Group 27">
+              <a:extLst>
+                <a:ext uri="{FF2B5EF4-FFF2-40B4-BE49-F238E27FC236}">
+                  <a16:creationId xmlns:a16="http://schemas.microsoft.com/office/drawing/2014/main" id="{3BCA9BD0-C81E-4971-8C75-82A8FFA31F9C}"/>
+                </a:ext>
+              </a:extLst>
+            </p:cNvPr>
+            <p:cNvGrpSpPr/>
+            <p:nvPr/>
+          </p:nvGrpSpPr>
+          <p:grpSpPr>
+            <a:xfrm>
+              <a:off x="1842714" y="878487"/>
+              <a:ext cx="1081501" cy="1058484"/>
+              <a:chOff x="825248" y="1315584"/>
+              <a:chExt cx="752833" cy="736811"/>
+            </a:xfrm>
+          </p:grpSpPr>
+          <p:sp>
+            <p:nvSpPr>
+              <p:cNvPr id="18" name="Rectangle 17">
+                <a:extLst>
+                  <a:ext uri="{FF2B5EF4-FFF2-40B4-BE49-F238E27FC236}">
+                    <a16:creationId xmlns:a16="http://schemas.microsoft.com/office/drawing/2014/main" id="{8AFF1953-D008-4B46-9F84-6157EA9A07ED}"/>
+                  </a:ext>
+                </a:extLst>
+              </p:cNvPr>
+              <p:cNvSpPr/>
+              <p:nvPr/>
+            </p:nvSpPr>
+            <p:spPr>
+              <a:xfrm>
+                <a:off x="951170" y="1434095"/>
+                <a:ext cx="519106" cy="499791"/>
+              </a:xfrm>
+              <a:prstGeom prst="rect">
+                <a:avLst/>
+              </a:prstGeom>
+              <a:solidFill>
+                <a:schemeClr val="bg2"/>
+              </a:solidFill>
+              <a:ln>
+                <a:noFill/>
+              </a:ln>
+            </p:spPr>
+            <p:style>
+              <a:lnRef idx="2">
+                <a:schemeClr val="accent1">
+                  <a:shade val="50000"/>
+                </a:schemeClr>
+              </a:lnRef>
+              <a:fillRef idx="1">
+                <a:schemeClr val="accent1"/>
+              </a:fillRef>
+              <a:effectRef idx="0">
+                <a:schemeClr val="accent1"/>
+              </a:effectRef>
+              <a:fontRef idx="minor">
+                <a:schemeClr val="lt1"/>
+              </a:fontRef>
+            </p:style>
+            <p:txBody>
+              <a:bodyPr rtlCol="0" anchor="ctr"/>
+              <a:lstStyle/>
+              <a:p>
+                <a:pPr algn="ctr"/>
+                <a:endParaRPr lang="en-MY"/>
+              </a:p>
+            </p:txBody>
+          </p:sp>
+          <p:cxnSp>
+            <p:nvCxnSpPr>
+              <p:cNvPr id="20" name="Straight Arrow Connector 19">
+                <a:extLst>
+                  <a:ext uri="{FF2B5EF4-FFF2-40B4-BE49-F238E27FC236}">
+                    <a16:creationId xmlns:a16="http://schemas.microsoft.com/office/drawing/2014/main" id="{0483BE55-134D-4646-B5C0-6CEEE7FCF093}"/>
+                  </a:ext>
+                </a:extLst>
+              </p:cNvPr>
+              <p:cNvCxnSpPr>
+                <a:cxnSpLocks/>
+              </p:cNvCxnSpPr>
+              <p:nvPr/>
+            </p:nvCxnSpPr>
+            <p:spPr>
+              <a:xfrm flipV="1">
+                <a:off x="951170" y="1410667"/>
+                <a:ext cx="0" cy="523219"/>
+              </a:xfrm>
+              <a:prstGeom prst="straightConnector1">
+                <a:avLst/>
+              </a:prstGeom>
+              <a:ln>
+                <a:solidFill>
+                  <a:schemeClr val="tx1"/>
+                </a:solidFill>
+                <a:tailEnd type="triangle" w="sm" len="sm"/>
+              </a:ln>
+            </p:spPr>
+            <p:style>
+              <a:lnRef idx="1">
+                <a:schemeClr val="accent1"/>
+              </a:lnRef>
+              <a:fillRef idx="0">
+                <a:schemeClr val="accent1"/>
+              </a:fillRef>
+              <a:effectRef idx="0">
+                <a:schemeClr val="accent1"/>
+              </a:effectRef>
+              <a:fontRef idx="minor">
+                <a:schemeClr val="tx1"/>
+              </a:fontRef>
+            </p:style>
+          </p:cxnSp>
+          <p:cxnSp>
+            <p:nvCxnSpPr>
+              <p:cNvPr id="344" name="Straight Arrow Connector 343">
+                <a:extLst>
+                  <a:ext uri="{FF2B5EF4-FFF2-40B4-BE49-F238E27FC236}">
+                    <a16:creationId xmlns:a16="http://schemas.microsoft.com/office/drawing/2014/main" id="{623E09CD-4286-4E97-BB8E-8B6402959F98}"/>
+                  </a:ext>
+                </a:extLst>
+              </p:cNvPr>
+              <p:cNvCxnSpPr>
+                <a:cxnSpLocks/>
+              </p:cNvCxnSpPr>
+              <p:nvPr/>
+            </p:nvCxnSpPr>
+            <p:spPr>
+              <a:xfrm rot="5400000" flipV="1">
+                <a:off x="1210228" y="1674732"/>
+                <a:ext cx="0" cy="523219"/>
+              </a:xfrm>
+              <a:prstGeom prst="straightConnector1">
+                <a:avLst/>
+              </a:prstGeom>
+              <a:ln>
+                <a:solidFill>
+                  <a:schemeClr val="tx1"/>
+                </a:solidFill>
+                <a:tailEnd type="triangle" w="sm" len="sm"/>
+              </a:ln>
+            </p:spPr>
+            <p:style>
+              <a:lnRef idx="1">
+                <a:schemeClr val="accent1"/>
+              </a:lnRef>
+              <a:fillRef idx="0">
+                <a:schemeClr val="accent1"/>
+              </a:fillRef>
+              <a:effectRef idx="0">
+                <a:schemeClr val="accent1"/>
+              </a:effectRef>
+              <a:fontRef idx="minor">
+                <a:schemeClr val="tx1"/>
+              </a:fontRef>
+            </p:style>
+          </p:cxnSp>
+          <p:sp>
+            <p:nvSpPr>
+              <p:cNvPr id="345" name="Rectangle: Rounded Corners 344">
+                <a:extLst>
+                  <a:ext uri="{FF2B5EF4-FFF2-40B4-BE49-F238E27FC236}">
+                    <a16:creationId xmlns:a16="http://schemas.microsoft.com/office/drawing/2014/main" id="{A581DDD7-B073-4C27-A6F8-9C79FD9F10FD}"/>
+                  </a:ext>
+                </a:extLst>
+              </p:cNvPr>
+              <p:cNvSpPr/>
+              <p:nvPr/>
+            </p:nvSpPr>
+            <p:spPr>
+              <a:xfrm>
+                <a:off x="879060" y="1937582"/>
+                <a:ext cx="699021" cy="114813"/>
+              </a:xfrm>
+              <a:prstGeom prst="roundRect">
+                <a:avLst/>
+              </a:prstGeom>
+              <a:noFill/>
+              <a:ln>
+                <a:noFill/>
+              </a:ln>
+            </p:spPr>
+            <p:style>
+              <a:lnRef idx="2">
+                <a:schemeClr val="accent1">
+                  <a:shade val="50000"/>
+                </a:schemeClr>
+              </a:lnRef>
+              <a:fillRef idx="1">
+                <a:schemeClr val="accent1"/>
+              </a:fillRef>
+              <a:effectRef idx="0">
+                <a:schemeClr val="accent1"/>
+              </a:effectRef>
+              <a:fontRef idx="minor">
+                <a:schemeClr val="lt1"/>
+              </a:fontRef>
+            </p:style>
+            <p:txBody>
+              <a:bodyPr rtlCol="0" anchor="ctr"/>
+              <a:lstStyle/>
+              <a:p>
+                <a:pPr algn="ctr"/>
+                <a:r>
+                  <a:rPr lang="en-US" sz="600" dirty="0">
+                    <a:solidFill>
+                      <a:schemeClr val="tx1"/>
+                    </a:solidFill>
+                  </a:rPr>
+                  <a:t>Biogeochemical </a:t>
+                </a:r>
+              </a:p>
+              <a:p>
+                <a:pPr algn="ctr"/>
+                <a:r>
+                  <a:rPr lang="en-US" sz="600" dirty="0">
+                    <a:solidFill>
+                      <a:schemeClr val="tx1"/>
+                    </a:solidFill>
+                  </a:rPr>
+                  <a:t>conditions </a:t>
+                </a:r>
+                <a:endParaRPr lang="en-MY" sz="600" dirty="0">
+                  <a:solidFill>
+                    <a:schemeClr val="tx1"/>
+                  </a:solidFill>
+                </a:endParaRPr>
+              </a:p>
+            </p:txBody>
+          </p:sp>
+          <p:sp>
+            <p:nvSpPr>
+              <p:cNvPr id="346" name="Rectangle: Rounded Corners 345">
+                <a:extLst>
+                  <a:ext uri="{FF2B5EF4-FFF2-40B4-BE49-F238E27FC236}">
+                    <a16:creationId xmlns:a16="http://schemas.microsoft.com/office/drawing/2014/main" id="{0736E469-6E0C-4647-8F03-B6BFFBFC39D2}"/>
+                  </a:ext>
+                </a:extLst>
+              </p:cNvPr>
+              <p:cNvSpPr/>
+              <p:nvPr/>
+            </p:nvSpPr>
+            <p:spPr>
+              <a:xfrm rot="16200000">
+                <a:off x="505386" y="1635446"/>
+                <a:ext cx="736811" cy="97088"/>
+              </a:xfrm>
+              <a:prstGeom prst="roundRect">
+                <a:avLst/>
+              </a:prstGeom>
+              <a:noFill/>
+              <a:ln>
+                <a:noFill/>
+              </a:ln>
+            </p:spPr>
+            <p:style>
+              <a:lnRef idx="2">
+                <a:schemeClr val="accent1">
+                  <a:shade val="50000"/>
+                </a:schemeClr>
+              </a:lnRef>
+              <a:fillRef idx="1">
+                <a:schemeClr val="accent1"/>
+              </a:fillRef>
+              <a:effectRef idx="0">
+                <a:schemeClr val="accent1"/>
+              </a:effectRef>
+              <a:fontRef idx="minor">
+                <a:schemeClr val="lt1"/>
+              </a:fontRef>
+            </p:style>
+            <p:txBody>
+              <a:bodyPr rtlCol="0" anchor="ctr"/>
+              <a:lstStyle/>
+              <a:p>
+                <a:pPr algn="ctr"/>
+                <a:r>
+                  <a:rPr lang="en-US" sz="600" dirty="0">
+                    <a:solidFill>
+                      <a:schemeClr val="tx1"/>
+                    </a:solidFill>
+                  </a:rPr>
+                  <a:t>Thermodynamic </a:t>
+                </a:r>
+              </a:p>
+              <a:p>
+                <a:pPr algn="ctr"/>
+                <a:r>
+                  <a:rPr lang="en-US" sz="600" dirty="0">
+                    <a:solidFill>
+                      <a:schemeClr val="tx1"/>
+                    </a:solidFill>
+                  </a:rPr>
+                  <a:t>properties</a:t>
+                </a:r>
+                <a:endParaRPr lang="en-MY" sz="600" dirty="0">
+                  <a:solidFill>
+                    <a:schemeClr val="tx1"/>
+                  </a:solidFill>
+                </a:endParaRPr>
+              </a:p>
+            </p:txBody>
+          </p:sp>
+          <p:grpSp>
+            <p:nvGrpSpPr>
+              <p:cNvPr id="22" name="Group 21">
+                <a:extLst>
+                  <a:ext uri="{FF2B5EF4-FFF2-40B4-BE49-F238E27FC236}">
+                    <a16:creationId xmlns:a16="http://schemas.microsoft.com/office/drawing/2014/main" id="{8C2DCC4A-3013-441D-977F-AD3139BE6C75}"/>
+                  </a:ext>
+                </a:extLst>
+              </p:cNvPr>
+              <p:cNvGrpSpPr/>
+              <p:nvPr/>
+            </p:nvGrpSpPr>
+            <p:grpSpPr>
+              <a:xfrm rot="686126">
+                <a:off x="1045321" y="1520297"/>
+                <a:ext cx="312914" cy="370798"/>
+                <a:chOff x="1987152" y="1570823"/>
+                <a:chExt cx="312914" cy="370798"/>
+              </a:xfrm>
+            </p:grpSpPr>
+            <p:grpSp>
+              <p:nvGrpSpPr>
+                <p:cNvPr id="348" name="Group 347">
+                  <a:extLst>
+                    <a:ext uri="{FF2B5EF4-FFF2-40B4-BE49-F238E27FC236}">
+                      <a16:creationId xmlns:a16="http://schemas.microsoft.com/office/drawing/2014/main" id="{D870C7E6-6506-40D8-8819-FE2FA871E9A3}"/>
+                    </a:ext>
+                  </a:extLst>
+                </p:cNvPr>
+                <p:cNvGrpSpPr/>
+                <p:nvPr/>
+              </p:nvGrpSpPr>
+              <p:grpSpPr>
+                <a:xfrm rot="1734796">
+                  <a:off x="1987152" y="1792683"/>
+                  <a:ext cx="93042" cy="148938"/>
+                  <a:chOff x="988332" y="1820177"/>
+                  <a:chExt cx="93042" cy="148938"/>
+                </a:xfrm>
+                <a:solidFill>
+                  <a:schemeClr val="accent2"/>
+                </a:solidFill>
+              </p:grpSpPr>
+              <p:sp>
+                <p:nvSpPr>
+                  <p:cNvPr id="367" name="Oval 366">
+                    <a:extLst>
+                      <a:ext uri="{FF2B5EF4-FFF2-40B4-BE49-F238E27FC236}">
+                        <a16:creationId xmlns:a16="http://schemas.microsoft.com/office/drawing/2014/main" id="{6E25DFFB-1CD1-4950-A371-8694E74C9B6C}"/>
+                      </a:ext>
+                    </a:extLst>
+                  </p:cNvPr>
+                  <p:cNvSpPr/>
+                  <p:nvPr/>
+                </p:nvSpPr>
+                <p:spPr>
+                  <a:xfrm flipV="1">
+                    <a:off x="1001118" y="1906242"/>
+                    <a:ext cx="31014" cy="29509"/>
+                  </a:xfrm>
+                  <a:prstGeom prst="ellipse">
+                    <a:avLst/>
+                  </a:prstGeom>
+                  <a:grpFill/>
+                  <a:ln>
+                    <a:noFill/>
+                  </a:ln>
+                </p:spPr>
+                <p:style>
+                  <a:lnRef idx="2">
+                    <a:schemeClr val="accent1">
+                      <a:shade val="50000"/>
+                    </a:schemeClr>
+                  </a:lnRef>
+                  <a:fillRef idx="1">
+                    <a:schemeClr val="accent1"/>
+                  </a:fillRef>
+                  <a:effectRef idx="0">
+                    <a:schemeClr val="accent1"/>
+                  </a:effectRef>
+                  <a:fontRef idx="minor">
+                    <a:schemeClr val="lt1"/>
+                  </a:fontRef>
+                </p:style>
+                <p:txBody>
+                  <a:bodyPr rtlCol="0" anchor="ctr"/>
+                  <a:lstStyle/>
+                  <a:p>
+                    <a:pPr algn="ctr"/>
+                    <a:endParaRPr lang="en-US"/>
+                  </a:p>
+                </p:txBody>
+              </p:sp>
+              <p:sp>
+                <p:nvSpPr>
+                  <p:cNvPr id="368" name="Oval 367">
+                    <a:extLst>
+                      <a:ext uri="{FF2B5EF4-FFF2-40B4-BE49-F238E27FC236}">
+                        <a16:creationId xmlns:a16="http://schemas.microsoft.com/office/drawing/2014/main" id="{F2B1DF8F-0878-42F4-8046-3D2E4544B3E7}"/>
+                      </a:ext>
+                    </a:extLst>
+                  </p:cNvPr>
+                  <p:cNvSpPr/>
+                  <p:nvPr/>
+                </p:nvSpPr>
+                <p:spPr>
+                  <a:xfrm flipV="1">
+                    <a:off x="1034853" y="1939606"/>
+                    <a:ext cx="31014" cy="29509"/>
+                  </a:xfrm>
+                  <a:prstGeom prst="ellipse">
+                    <a:avLst/>
+                  </a:prstGeom>
+                  <a:grpFill/>
+                  <a:ln>
+                    <a:noFill/>
+                  </a:ln>
+                </p:spPr>
+                <p:style>
+                  <a:lnRef idx="2">
+                    <a:schemeClr val="accent1">
+                      <a:shade val="50000"/>
+                    </a:schemeClr>
+                  </a:lnRef>
+                  <a:fillRef idx="1">
+                    <a:schemeClr val="accent1"/>
+                  </a:fillRef>
+                  <a:effectRef idx="0">
+                    <a:schemeClr val="accent1"/>
+                  </a:effectRef>
+                  <a:fontRef idx="minor">
+                    <a:schemeClr val="lt1"/>
+                  </a:fontRef>
+                </p:style>
+                <p:txBody>
+                  <a:bodyPr rtlCol="0" anchor="ctr"/>
+                  <a:lstStyle/>
+                  <a:p>
+                    <a:pPr algn="ctr"/>
+                    <a:endParaRPr lang="en-US"/>
+                  </a:p>
+                </p:txBody>
+              </p:sp>
+              <p:sp>
+                <p:nvSpPr>
+                  <p:cNvPr id="370" name="Oval 369">
+                    <a:extLst>
+                      <a:ext uri="{FF2B5EF4-FFF2-40B4-BE49-F238E27FC236}">
+                        <a16:creationId xmlns:a16="http://schemas.microsoft.com/office/drawing/2014/main" id="{45F12AD3-1EAF-484F-81A6-010E8A1ED327}"/>
+                      </a:ext>
+                    </a:extLst>
+                  </p:cNvPr>
+                  <p:cNvSpPr/>
+                  <p:nvPr/>
+                </p:nvSpPr>
+                <p:spPr>
+                  <a:xfrm flipV="1">
+                    <a:off x="1050360" y="1901184"/>
+                    <a:ext cx="31014" cy="29509"/>
+                  </a:xfrm>
+                  <a:prstGeom prst="ellipse">
+                    <a:avLst/>
+                  </a:prstGeom>
+                  <a:grpFill/>
+                  <a:ln>
+                    <a:noFill/>
+                  </a:ln>
+                </p:spPr>
+                <p:style>
+                  <a:lnRef idx="2">
+                    <a:schemeClr val="accent1">
+                      <a:shade val="50000"/>
+                    </a:schemeClr>
+                  </a:lnRef>
+                  <a:fillRef idx="1">
+                    <a:schemeClr val="accent1"/>
+                  </a:fillRef>
+                  <a:effectRef idx="0">
+                    <a:schemeClr val="accent1"/>
+                  </a:effectRef>
+                  <a:fontRef idx="minor">
+                    <a:schemeClr val="lt1"/>
+                  </a:fontRef>
+                </p:style>
+                <p:txBody>
+                  <a:bodyPr rtlCol="0" anchor="ctr"/>
+                  <a:lstStyle/>
+                  <a:p>
+                    <a:pPr algn="ctr"/>
+                    <a:endParaRPr lang="en-US"/>
+                  </a:p>
+                </p:txBody>
+              </p:sp>
+              <p:sp>
+                <p:nvSpPr>
+                  <p:cNvPr id="371" name="Oval 370">
+                    <a:extLst>
+                      <a:ext uri="{FF2B5EF4-FFF2-40B4-BE49-F238E27FC236}">
+                        <a16:creationId xmlns:a16="http://schemas.microsoft.com/office/drawing/2014/main" id="{54CE7C73-26EE-4346-A83E-C6AC5F50B95D}"/>
+                      </a:ext>
+                    </a:extLst>
+                  </p:cNvPr>
+                  <p:cNvSpPr/>
+                  <p:nvPr/>
+                </p:nvSpPr>
+                <p:spPr>
+                  <a:xfrm flipV="1">
+                    <a:off x="1027100" y="1865137"/>
+                    <a:ext cx="31014" cy="29509"/>
+                  </a:xfrm>
+                  <a:prstGeom prst="ellipse">
+                    <a:avLst/>
+                  </a:prstGeom>
+                  <a:grpFill/>
+                  <a:ln>
+                    <a:noFill/>
+                  </a:ln>
+                </p:spPr>
+                <p:style>
+                  <a:lnRef idx="2">
+                    <a:schemeClr val="accent1">
+                      <a:shade val="50000"/>
+                    </a:schemeClr>
+                  </a:lnRef>
+                  <a:fillRef idx="1">
+                    <a:schemeClr val="accent1"/>
+                  </a:fillRef>
+                  <a:effectRef idx="0">
+                    <a:schemeClr val="accent1"/>
+                  </a:effectRef>
+                  <a:fontRef idx="minor">
+                    <a:schemeClr val="lt1"/>
+                  </a:fontRef>
+                </p:style>
+                <p:txBody>
+                  <a:bodyPr rtlCol="0" anchor="ctr"/>
+                  <a:lstStyle/>
+                  <a:p>
+                    <a:pPr algn="ctr"/>
+                    <a:endParaRPr lang="en-US"/>
+                  </a:p>
+                </p:txBody>
+              </p:sp>
+              <p:sp>
+                <p:nvSpPr>
+                  <p:cNvPr id="373" name="Oval 372">
+                    <a:extLst>
+                      <a:ext uri="{FF2B5EF4-FFF2-40B4-BE49-F238E27FC236}">
+                        <a16:creationId xmlns:a16="http://schemas.microsoft.com/office/drawing/2014/main" id="{17290DAA-1A37-4F4B-9FC6-1F8060D39905}"/>
+                      </a:ext>
+                    </a:extLst>
+                  </p:cNvPr>
+                  <p:cNvSpPr/>
+                  <p:nvPr/>
+                </p:nvSpPr>
+                <p:spPr>
+                  <a:xfrm flipV="1">
+                    <a:off x="988332" y="1840978"/>
+                    <a:ext cx="31014" cy="29509"/>
+                  </a:xfrm>
+                  <a:prstGeom prst="ellipse">
+                    <a:avLst/>
+                  </a:prstGeom>
+                  <a:grpFill/>
+                  <a:ln>
+                    <a:noFill/>
+                  </a:ln>
+                </p:spPr>
+                <p:style>
+                  <a:lnRef idx="2">
+                    <a:schemeClr val="accent1">
+                      <a:shade val="50000"/>
+                    </a:schemeClr>
+                  </a:lnRef>
+                  <a:fillRef idx="1">
+                    <a:schemeClr val="accent1"/>
+                  </a:fillRef>
+                  <a:effectRef idx="0">
+                    <a:schemeClr val="accent1"/>
+                  </a:effectRef>
+                  <a:fontRef idx="minor">
+                    <a:schemeClr val="lt1"/>
+                  </a:fontRef>
+                </p:style>
+                <p:txBody>
+                  <a:bodyPr rtlCol="0" anchor="ctr"/>
+                  <a:lstStyle/>
+                  <a:p>
+                    <a:pPr algn="ctr"/>
+                    <a:endParaRPr lang="en-US"/>
+                  </a:p>
+                </p:txBody>
+              </p:sp>
+              <p:sp>
+                <p:nvSpPr>
+                  <p:cNvPr id="374" name="Oval 373">
+                    <a:extLst>
+                      <a:ext uri="{FF2B5EF4-FFF2-40B4-BE49-F238E27FC236}">
+                        <a16:creationId xmlns:a16="http://schemas.microsoft.com/office/drawing/2014/main" id="{0170734D-EDC6-4AAD-9EA1-11D1A95DD688}"/>
+                      </a:ext>
+                    </a:extLst>
+                  </p:cNvPr>
+                  <p:cNvSpPr/>
+                  <p:nvPr/>
+                </p:nvSpPr>
+                <p:spPr>
+                  <a:xfrm flipV="1">
+                    <a:off x="1034382" y="1820177"/>
+                    <a:ext cx="31014" cy="29509"/>
+                  </a:xfrm>
+                  <a:prstGeom prst="ellipse">
+                    <a:avLst/>
+                  </a:prstGeom>
+                  <a:grpFill/>
+                  <a:ln>
+                    <a:noFill/>
+                  </a:ln>
+                </p:spPr>
+                <p:style>
+                  <a:lnRef idx="2">
+                    <a:schemeClr val="accent1">
+                      <a:shade val="50000"/>
+                    </a:schemeClr>
+                  </a:lnRef>
+                  <a:fillRef idx="1">
+                    <a:schemeClr val="accent1"/>
+                  </a:fillRef>
+                  <a:effectRef idx="0">
+                    <a:schemeClr val="accent1"/>
+                  </a:effectRef>
+                  <a:fontRef idx="minor">
+                    <a:schemeClr val="lt1"/>
+                  </a:fontRef>
+                </p:style>
+                <p:txBody>
+                  <a:bodyPr rtlCol="0" anchor="ctr"/>
+                  <a:lstStyle/>
+                  <a:p>
+                    <a:pPr algn="ctr"/>
+                    <a:endParaRPr lang="en-US"/>
+                  </a:p>
+                </p:txBody>
+              </p:sp>
+            </p:grpSp>
+            <p:grpSp>
+              <p:nvGrpSpPr>
+                <p:cNvPr id="350" name="Group 349">
+                  <a:extLst>
+                    <a:ext uri="{FF2B5EF4-FFF2-40B4-BE49-F238E27FC236}">
+                      <a16:creationId xmlns:a16="http://schemas.microsoft.com/office/drawing/2014/main" id="{4A8BDA3E-0831-4DAE-95A7-D09D4291DB87}"/>
+                    </a:ext>
+                  </a:extLst>
+                </p:cNvPr>
+                <p:cNvGrpSpPr/>
+                <p:nvPr/>
+              </p:nvGrpSpPr>
+              <p:grpSpPr>
+                <a:xfrm rot="14275821">
+                  <a:off x="2047882" y="1658479"/>
+                  <a:ext cx="131339" cy="148938"/>
+                  <a:chOff x="972825" y="1820177"/>
+                  <a:chExt cx="131339" cy="148938"/>
+                </a:xfrm>
+                <a:solidFill>
+                  <a:schemeClr val="accent2"/>
+                </a:solidFill>
+              </p:grpSpPr>
+              <p:sp>
+                <p:nvSpPr>
+                  <p:cNvPr id="351" name="Oval 350">
+                    <a:extLst>
+                      <a:ext uri="{FF2B5EF4-FFF2-40B4-BE49-F238E27FC236}">
+                        <a16:creationId xmlns:a16="http://schemas.microsoft.com/office/drawing/2014/main" id="{8E7E1FD3-D865-460D-AE13-DFA5EC4E378A}"/>
+                      </a:ext>
+                    </a:extLst>
+                  </p:cNvPr>
+                  <p:cNvSpPr/>
+                  <p:nvPr/>
+                </p:nvSpPr>
+                <p:spPr>
+                  <a:xfrm flipV="1">
+                    <a:off x="1001118" y="1906242"/>
+                    <a:ext cx="31014" cy="29509"/>
+                  </a:xfrm>
+                  <a:prstGeom prst="ellipse">
+                    <a:avLst/>
+                  </a:prstGeom>
+                  <a:grpFill/>
+                  <a:ln>
+                    <a:noFill/>
+                  </a:ln>
+                </p:spPr>
+                <p:style>
+                  <a:lnRef idx="2">
+                    <a:schemeClr val="accent1">
+                      <a:shade val="50000"/>
+                    </a:schemeClr>
+                  </a:lnRef>
+                  <a:fillRef idx="1">
+                    <a:schemeClr val="accent1"/>
+                  </a:fillRef>
+                  <a:effectRef idx="0">
+                    <a:schemeClr val="accent1"/>
+                  </a:effectRef>
+                  <a:fontRef idx="minor">
+                    <a:schemeClr val="lt1"/>
+                  </a:fontRef>
+                </p:style>
+                <p:txBody>
+                  <a:bodyPr rtlCol="0" anchor="ctr"/>
+                  <a:lstStyle/>
+                  <a:p>
+                    <a:pPr algn="ctr"/>
+                    <a:endParaRPr lang="en-US"/>
+                  </a:p>
+                </p:txBody>
+              </p:sp>
+              <p:sp>
+                <p:nvSpPr>
+                  <p:cNvPr id="352" name="Oval 351">
+                    <a:extLst>
+                      <a:ext uri="{FF2B5EF4-FFF2-40B4-BE49-F238E27FC236}">
+                        <a16:creationId xmlns:a16="http://schemas.microsoft.com/office/drawing/2014/main" id="{3CC19F20-9D8A-4239-950E-B25572AF17A8}"/>
+                      </a:ext>
+                    </a:extLst>
+                  </p:cNvPr>
+                  <p:cNvSpPr/>
+                  <p:nvPr/>
+                </p:nvSpPr>
+                <p:spPr>
+                  <a:xfrm flipV="1">
+                    <a:off x="1034853" y="1939606"/>
+                    <a:ext cx="31014" cy="29509"/>
+                  </a:xfrm>
+                  <a:prstGeom prst="ellipse">
+                    <a:avLst/>
+                  </a:prstGeom>
+                  <a:grpFill/>
+                  <a:ln>
+                    <a:noFill/>
+                  </a:ln>
+                </p:spPr>
+                <p:style>
+                  <a:lnRef idx="2">
+                    <a:schemeClr val="accent1">
+                      <a:shade val="50000"/>
+                    </a:schemeClr>
+                  </a:lnRef>
+                  <a:fillRef idx="1">
+                    <a:schemeClr val="accent1"/>
+                  </a:fillRef>
+                  <a:effectRef idx="0">
+                    <a:schemeClr val="accent1"/>
+                  </a:effectRef>
+                  <a:fontRef idx="minor">
+                    <a:schemeClr val="lt1"/>
+                  </a:fontRef>
+                </p:style>
+                <p:txBody>
+                  <a:bodyPr rtlCol="0" anchor="ctr"/>
+                  <a:lstStyle/>
+                  <a:p>
+                    <a:pPr algn="ctr"/>
+                    <a:endParaRPr lang="en-US"/>
+                  </a:p>
+                </p:txBody>
+              </p:sp>
+              <p:sp>
+                <p:nvSpPr>
+                  <p:cNvPr id="353" name="Oval 352">
+                    <a:extLst>
+                      <a:ext uri="{FF2B5EF4-FFF2-40B4-BE49-F238E27FC236}">
+                        <a16:creationId xmlns:a16="http://schemas.microsoft.com/office/drawing/2014/main" id="{A59096AD-453E-4298-B56F-78E6B98799A6}"/>
+                      </a:ext>
+                    </a:extLst>
+                  </p:cNvPr>
+                  <p:cNvSpPr/>
+                  <p:nvPr/>
+                </p:nvSpPr>
+                <p:spPr>
+                  <a:xfrm flipV="1">
+                    <a:off x="972825" y="1871675"/>
+                    <a:ext cx="31014" cy="29509"/>
+                  </a:xfrm>
+                  <a:prstGeom prst="ellipse">
+                    <a:avLst/>
+                  </a:prstGeom>
+                  <a:grpFill/>
+                  <a:ln>
+                    <a:noFill/>
+                  </a:ln>
+                </p:spPr>
+                <p:style>
+                  <a:lnRef idx="2">
+                    <a:schemeClr val="accent1">
+                      <a:shade val="50000"/>
+                    </a:schemeClr>
+                  </a:lnRef>
+                  <a:fillRef idx="1">
+                    <a:schemeClr val="accent1"/>
+                  </a:fillRef>
+                  <a:effectRef idx="0">
+                    <a:schemeClr val="accent1"/>
+                  </a:effectRef>
+                  <a:fontRef idx="minor">
+                    <a:schemeClr val="lt1"/>
+                  </a:fontRef>
+                </p:style>
+                <p:txBody>
+                  <a:bodyPr rtlCol="0" anchor="ctr"/>
+                  <a:lstStyle/>
+                  <a:p>
+                    <a:pPr algn="ctr"/>
+                    <a:endParaRPr lang="en-US"/>
+                  </a:p>
+                </p:txBody>
+              </p:sp>
+              <p:sp>
+                <p:nvSpPr>
+                  <p:cNvPr id="354" name="Oval 353">
+                    <a:extLst>
+                      <a:ext uri="{FF2B5EF4-FFF2-40B4-BE49-F238E27FC236}">
+                        <a16:creationId xmlns:a16="http://schemas.microsoft.com/office/drawing/2014/main" id="{E2CD7BC4-8977-4BDF-8448-EF82E470736D}"/>
+                      </a:ext>
+                    </a:extLst>
+                  </p:cNvPr>
+                  <p:cNvSpPr/>
+                  <p:nvPr/>
+                </p:nvSpPr>
+                <p:spPr>
+                  <a:xfrm flipV="1">
+                    <a:off x="1050360" y="1901184"/>
+                    <a:ext cx="31014" cy="29509"/>
+                  </a:xfrm>
+                  <a:prstGeom prst="ellipse">
+                    <a:avLst/>
+                  </a:prstGeom>
+                  <a:grpFill/>
+                  <a:ln>
+                    <a:noFill/>
+                  </a:ln>
+                </p:spPr>
+                <p:style>
+                  <a:lnRef idx="2">
+                    <a:schemeClr val="accent1">
+                      <a:shade val="50000"/>
+                    </a:schemeClr>
+                  </a:lnRef>
+                  <a:fillRef idx="1">
+                    <a:schemeClr val="accent1"/>
+                  </a:fillRef>
+                  <a:effectRef idx="0">
+                    <a:schemeClr val="accent1"/>
+                  </a:effectRef>
+                  <a:fontRef idx="minor">
+                    <a:schemeClr val="lt1"/>
+                  </a:fontRef>
+                </p:style>
+                <p:txBody>
+                  <a:bodyPr rtlCol="0" anchor="ctr"/>
+                  <a:lstStyle/>
+                  <a:p>
+                    <a:pPr algn="ctr"/>
+                    <a:endParaRPr lang="en-US"/>
+                  </a:p>
+                </p:txBody>
+              </p:sp>
+              <p:sp>
+                <p:nvSpPr>
+                  <p:cNvPr id="355" name="Oval 354">
+                    <a:extLst>
+                      <a:ext uri="{FF2B5EF4-FFF2-40B4-BE49-F238E27FC236}">
+                        <a16:creationId xmlns:a16="http://schemas.microsoft.com/office/drawing/2014/main" id="{90318CCF-D57D-4249-ADBB-6AABC49D8267}"/>
+                      </a:ext>
+                    </a:extLst>
+                  </p:cNvPr>
+                  <p:cNvSpPr/>
+                  <p:nvPr/>
+                </p:nvSpPr>
+                <p:spPr>
+                  <a:xfrm flipV="1">
+                    <a:off x="1027100" y="1865137"/>
+                    <a:ext cx="31014" cy="29509"/>
+                  </a:xfrm>
+                  <a:prstGeom prst="ellipse">
+                    <a:avLst/>
+                  </a:prstGeom>
+                  <a:grpFill/>
+                  <a:ln>
+                    <a:noFill/>
+                  </a:ln>
+                </p:spPr>
+                <p:style>
+                  <a:lnRef idx="2">
+                    <a:schemeClr val="accent1">
+                      <a:shade val="50000"/>
+                    </a:schemeClr>
+                  </a:lnRef>
+                  <a:fillRef idx="1">
+                    <a:schemeClr val="accent1"/>
+                  </a:fillRef>
+                  <a:effectRef idx="0">
+                    <a:schemeClr val="accent1"/>
+                  </a:effectRef>
+                  <a:fontRef idx="minor">
+                    <a:schemeClr val="lt1"/>
+                  </a:fontRef>
+                </p:style>
+                <p:txBody>
+                  <a:bodyPr rtlCol="0" anchor="ctr"/>
+                  <a:lstStyle/>
+                  <a:p>
+                    <a:pPr algn="ctr"/>
+                    <a:endParaRPr lang="en-US"/>
+                  </a:p>
+                </p:txBody>
+              </p:sp>
+              <p:sp>
+                <p:nvSpPr>
+                  <p:cNvPr id="356" name="Oval 355">
+                    <a:extLst>
+                      <a:ext uri="{FF2B5EF4-FFF2-40B4-BE49-F238E27FC236}">
+                        <a16:creationId xmlns:a16="http://schemas.microsoft.com/office/drawing/2014/main" id="{DFF557FA-D0AD-483C-9CB0-864B6F6BD653}"/>
+                      </a:ext>
+                    </a:extLst>
+                  </p:cNvPr>
+                  <p:cNvSpPr/>
+                  <p:nvPr/>
+                </p:nvSpPr>
+                <p:spPr>
+                  <a:xfrm flipV="1">
+                    <a:off x="1073150" y="1847661"/>
+                    <a:ext cx="31014" cy="29509"/>
+                  </a:xfrm>
+                  <a:prstGeom prst="ellipse">
+                    <a:avLst/>
+                  </a:prstGeom>
+                  <a:grpFill/>
+                  <a:ln>
+                    <a:noFill/>
+                  </a:ln>
+                </p:spPr>
+                <p:style>
+                  <a:lnRef idx="2">
+                    <a:schemeClr val="accent1">
+                      <a:shade val="50000"/>
+                    </a:schemeClr>
+                  </a:lnRef>
+                  <a:fillRef idx="1">
+                    <a:schemeClr val="accent1"/>
+                  </a:fillRef>
+                  <a:effectRef idx="0">
+                    <a:schemeClr val="accent1"/>
+                  </a:effectRef>
+                  <a:fontRef idx="minor">
+                    <a:schemeClr val="lt1"/>
+                  </a:fontRef>
+                </p:style>
+                <p:txBody>
+                  <a:bodyPr rtlCol="0" anchor="ctr"/>
+                  <a:lstStyle/>
+                  <a:p>
+                    <a:pPr algn="ctr"/>
+                    <a:endParaRPr lang="en-US"/>
+                  </a:p>
+                </p:txBody>
+              </p:sp>
+              <p:sp>
+                <p:nvSpPr>
+                  <p:cNvPr id="357" name="Oval 356">
+                    <a:extLst>
+                      <a:ext uri="{FF2B5EF4-FFF2-40B4-BE49-F238E27FC236}">
+                        <a16:creationId xmlns:a16="http://schemas.microsoft.com/office/drawing/2014/main" id="{C299A544-C28A-4639-996C-BC685572728B}"/>
+                      </a:ext>
+                    </a:extLst>
+                  </p:cNvPr>
+                  <p:cNvSpPr/>
+                  <p:nvPr/>
+                </p:nvSpPr>
+                <p:spPr>
+                  <a:xfrm flipV="1">
+                    <a:off x="988332" y="1840978"/>
+                    <a:ext cx="31014" cy="29509"/>
+                  </a:xfrm>
+                  <a:prstGeom prst="ellipse">
+                    <a:avLst/>
+                  </a:prstGeom>
+                  <a:grpFill/>
+                  <a:ln>
+                    <a:noFill/>
+                  </a:ln>
+                </p:spPr>
+                <p:style>
+                  <a:lnRef idx="2">
+                    <a:schemeClr val="accent1">
+                      <a:shade val="50000"/>
+                    </a:schemeClr>
+                  </a:lnRef>
+                  <a:fillRef idx="1">
+                    <a:schemeClr val="accent1"/>
+                  </a:fillRef>
+                  <a:effectRef idx="0">
+                    <a:schemeClr val="accent1"/>
+                  </a:effectRef>
+                  <a:fontRef idx="minor">
+                    <a:schemeClr val="lt1"/>
+                  </a:fontRef>
+                </p:style>
+                <p:txBody>
+                  <a:bodyPr rtlCol="0" anchor="ctr"/>
+                  <a:lstStyle/>
+                  <a:p>
+                    <a:pPr algn="ctr"/>
+                    <a:endParaRPr lang="en-US"/>
+                  </a:p>
+                </p:txBody>
+              </p:sp>
+              <p:sp>
+                <p:nvSpPr>
+                  <p:cNvPr id="358" name="Oval 357">
+                    <a:extLst>
+                      <a:ext uri="{FF2B5EF4-FFF2-40B4-BE49-F238E27FC236}">
+                        <a16:creationId xmlns:a16="http://schemas.microsoft.com/office/drawing/2014/main" id="{8A0184C9-85F8-4C97-A7CD-CAA7120F12EC}"/>
+                      </a:ext>
+                    </a:extLst>
+                  </p:cNvPr>
+                  <p:cNvSpPr/>
+                  <p:nvPr/>
+                </p:nvSpPr>
+                <p:spPr>
+                  <a:xfrm flipV="1">
+                    <a:off x="1034382" y="1820177"/>
+                    <a:ext cx="31014" cy="29509"/>
+                  </a:xfrm>
+                  <a:prstGeom prst="ellipse">
+                    <a:avLst/>
+                  </a:prstGeom>
+                  <a:grpFill/>
+                  <a:ln>
+                    <a:noFill/>
+                  </a:ln>
+                </p:spPr>
+                <p:style>
+                  <a:lnRef idx="2">
+                    <a:schemeClr val="accent1">
+                      <a:shade val="50000"/>
+                    </a:schemeClr>
+                  </a:lnRef>
+                  <a:fillRef idx="1">
+                    <a:schemeClr val="accent1"/>
+                  </a:fillRef>
+                  <a:effectRef idx="0">
+                    <a:schemeClr val="accent1"/>
+                  </a:effectRef>
+                  <a:fontRef idx="minor">
+                    <a:schemeClr val="lt1"/>
+                  </a:fontRef>
+                </p:style>
+                <p:txBody>
+                  <a:bodyPr rtlCol="0" anchor="ctr"/>
+                  <a:lstStyle/>
+                  <a:p>
+                    <a:pPr algn="ctr"/>
+                    <a:endParaRPr lang="en-US"/>
+                  </a:p>
+                </p:txBody>
+              </p:sp>
+            </p:grpSp>
+            <p:grpSp>
+              <p:nvGrpSpPr>
+                <p:cNvPr id="375" name="Group 374">
+                  <a:extLst>
+                    <a:ext uri="{FF2B5EF4-FFF2-40B4-BE49-F238E27FC236}">
+                      <a16:creationId xmlns:a16="http://schemas.microsoft.com/office/drawing/2014/main" id="{6925F28A-706E-41B7-B4BF-20DA89795902}"/>
+                    </a:ext>
+                  </a:extLst>
+                </p:cNvPr>
+                <p:cNvGrpSpPr/>
+                <p:nvPr/>
+              </p:nvGrpSpPr>
+              <p:grpSpPr>
+                <a:xfrm rot="3407543">
+                  <a:off x="2179076" y="1542875"/>
+                  <a:ext cx="93042" cy="148938"/>
+                  <a:chOff x="988332" y="1820177"/>
+                  <a:chExt cx="93042" cy="148938"/>
+                </a:xfrm>
+                <a:solidFill>
+                  <a:schemeClr val="accent2"/>
+                </a:solidFill>
+              </p:grpSpPr>
+              <p:sp>
+                <p:nvSpPr>
+                  <p:cNvPr id="376" name="Oval 375">
+                    <a:extLst>
+                      <a:ext uri="{FF2B5EF4-FFF2-40B4-BE49-F238E27FC236}">
+                        <a16:creationId xmlns:a16="http://schemas.microsoft.com/office/drawing/2014/main" id="{99DC5C48-8E0A-4E80-B99F-8331F83AB398}"/>
+                      </a:ext>
+                    </a:extLst>
+                  </p:cNvPr>
+                  <p:cNvSpPr/>
+                  <p:nvPr/>
+                </p:nvSpPr>
+                <p:spPr>
+                  <a:xfrm flipV="1">
+                    <a:off x="1001118" y="1906242"/>
+                    <a:ext cx="31014" cy="29509"/>
+                  </a:xfrm>
+                  <a:prstGeom prst="ellipse">
+                    <a:avLst/>
+                  </a:prstGeom>
+                  <a:grpFill/>
+                  <a:ln>
+                    <a:noFill/>
+                  </a:ln>
+                </p:spPr>
+                <p:style>
+                  <a:lnRef idx="2">
+                    <a:schemeClr val="accent1">
+                      <a:shade val="50000"/>
+                    </a:schemeClr>
+                  </a:lnRef>
+                  <a:fillRef idx="1">
+                    <a:schemeClr val="accent1"/>
+                  </a:fillRef>
+                  <a:effectRef idx="0">
+                    <a:schemeClr val="accent1"/>
+                  </a:effectRef>
+                  <a:fontRef idx="minor">
+                    <a:schemeClr val="lt1"/>
+                  </a:fontRef>
+                </p:style>
+                <p:txBody>
+                  <a:bodyPr rtlCol="0" anchor="ctr"/>
+                  <a:lstStyle/>
+                  <a:p>
+                    <a:pPr algn="ctr"/>
+                    <a:endParaRPr lang="en-US"/>
+                  </a:p>
+                </p:txBody>
+              </p:sp>
+              <p:sp>
+                <p:nvSpPr>
+                  <p:cNvPr id="377" name="Oval 376">
+                    <a:extLst>
+                      <a:ext uri="{FF2B5EF4-FFF2-40B4-BE49-F238E27FC236}">
+                        <a16:creationId xmlns:a16="http://schemas.microsoft.com/office/drawing/2014/main" id="{6A494A31-FAF2-4DD7-AE48-2CEBBB8C027E}"/>
+                      </a:ext>
+                    </a:extLst>
+                  </p:cNvPr>
+                  <p:cNvSpPr/>
+                  <p:nvPr/>
+                </p:nvSpPr>
+                <p:spPr>
+                  <a:xfrm flipV="1">
+                    <a:off x="1034853" y="1939606"/>
+                    <a:ext cx="31014" cy="29509"/>
+                  </a:xfrm>
+                  <a:prstGeom prst="ellipse">
+                    <a:avLst/>
+                  </a:prstGeom>
+                  <a:grpFill/>
+                  <a:ln>
+                    <a:noFill/>
+                  </a:ln>
+                </p:spPr>
+                <p:style>
+                  <a:lnRef idx="2">
+                    <a:schemeClr val="accent1">
+                      <a:shade val="50000"/>
+                    </a:schemeClr>
+                  </a:lnRef>
+                  <a:fillRef idx="1">
+                    <a:schemeClr val="accent1"/>
+                  </a:fillRef>
+                  <a:effectRef idx="0">
+                    <a:schemeClr val="accent1"/>
+                  </a:effectRef>
+                  <a:fontRef idx="minor">
+                    <a:schemeClr val="lt1"/>
+                  </a:fontRef>
+                </p:style>
+                <p:txBody>
+                  <a:bodyPr rtlCol="0" anchor="ctr"/>
+                  <a:lstStyle/>
+                  <a:p>
+                    <a:pPr algn="ctr"/>
+                    <a:endParaRPr lang="en-US"/>
+                  </a:p>
+                </p:txBody>
+              </p:sp>
+              <p:sp>
+                <p:nvSpPr>
+                  <p:cNvPr id="379" name="Oval 378">
+                    <a:extLst>
+                      <a:ext uri="{FF2B5EF4-FFF2-40B4-BE49-F238E27FC236}">
+                        <a16:creationId xmlns:a16="http://schemas.microsoft.com/office/drawing/2014/main" id="{6C11731C-9BC3-4DFA-A2CB-62368AF14CF4}"/>
+                      </a:ext>
+                    </a:extLst>
+                  </p:cNvPr>
+                  <p:cNvSpPr/>
+                  <p:nvPr/>
+                </p:nvSpPr>
+                <p:spPr>
+                  <a:xfrm flipV="1">
+                    <a:off x="1050360" y="1901184"/>
+                    <a:ext cx="31014" cy="29509"/>
+                  </a:xfrm>
+                  <a:prstGeom prst="ellipse">
+                    <a:avLst/>
+                  </a:prstGeom>
+                  <a:grpFill/>
+                  <a:ln>
+                    <a:noFill/>
+                  </a:ln>
+                </p:spPr>
+                <p:style>
+                  <a:lnRef idx="2">
+                    <a:schemeClr val="accent1">
+                      <a:shade val="50000"/>
+                    </a:schemeClr>
+                  </a:lnRef>
+                  <a:fillRef idx="1">
+                    <a:schemeClr val="accent1"/>
+                  </a:fillRef>
+                  <a:effectRef idx="0">
+                    <a:schemeClr val="accent1"/>
+                  </a:effectRef>
+                  <a:fontRef idx="minor">
+                    <a:schemeClr val="lt1"/>
+                  </a:fontRef>
+                </p:style>
+                <p:txBody>
+                  <a:bodyPr rtlCol="0" anchor="ctr"/>
+                  <a:lstStyle/>
+                  <a:p>
+                    <a:pPr algn="ctr"/>
+                    <a:endParaRPr lang="en-US"/>
+                  </a:p>
+                </p:txBody>
+              </p:sp>
+              <p:sp>
+                <p:nvSpPr>
+                  <p:cNvPr id="380" name="Oval 379">
+                    <a:extLst>
+                      <a:ext uri="{FF2B5EF4-FFF2-40B4-BE49-F238E27FC236}">
+                        <a16:creationId xmlns:a16="http://schemas.microsoft.com/office/drawing/2014/main" id="{72D52AF3-B129-4F7F-981E-8E86064F41DA}"/>
+                      </a:ext>
+                    </a:extLst>
+                  </p:cNvPr>
+                  <p:cNvSpPr/>
+                  <p:nvPr/>
+                </p:nvSpPr>
+                <p:spPr>
+                  <a:xfrm flipV="1">
+                    <a:off x="1027100" y="1865137"/>
+                    <a:ext cx="31014" cy="29509"/>
+                  </a:xfrm>
+                  <a:prstGeom prst="ellipse">
+                    <a:avLst/>
+                  </a:prstGeom>
+                  <a:grpFill/>
+                  <a:ln>
+                    <a:noFill/>
+                  </a:ln>
+                </p:spPr>
+                <p:style>
+                  <a:lnRef idx="2">
+                    <a:schemeClr val="accent1">
+                      <a:shade val="50000"/>
+                    </a:schemeClr>
+                  </a:lnRef>
+                  <a:fillRef idx="1">
+                    <a:schemeClr val="accent1"/>
+                  </a:fillRef>
+                  <a:effectRef idx="0">
+                    <a:schemeClr val="accent1"/>
+                  </a:effectRef>
+                  <a:fontRef idx="minor">
+                    <a:schemeClr val="lt1"/>
+                  </a:fontRef>
+                </p:style>
+                <p:txBody>
+                  <a:bodyPr rtlCol="0" anchor="ctr"/>
+                  <a:lstStyle/>
+                  <a:p>
+                    <a:pPr algn="ctr"/>
+                    <a:endParaRPr lang="en-US"/>
+                  </a:p>
+                </p:txBody>
+              </p:sp>
+              <p:sp>
+                <p:nvSpPr>
+                  <p:cNvPr id="382" name="Oval 381">
+                    <a:extLst>
+                      <a:ext uri="{FF2B5EF4-FFF2-40B4-BE49-F238E27FC236}">
+                        <a16:creationId xmlns:a16="http://schemas.microsoft.com/office/drawing/2014/main" id="{80EFD730-8BF0-4FA6-A5D1-D6D01B32B83A}"/>
+                      </a:ext>
+                    </a:extLst>
+                  </p:cNvPr>
+                  <p:cNvSpPr/>
+                  <p:nvPr/>
+                </p:nvSpPr>
+                <p:spPr>
+                  <a:xfrm flipV="1">
+                    <a:off x="988332" y="1840978"/>
+                    <a:ext cx="31014" cy="29509"/>
+                  </a:xfrm>
+                  <a:prstGeom prst="ellipse">
+                    <a:avLst/>
+                  </a:prstGeom>
+                  <a:grpFill/>
+                  <a:ln>
+                    <a:noFill/>
+                  </a:ln>
+                </p:spPr>
+                <p:style>
+                  <a:lnRef idx="2">
+                    <a:schemeClr val="accent1">
+                      <a:shade val="50000"/>
+                    </a:schemeClr>
+                  </a:lnRef>
+                  <a:fillRef idx="1">
+                    <a:schemeClr val="accent1"/>
+                  </a:fillRef>
+                  <a:effectRef idx="0">
+                    <a:schemeClr val="accent1"/>
+                  </a:effectRef>
+                  <a:fontRef idx="minor">
+                    <a:schemeClr val="lt1"/>
+                  </a:fontRef>
+                </p:style>
+                <p:txBody>
+                  <a:bodyPr rtlCol="0" anchor="ctr"/>
+                  <a:lstStyle/>
+                  <a:p>
+                    <a:pPr algn="ctr"/>
+                    <a:endParaRPr lang="en-US"/>
+                  </a:p>
+                </p:txBody>
+              </p:sp>
+              <p:sp>
+                <p:nvSpPr>
+                  <p:cNvPr id="383" name="Oval 382">
+                    <a:extLst>
+                      <a:ext uri="{FF2B5EF4-FFF2-40B4-BE49-F238E27FC236}">
+                        <a16:creationId xmlns:a16="http://schemas.microsoft.com/office/drawing/2014/main" id="{04C6725A-B163-4CD4-9761-BF16358EDAC3}"/>
+                      </a:ext>
+                    </a:extLst>
+                  </p:cNvPr>
+                  <p:cNvSpPr/>
+                  <p:nvPr/>
+                </p:nvSpPr>
+                <p:spPr>
+                  <a:xfrm flipV="1">
+                    <a:off x="1034382" y="1820177"/>
+                    <a:ext cx="31014" cy="29509"/>
+                  </a:xfrm>
+                  <a:prstGeom prst="ellipse">
+                    <a:avLst/>
+                  </a:prstGeom>
+                  <a:grpFill/>
+                  <a:ln>
+                    <a:noFill/>
+                  </a:ln>
+                </p:spPr>
+                <p:style>
+                  <a:lnRef idx="2">
+                    <a:schemeClr val="accent1">
+                      <a:shade val="50000"/>
+                    </a:schemeClr>
+                  </a:lnRef>
+                  <a:fillRef idx="1">
+                    <a:schemeClr val="accent1"/>
+                  </a:fillRef>
+                  <a:effectRef idx="0">
+                    <a:schemeClr val="accent1"/>
+                  </a:effectRef>
+                  <a:fontRef idx="minor">
+                    <a:schemeClr val="lt1"/>
+                  </a:fontRef>
+                </p:style>
+                <p:txBody>
+                  <a:bodyPr rtlCol="0" anchor="ctr"/>
+                  <a:lstStyle/>
+                  <a:p>
+                    <a:pPr algn="ctr"/>
+                    <a:endParaRPr lang="en-US"/>
+                  </a:p>
+                </p:txBody>
+              </p:sp>
+            </p:grpSp>
+          </p:grpSp>
+          <p:cxnSp>
+            <p:nvCxnSpPr>
+              <p:cNvPr id="24" name="Straight Connector 23">
+                <a:extLst>
+                  <a:ext uri="{FF2B5EF4-FFF2-40B4-BE49-F238E27FC236}">
+                    <a16:creationId xmlns:a16="http://schemas.microsoft.com/office/drawing/2014/main" id="{99908E6F-99F2-48D4-A212-5541577E073A}"/>
+                  </a:ext>
+                </a:extLst>
+              </p:cNvPr>
+              <p:cNvCxnSpPr>
+                <a:cxnSpLocks/>
+              </p:cNvCxnSpPr>
+              <p:nvPr/>
+            </p:nvCxnSpPr>
+            <p:spPr>
+              <a:xfrm flipV="1">
+                <a:off x="981044" y="1522720"/>
+                <a:ext cx="409115" cy="351990"/>
+              </a:xfrm>
+              <a:prstGeom prst="line">
+                <a:avLst/>
+              </a:prstGeom>
+              <a:ln>
+                <a:solidFill>
+                  <a:schemeClr val="tx1"/>
+                </a:solidFill>
+                <a:prstDash val="dash"/>
+              </a:ln>
+            </p:spPr>
+            <p:style>
+              <a:lnRef idx="1">
+                <a:schemeClr val="accent1"/>
+              </a:lnRef>
+              <a:fillRef idx="0">
+                <a:schemeClr val="accent1"/>
+              </a:fillRef>
+              <a:effectRef idx="0">
+                <a:schemeClr val="accent1"/>
+              </a:effectRef>
+              <a:fontRef idx="minor">
+                <a:schemeClr val="tx1"/>
+              </a:fontRef>
+            </p:style>
+          </p:cxnSp>
+        </p:grpSp>
+        <p:grpSp>
+          <p:nvGrpSpPr>
+            <p:cNvPr id="48" name="Group 47">
+              <a:extLst>
+                <a:ext uri="{FF2B5EF4-FFF2-40B4-BE49-F238E27FC236}">
+                  <a16:creationId xmlns:a16="http://schemas.microsoft.com/office/drawing/2014/main" id="{1199C9EE-D42A-454A-96A9-6D3041C3AFDB}"/>
+                </a:ext>
+              </a:extLst>
+            </p:cNvPr>
+            <p:cNvGrpSpPr/>
+            <p:nvPr/>
+          </p:nvGrpSpPr>
+          <p:grpSpPr>
+            <a:xfrm>
+              <a:off x="176758" y="1033756"/>
+              <a:ext cx="996366" cy="748505"/>
+              <a:chOff x="2001238" y="539402"/>
+              <a:chExt cx="996366" cy="748505"/>
+            </a:xfrm>
+          </p:grpSpPr>
+          <p:grpSp>
+            <p:nvGrpSpPr>
+              <p:cNvPr id="46" name="Group 45">
+                <a:extLst>
+                  <a:ext uri="{FF2B5EF4-FFF2-40B4-BE49-F238E27FC236}">
+                    <a16:creationId xmlns:a16="http://schemas.microsoft.com/office/drawing/2014/main" id="{413E4E41-9909-49FC-859C-D0AAEE3A477F}"/>
+                  </a:ext>
+                </a:extLst>
+              </p:cNvPr>
+              <p:cNvGrpSpPr/>
+              <p:nvPr/>
+            </p:nvGrpSpPr>
+            <p:grpSpPr>
+              <a:xfrm>
+                <a:off x="2001238" y="539402"/>
+                <a:ext cx="908800" cy="748505"/>
+                <a:chOff x="2075032" y="248610"/>
+                <a:chExt cx="908800" cy="748505"/>
+              </a:xfrm>
+            </p:grpSpPr>
+            <p:sp>
+              <p:nvSpPr>
+                <p:cNvPr id="405" name="Rectangle 404">
+                  <a:extLst>
+                    <a:ext uri="{FF2B5EF4-FFF2-40B4-BE49-F238E27FC236}">
+                      <a16:creationId xmlns:a16="http://schemas.microsoft.com/office/drawing/2014/main" id="{5D7AFC28-033C-4635-89FF-924408E3B789}"/>
+                    </a:ext>
+                  </a:extLst>
+                </p:cNvPr>
+                <p:cNvSpPr/>
+                <p:nvPr/>
+              </p:nvSpPr>
+              <p:spPr>
+                <a:xfrm>
+                  <a:off x="2269000" y="425752"/>
+                  <a:ext cx="714832" cy="351281"/>
+                </a:xfrm>
+                <a:prstGeom prst="rect">
+                  <a:avLst/>
+                </a:prstGeom>
+                <a:solidFill>
+                  <a:schemeClr val="bg2"/>
+                </a:solidFill>
+                <a:ln>
+                  <a:noFill/>
+                </a:ln>
+              </p:spPr>
+              <p:style>
+                <a:lnRef idx="2">
+                  <a:schemeClr val="accent1">
+                    <a:shade val="50000"/>
+                  </a:schemeClr>
+                </a:lnRef>
+                <a:fillRef idx="1">
+                  <a:schemeClr val="accent1"/>
+                </a:fillRef>
+                <a:effectRef idx="0">
+                  <a:schemeClr val="accent1"/>
+                </a:effectRef>
+                <a:fontRef idx="minor">
+                  <a:schemeClr val="lt1"/>
+                </a:fontRef>
+              </p:style>
+              <p:txBody>
+                <a:bodyPr rtlCol="0" anchor="ctr"/>
+                <a:lstStyle/>
+                <a:p>
+                  <a:pPr algn="ctr"/>
+                  <a:endParaRPr lang="en-MY"/>
+                </a:p>
+              </p:txBody>
+            </p:sp>
+            <p:cxnSp>
+              <p:nvCxnSpPr>
+                <p:cNvPr id="406" name="Straight Arrow Connector 405">
+                  <a:extLst>
+                    <a:ext uri="{FF2B5EF4-FFF2-40B4-BE49-F238E27FC236}">
+                      <a16:creationId xmlns:a16="http://schemas.microsoft.com/office/drawing/2014/main" id="{0103ECBA-C565-484E-9B87-F4B2207BADD8}"/>
+                    </a:ext>
+                  </a:extLst>
+                </p:cNvPr>
+                <p:cNvCxnSpPr>
+                  <a:cxnSpLocks/>
+                </p:cNvCxnSpPr>
+                <p:nvPr/>
+              </p:nvCxnSpPr>
+              <p:spPr>
+                <a:xfrm flipV="1">
+                  <a:off x="2269000" y="407228"/>
+                  <a:ext cx="0" cy="369806"/>
+                </a:xfrm>
+                <a:prstGeom prst="straightConnector1">
+                  <a:avLst/>
+                </a:prstGeom>
+                <a:ln>
+                  <a:solidFill>
+                    <a:schemeClr val="tx1"/>
+                  </a:solidFill>
+                  <a:tailEnd type="triangle" w="sm" len="sm"/>
+                </a:ln>
+              </p:spPr>
+              <p:style>
+                <a:lnRef idx="1">
+                  <a:schemeClr val="accent1"/>
+                </a:lnRef>
+                <a:fillRef idx="0">
+                  <a:schemeClr val="accent1"/>
+                </a:fillRef>
+                <a:effectRef idx="0">
+                  <a:schemeClr val="accent1"/>
+                </a:effectRef>
+                <a:fontRef idx="minor">
+                  <a:schemeClr val="tx1"/>
+                </a:fontRef>
+              </p:style>
+            </p:cxnSp>
+            <p:cxnSp>
+              <p:nvCxnSpPr>
+                <p:cNvPr id="407" name="Straight Arrow Connector 406">
+                  <a:extLst>
+                    <a:ext uri="{FF2B5EF4-FFF2-40B4-BE49-F238E27FC236}">
+                      <a16:creationId xmlns:a16="http://schemas.microsoft.com/office/drawing/2014/main" id="{A9E625F7-DA34-499D-BC8D-D0AB903FD987}"/>
+                    </a:ext>
+                  </a:extLst>
+                </p:cNvPr>
+                <p:cNvCxnSpPr>
+                  <a:cxnSpLocks/>
+                </p:cNvCxnSpPr>
+                <p:nvPr/>
+              </p:nvCxnSpPr>
+              <p:spPr>
+                <a:xfrm flipV="1">
+                  <a:off x="2266448" y="777035"/>
+                  <a:ext cx="714834" cy="2454"/>
+                </a:xfrm>
+                <a:prstGeom prst="straightConnector1">
+                  <a:avLst/>
+                </a:prstGeom>
+                <a:ln>
+                  <a:solidFill>
+                    <a:schemeClr val="tx1"/>
+                  </a:solidFill>
+                  <a:tailEnd type="triangle" w="sm" len="sm"/>
+                </a:ln>
+              </p:spPr>
+              <p:style>
+                <a:lnRef idx="1">
+                  <a:schemeClr val="accent1"/>
+                </a:lnRef>
+                <a:fillRef idx="0">
+                  <a:schemeClr val="accent1"/>
+                </a:fillRef>
+                <a:effectRef idx="0">
+                  <a:schemeClr val="accent1"/>
+                </a:effectRef>
+                <a:fontRef idx="minor">
+                  <a:schemeClr val="tx1"/>
+                </a:fontRef>
+              </p:style>
+            </p:cxnSp>
+            <p:sp>
+              <p:nvSpPr>
+                <p:cNvPr id="408" name="Rectangle: Rounded Corners 407">
+                  <a:extLst>
+                    <a:ext uri="{FF2B5EF4-FFF2-40B4-BE49-F238E27FC236}">
+                      <a16:creationId xmlns:a16="http://schemas.microsoft.com/office/drawing/2014/main" id="{D855E67D-5817-4B5C-B27E-89953D7EEBA2}"/>
+                    </a:ext>
+                  </a:extLst>
+                </p:cNvPr>
+                <p:cNvSpPr/>
+                <p:nvPr/>
+              </p:nvSpPr>
+              <p:spPr>
+                <a:xfrm>
+                  <a:off x="2174511" y="780728"/>
+                  <a:ext cx="809321" cy="216387"/>
+                </a:xfrm>
+                <a:prstGeom prst="roundRect">
+                  <a:avLst/>
+                </a:prstGeom>
+                <a:noFill/>
+                <a:ln>
+                  <a:noFill/>
+                </a:ln>
+              </p:spPr>
+              <p:style>
+                <a:lnRef idx="2">
+                  <a:schemeClr val="accent1">
+                    <a:shade val="50000"/>
+                  </a:schemeClr>
+                </a:lnRef>
+                <a:fillRef idx="1">
+                  <a:schemeClr val="accent1"/>
+                </a:fillRef>
+                <a:effectRef idx="0">
+                  <a:schemeClr val="accent1"/>
+                </a:effectRef>
+                <a:fontRef idx="minor">
+                  <a:schemeClr val="lt1"/>
+                </a:fontRef>
+              </p:style>
+              <p:txBody>
+                <a:bodyPr rtlCol="0" anchor="ctr"/>
+                <a:lstStyle/>
+                <a:p>
+                  <a:pPr algn="ctr"/>
+                  <a:r>
+                    <a:rPr lang="en-US" sz="600" dirty="0">
+                      <a:solidFill>
+                        <a:schemeClr val="tx1"/>
+                      </a:solidFill>
+                    </a:rPr>
+                    <a:t>Thermodynamic properties</a:t>
+                  </a:r>
+                  <a:endParaRPr lang="en-MY" sz="600" dirty="0">
+                    <a:solidFill>
+                      <a:schemeClr val="tx1"/>
+                    </a:solidFill>
+                  </a:endParaRPr>
+                </a:p>
+              </p:txBody>
+            </p:sp>
+            <p:sp>
+              <p:nvSpPr>
+                <p:cNvPr id="409" name="Rectangle: Rounded Corners 408">
+                  <a:extLst>
+                    <a:ext uri="{FF2B5EF4-FFF2-40B4-BE49-F238E27FC236}">
+                      <a16:creationId xmlns:a16="http://schemas.microsoft.com/office/drawing/2014/main" id="{8EBB0034-69ED-428B-A56E-FBF3E4207D39}"/>
+                    </a:ext>
+                  </a:extLst>
+                </p:cNvPr>
+                <p:cNvSpPr/>
+                <p:nvPr/>
+              </p:nvSpPr>
+              <p:spPr>
+                <a:xfrm rot="16200000">
+                  <a:off x="1814820" y="508822"/>
+                  <a:ext cx="736811" cy="216387"/>
+                </a:xfrm>
+                <a:prstGeom prst="roundRect">
+                  <a:avLst/>
+                </a:prstGeom>
+                <a:noFill/>
+                <a:ln>
+                  <a:noFill/>
+                </a:ln>
+              </p:spPr>
+              <p:style>
+                <a:lnRef idx="2">
+                  <a:schemeClr val="accent1">
+                    <a:shade val="50000"/>
+                  </a:schemeClr>
+                </a:lnRef>
+                <a:fillRef idx="1">
+                  <a:schemeClr val="accent1"/>
+                </a:fillRef>
+                <a:effectRef idx="0">
+                  <a:schemeClr val="accent1"/>
+                </a:effectRef>
+                <a:fontRef idx="minor">
+                  <a:schemeClr val="lt1"/>
+                </a:fontRef>
+              </p:style>
+              <p:txBody>
+                <a:bodyPr rtlCol="0" anchor="ctr"/>
+                <a:lstStyle/>
+                <a:p>
+                  <a:pPr algn="ctr"/>
+                  <a:r>
+                    <a:rPr lang="en-US" sz="600" dirty="0">
+                      <a:solidFill>
+                        <a:schemeClr val="tx1"/>
+                      </a:solidFill>
+                    </a:rPr>
+                    <a:t>Frequency</a:t>
+                  </a:r>
+                  <a:endParaRPr lang="en-MY" sz="600" dirty="0">
+                    <a:solidFill>
+                      <a:schemeClr val="tx1"/>
+                    </a:solidFill>
+                  </a:endParaRPr>
+                </a:p>
+              </p:txBody>
+            </p:sp>
+            <p:sp>
+              <p:nvSpPr>
+                <p:cNvPr id="38" name="Freeform: Shape 37">
+                  <a:extLst>
+                    <a:ext uri="{FF2B5EF4-FFF2-40B4-BE49-F238E27FC236}">
+                      <a16:creationId xmlns:a16="http://schemas.microsoft.com/office/drawing/2014/main" id="{69F19266-565A-4B4E-B1E1-4EE6AA901385}"/>
+                    </a:ext>
+                  </a:extLst>
+                </p:cNvPr>
+                <p:cNvSpPr/>
+                <p:nvPr/>
+              </p:nvSpPr>
+              <p:spPr>
+                <a:xfrm>
+                  <a:off x="2281990" y="652511"/>
+                  <a:ext cx="577516" cy="121521"/>
+                </a:xfrm>
+                <a:custGeom>
+                  <a:avLst/>
+                  <a:gdLst>
+                    <a:gd name="connsiteX0" fmla="*/ 0 w 577516"/>
+                    <a:gd name="connsiteY0" fmla="*/ 117511 h 121521"/>
+                    <a:gd name="connsiteX1" fmla="*/ 120316 w 577516"/>
+                    <a:gd name="connsiteY1" fmla="*/ 1205 h 121521"/>
+                    <a:gd name="connsiteX2" fmla="*/ 236621 w 577516"/>
+                    <a:gd name="connsiteY2" fmla="*/ 57353 h 121521"/>
+                    <a:gd name="connsiteX3" fmla="*/ 352927 w 577516"/>
+                    <a:gd name="connsiteY3" fmla="*/ 65374 h 121521"/>
+                    <a:gd name="connsiteX4" fmla="*/ 485274 w 577516"/>
+                    <a:gd name="connsiteY4" fmla="*/ 101468 h 121521"/>
+                    <a:gd name="connsiteX5" fmla="*/ 577516 w 577516"/>
+                    <a:gd name="connsiteY5" fmla="*/ 121521 h 121521"/>
+                  </a:gdLst>
+                  <a:ahLst/>
+                  <a:cxnLst>
+                    <a:cxn ang="0">
+                      <a:pos x="connsiteX0" y="connsiteY0"/>
+                    </a:cxn>
+                    <a:cxn ang="0">
+                      <a:pos x="connsiteX1" y="connsiteY1"/>
+                    </a:cxn>
+                    <a:cxn ang="0">
+                      <a:pos x="connsiteX2" y="connsiteY2"/>
+                    </a:cxn>
+                    <a:cxn ang="0">
+                      <a:pos x="connsiteX3" y="connsiteY3"/>
+                    </a:cxn>
+                    <a:cxn ang="0">
+                      <a:pos x="connsiteX4" y="connsiteY4"/>
+                    </a:cxn>
+                    <a:cxn ang="0">
+                      <a:pos x="connsiteX5" y="connsiteY5"/>
+                    </a:cxn>
+                  </a:cxnLst>
+                  <a:rect l="l" t="t" r="r" b="b"/>
+                  <a:pathLst>
+                    <a:path w="577516" h="121521">
+                      <a:moveTo>
+                        <a:pt x="0" y="117511"/>
+                      </a:moveTo>
+                      <a:cubicBezTo>
+                        <a:pt x="40439" y="64371"/>
+                        <a:pt x="80879" y="11231"/>
+                        <a:pt x="120316" y="1205"/>
+                      </a:cubicBezTo>
+                      <a:cubicBezTo>
+                        <a:pt x="159753" y="-8821"/>
+                        <a:pt x="197853" y="46658"/>
+                        <a:pt x="236621" y="57353"/>
+                      </a:cubicBezTo>
+                      <a:cubicBezTo>
+                        <a:pt x="275389" y="68048"/>
+                        <a:pt x="311485" y="58022"/>
+                        <a:pt x="352927" y="65374"/>
+                      </a:cubicBezTo>
+                      <a:cubicBezTo>
+                        <a:pt x="394369" y="72726"/>
+                        <a:pt x="447843" y="92110"/>
+                        <a:pt x="485274" y="101468"/>
+                      </a:cubicBezTo>
+                      <a:cubicBezTo>
+                        <a:pt x="522705" y="110826"/>
+                        <a:pt x="550110" y="116173"/>
+                        <a:pt x="577516" y="121521"/>
+                      </a:cubicBezTo>
+                    </a:path>
+                  </a:pathLst>
+                </a:custGeom>
+                <a:noFill/>
+                <a:ln>
+                  <a:solidFill>
+                    <a:schemeClr val="accent2"/>
+                  </a:solidFill>
+                </a:ln>
+              </p:spPr>
+              <p:style>
+                <a:lnRef idx="2">
+                  <a:schemeClr val="accent1">
+                    <a:shade val="50000"/>
+                  </a:schemeClr>
+                </a:lnRef>
+                <a:fillRef idx="1">
+                  <a:schemeClr val="accent1"/>
+                </a:fillRef>
+                <a:effectRef idx="0">
+                  <a:schemeClr val="accent1"/>
+                </a:effectRef>
+                <a:fontRef idx="minor">
+                  <a:schemeClr val="lt1"/>
+                </a:fontRef>
+              </p:style>
+              <p:txBody>
+                <a:bodyPr rtlCol="0" anchor="ctr"/>
+                <a:lstStyle/>
+                <a:p>
+                  <a:pPr algn="ctr"/>
+                  <a:endParaRPr lang="en-MY"/>
+                </a:p>
+              </p:txBody>
+            </p:sp>
+            <p:sp>
+              <p:nvSpPr>
+                <p:cNvPr id="440" name="Freeform: Shape 439">
+                  <a:extLst>
+                    <a:ext uri="{FF2B5EF4-FFF2-40B4-BE49-F238E27FC236}">
+                      <a16:creationId xmlns:a16="http://schemas.microsoft.com/office/drawing/2014/main" id="{9FA234B1-8429-4D20-8CB7-8F8D923F3BB6}"/>
+                    </a:ext>
+                  </a:extLst>
+                </p:cNvPr>
+                <p:cNvSpPr/>
+                <p:nvPr/>
+              </p:nvSpPr>
+              <p:spPr>
+                <a:xfrm>
+                  <a:off x="2347592" y="560646"/>
+                  <a:ext cx="351492" cy="216387"/>
+                </a:xfrm>
+                <a:custGeom>
+                  <a:avLst/>
+                  <a:gdLst>
+                    <a:gd name="connsiteX0" fmla="*/ 0 w 577516"/>
+                    <a:gd name="connsiteY0" fmla="*/ 117511 h 121521"/>
+                    <a:gd name="connsiteX1" fmla="*/ 120316 w 577516"/>
+                    <a:gd name="connsiteY1" fmla="*/ 1205 h 121521"/>
+                    <a:gd name="connsiteX2" fmla="*/ 236621 w 577516"/>
+                    <a:gd name="connsiteY2" fmla="*/ 57353 h 121521"/>
+                    <a:gd name="connsiteX3" fmla="*/ 352927 w 577516"/>
+                    <a:gd name="connsiteY3" fmla="*/ 65374 h 121521"/>
+                    <a:gd name="connsiteX4" fmla="*/ 485274 w 577516"/>
+                    <a:gd name="connsiteY4" fmla="*/ 101468 h 121521"/>
+                    <a:gd name="connsiteX5" fmla="*/ 577516 w 577516"/>
+                    <a:gd name="connsiteY5" fmla="*/ 121521 h 121521"/>
+                  </a:gdLst>
+                  <a:ahLst/>
+                  <a:cxnLst>
+                    <a:cxn ang="0">
+                      <a:pos x="connsiteX0" y="connsiteY0"/>
+                    </a:cxn>
+                    <a:cxn ang="0">
+                      <a:pos x="connsiteX1" y="connsiteY1"/>
+                    </a:cxn>
+                    <a:cxn ang="0">
+                      <a:pos x="connsiteX2" y="connsiteY2"/>
+                    </a:cxn>
+                    <a:cxn ang="0">
+                      <a:pos x="connsiteX3" y="connsiteY3"/>
+                    </a:cxn>
+                    <a:cxn ang="0">
+                      <a:pos x="connsiteX4" y="connsiteY4"/>
+                    </a:cxn>
+                    <a:cxn ang="0">
+                      <a:pos x="connsiteX5" y="connsiteY5"/>
+                    </a:cxn>
+                  </a:cxnLst>
+                  <a:rect l="l" t="t" r="r" b="b"/>
+                  <a:pathLst>
+                    <a:path w="577516" h="121521">
+                      <a:moveTo>
+                        <a:pt x="0" y="117511"/>
+                      </a:moveTo>
+                      <a:cubicBezTo>
+                        <a:pt x="40439" y="64371"/>
+                        <a:pt x="80879" y="11231"/>
+                        <a:pt x="120316" y="1205"/>
+                      </a:cubicBezTo>
+                      <a:cubicBezTo>
+                        <a:pt x="159753" y="-8821"/>
+                        <a:pt x="197853" y="46658"/>
+                        <a:pt x="236621" y="57353"/>
+                      </a:cubicBezTo>
+                      <a:cubicBezTo>
+                        <a:pt x="275389" y="68048"/>
+                        <a:pt x="311485" y="58022"/>
+                        <a:pt x="352927" y="65374"/>
+                      </a:cubicBezTo>
+                      <a:cubicBezTo>
+                        <a:pt x="394369" y="72726"/>
+                        <a:pt x="447843" y="92110"/>
+                        <a:pt x="485274" y="101468"/>
+                      </a:cubicBezTo>
+                      <a:cubicBezTo>
+                        <a:pt x="522705" y="110826"/>
+                        <a:pt x="550110" y="116173"/>
+                        <a:pt x="577516" y="121521"/>
+                      </a:cubicBezTo>
+                    </a:path>
+                  </a:pathLst>
+                </a:custGeom>
+                <a:noFill/>
+                <a:ln>
+                  <a:solidFill>
+                    <a:srgbClr val="00B050"/>
+                  </a:solidFill>
+                </a:ln>
+              </p:spPr>
+              <p:style>
+                <a:lnRef idx="2">
+                  <a:schemeClr val="accent1">
+                    <a:shade val="50000"/>
+                  </a:schemeClr>
+                </a:lnRef>
+                <a:fillRef idx="1">
+                  <a:schemeClr val="accent1"/>
+                </a:fillRef>
+                <a:effectRef idx="0">
+                  <a:schemeClr val="accent1"/>
+                </a:effectRef>
+                <a:fontRef idx="minor">
+                  <a:schemeClr val="lt1"/>
+                </a:fontRef>
+              </p:style>
+              <p:txBody>
+                <a:bodyPr rtlCol="0" anchor="ctr"/>
+                <a:lstStyle/>
+                <a:p>
+                  <a:pPr algn="ctr"/>
+                  <a:endParaRPr lang="en-MY"/>
+                </a:p>
+              </p:txBody>
+            </p:sp>
+            <p:sp>
+              <p:nvSpPr>
+                <p:cNvPr id="44" name="Freeform: Shape 43">
+                  <a:extLst>
+                    <a:ext uri="{FF2B5EF4-FFF2-40B4-BE49-F238E27FC236}">
+                      <a16:creationId xmlns:a16="http://schemas.microsoft.com/office/drawing/2014/main" id="{AF9D334E-7BCD-447E-89E9-0ED4978F7FC5}"/>
+                    </a:ext>
+                  </a:extLst>
+                </p:cNvPr>
+                <p:cNvSpPr/>
+                <p:nvPr/>
+              </p:nvSpPr>
+              <p:spPr>
+                <a:xfrm>
+                  <a:off x="2457363" y="637249"/>
+                  <a:ext cx="433137" cy="139796"/>
+                </a:xfrm>
+                <a:custGeom>
+                  <a:avLst/>
+                  <a:gdLst>
+                    <a:gd name="connsiteX0" fmla="*/ 0 w 433137"/>
+                    <a:gd name="connsiteY0" fmla="*/ 132900 h 139796"/>
+                    <a:gd name="connsiteX1" fmla="*/ 136358 w 433137"/>
+                    <a:gd name="connsiteY1" fmla="*/ 124879 h 139796"/>
+                    <a:gd name="connsiteX2" fmla="*/ 236621 w 433137"/>
+                    <a:gd name="connsiteY2" fmla="*/ 552 h 139796"/>
+                    <a:gd name="connsiteX3" fmla="*/ 324853 w 433137"/>
+                    <a:gd name="connsiteY3" fmla="*/ 80763 h 139796"/>
+                    <a:gd name="connsiteX4" fmla="*/ 376990 w 433137"/>
+                    <a:gd name="connsiteY4" fmla="*/ 116857 h 139796"/>
+                    <a:gd name="connsiteX5" fmla="*/ 433137 w 433137"/>
+                    <a:gd name="connsiteY5" fmla="*/ 136910 h 139796"/>
+                  </a:gdLst>
+                  <a:ahLst/>
+                  <a:cxnLst>
+                    <a:cxn ang="0">
+                      <a:pos x="connsiteX0" y="connsiteY0"/>
+                    </a:cxn>
+                    <a:cxn ang="0">
+                      <a:pos x="connsiteX1" y="connsiteY1"/>
+                    </a:cxn>
+                    <a:cxn ang="0">
+                      <a:pos x="connsiteX2" y="connsiteY2"/>
+                    </a:cxn>
+                    <a:cxn ang="0">
+                      <a:pos x="connsiteX3" y="connsiteY3"/>
+                    </a:cxn>
+                    <a:cxn ang="0">
+                      <a:pos x="connsiteX4" y="connsiteY4"/>
+                    </a:cxn>
+                    <a:cxn ang="0">
+                      <a:pos x="connsiteX5" y="connsiteY5"/>
+                    </a:cxn>
+                  </a:cxnLst>
+                  <a:rect l="l" t="t" r="r" b="b"/>
+                  <a:pathLst>
+                    <a:path w="433137" h="139796">
+                      <a:moveTo>
+                        <a:pt x="0" y="132900"/>
+                      </a:moveTo>
+                      <a:cubicBezTo>
+                        <a:pt x="48460" y="139918"/>
+                        <a:pt x="96921" y="146937"/>
+                        <a:pt x="136358" y="124879"/>
+                      </a:cubicBezTo>
+                      <a:cubicBezTo>
+                        <a:pt x="175795" y="102821"/>
+                        <a:pt x="205205" y="7905"/>
+                        <a:pt x="236621" y="552"/>
+                      </a:cubicBezTo>
+                      <a:cubicBezTo>
+                        <a:pt x="268037" y="-6801"/>
+                        <a:pt x="301458" y="61379"/>
+                        <a:pt x="324853" y="80763"/>
+                      </a:cubicBezTo>
+                      <a:cubicBezTo>
+                        <a:pt x="348248" y="100147"/>
+                        <a:pt x="358943" y="107499"/>
+                        <a:pt x="376990" y="116857"/>
+                      </a:cubicBezTo>
+                      <a:cubicBezTo>
+                        <a:pt x="395037" y="126215"/>
+                        <a:pt x="414087" y="131562"/>
+                        <a:pt x="433137" y="136910"/>
+                      </a:cubicBezTo>
+                    </a:path>
+                  </a:pathLst>
+                </a:custGeom>
+                <a:noFill/>
+                <a:ln>
+                  <a:solidFill>
+                    <a:srgbClr val="7030A0"/>
+                  </a:solidFill>
+                </a:ln>
+              </p:spPr>
+              <p:style>
+                <a:lnRef idx="2">
+                  <a:schemeClr val="accent1">
+                    <a:shade val="50000"/>
+                  </a:schemeClr>
+                </a:lnRef>
+                <a:fillRef idx="1">
+                  <a:schemeClr val="accent1"/>
+                </a:fillRef>
+                <a:effectRef idx="0">
+                  <a:schemeClr val="accent1"/>
+                </a:effectRef>
+                <a:fontRef idx="minor">
+                  <a:schemeClr val="lt1"/>
+                </a:fontRef>
+              </p:style>
+              <p:txBody>
+                <a:bodyPr rtlCol="0" anchor="ctr"/>
+                <a:lstStyle/>
+                <a:p>
+                  <a:pPr algn="ctr"/>
+                  <a:endParaRPr lang="en-MY"/>
+                </a:p>
+              </p:txBody>
+            </p:sp>
+          </p:grpSp>
+          <p:sp>
+            <p:nvSpPr>
+              <p:cNvPr id="454" name="Rectangle: Rounded Corners 453">
+                <a:extLst>
+                  <a:ext uri="{FF2B5EF4-FFF2-40B4-BE49-F238E27FC236}">
+                    <a16:creationId xmlns:a16="http://schemas.microsoft.com/office/drawing/2014/main" id="{2000110A-5781-4FDF-B646-37C2983EE91D}"/>
+                  </a:ext>
+                </a:extLst>
+              </p:cNvPr>
+              <p:cNvSpPr/>
+              <p:nvPr/>
+            </p:nvSpPr>
+            <p:spPr>
+              <a:xfrm>
+                <a:off x="2282770" y="719252"/>
+                <a:ext cx="714834" cy="216387"/>
+              </a:xfrm>
+              <a:prstGeom prst="roundRect">
+                <a:avLst/>
+              </a:prstGeom>
+              <a:noFill/>
+              <a:ln>
+                <a:noFill/>
+              </a:ln>
+            </p:spPr>
+            <p:style>
+              <a:lnRef idx="2">
+                <a:schemeClr val="accent1">
+                  <a:shade val="50000"/>
+                </a:schemeClr>
+              </a:lnRef>
+              <a:fillRef idx="1">
+                <a:schemeClr val="accent1"/>
+              </a:fillRef>
+              <a:effectRef idx="0">
+                <a:schemeClr val="accent1"/>
+              </a:effectRef>
+              <a:fontRef idx="minor">
+                <a:schemeClr val="lt1"/>
+              </a:fontRef>
+            </p:style>
+            <p:txBody>
+              <a:bodyPr rtlCol="0" anchor="ctr"/>
+              <a:lstStyle/>
+              <a:p>
+                <a:pPr algn="r"/>
+                <a:r>
+                  <a:rPr lang="en-US" sz="500" dirty="0">
+                    <a:solidFill>
+                      <a:schemeClr val="tx1"/>
+                    </a:solidFill>
+                  </a:rPr>
+                  <a:t>Distributed sample properties</a:t>
+                </a:r>
+                <a:endParaRPr lang="en-MY" sz="500" dirty="0">
+                  <a:solidFill>
+                    <a:schemeClr val="tx1"/>
+                  </a:solidFill>
+                </a:endParaRPr>
+              </a:p>
+            </p:txBody>
+          </p:sp>
+        </p:grpSp>
+        <p:grpSp>
+          <p:nvGrpSpPr>
+            <p:cNvPr id="455" name="Group 454">
+              <a:extLst>
+                <a:ext uri="{FF2B5EF4-FFF2-40B4-BE49-F238E27FC236}">
+                  <a16:creationId xmlns:a16="http://schemas.microsoft.com/office/drawing/2014/main" id="{246497D9-05FC-4927-BBB0-DC4BB211DDEF}"/>
+                </a:ext>
+              </a:extLst>
+            </p:cNvPr>
+            <p:cNvGrpSpPr/>
+            <p:nvPr/>
+          </p:nvGrpSpPr>
+          <p:grpSpPr>
+            <a:xfrm>
+              <a:off x="190614" y="2034361"/>
+              <a:ext cx="908800" cy="748505"/>
+              <a:chOff x="1067561" y="2071651"/>
+              <a:chExt cx="908800" cy="748505"/>
+            </a:xfrm>
+          </p:grpSpPr>
+          <p:grpSp>
+            <p:nvGrpSpPr>
+              <p:cNvPr id="470" name="Group 469">
+                <a:extLst>
+                  <a:ext uri="{FF2B5EF4-FFF2-40B4-BE49-F238E27FC236}">
+                    <a16:creationId xmlns:a16="http://schemas.microsoft.com/office/drawing/2014/main" id="{5DA37AB7-36EB-432B-809F-34D90E5A56C0}"/>
+                  </a:ext>
+                </a:extLst>
+              </p:cNvPr>
+              <p:cNvGrpSpPr/>
+              <p:nvPr/>
+            </p:nvGrpSpPr>
+            <p:grpSpPr>
+              <a:xfrm>
+                <a:off x="1067561" y="2071651"/>
+                <a:ext cx="908800" cy="748505"/>
+                <a:chOff x="2075032" y="248610"/>
+                <a:chExt cx="908800" cy="748505"/>
+              </a:xfrm>
+            </p:grpSpPr>
+            <p:sp>
+              <p:nvSpPr>
+                <p:cNvPr id="472" name="Rectangle 471">
+                  <a:extLst>
+                    <a:ext uri="{FF2B5EF4-FFF2-40B4-BE49-F238E27FC236}">
+                      <a16:creationId xmlns:a16="http://schemas.microsoft.com/office/drawing/2014/main" id="{9EE55F46-55F1-45BD-8FE1-D66437F25DF2}"/>
+                    </a:ext>
+                  </a:extLst>
+                </p:cNvPr>
+                <p:cNvSpPr/>
+                <p:nvPr/>
+              </p:nvSpPr>
+              <p:spPr>
+                <a:xfrm>
+                  <a:off x="2269000" y="425752"/>
+                  <a:ext cx="714832" cy="351281"/>
+                </a:xfrm>
+                <a:prstGeom prst="rect">
+                  <a:avLst/>
+                </a:prstGeom>
+                <a:solidFill>
+                  <a:schemeClr val="bg2"/>
+                </a:solidFill>
+                <a:ln>
+                  <a:noFill/>
+                </a:ln>
+              </p:spPr>
+              <p:style>
+                <a:lnRef idx="2">
+                  <a:schemeClr val="accent1">
+                    <a:shade val="50000"/>
+                  </a:schemeClr>
+                </a:lnRef>
+                <a:fillRef idx="1">
+                  <a:schemeClr val="accent1"/>
+                </a:fillRef>
+                <a:effectRef idx="0">
+                  <a:schemeClr val="accent1"/>
+                </a:effectRef>
+                <a:fontRef idx="minor">
+                  <a:schemeClr val="lt1"/>
+                </a:fontRef>
+              </p:style>
+              <p:txBody>
+                <a:bodyPr rtlCol="0" anchor="ctr"/>
+                <a:lstStyle/>
+                <a:p>
+                  <a:pPr algn="ctr"/>
+                  <a:endParaRPr lang="en-MY"/>
+                </a:p>
+              </p:txBody>
+            </p:sp>
+            <p:cxnSp>
+              <p:nvCxnSpPr>
+                <p:cNvPr id="473" name="Straight Arrow Connector 472">
+                  <a:extLst>
+                    <a:ext uri="{FF2B5EF4-FFF2-40B4-BE49-F238E27FC236}">
+                      <a16:creationId xmlns:a16="http://schemas.microsoft.com/office/drawing/2014/main" id="{075C941B-9FAB-4EF4-A427-1767993476F2}"/>
+                    </a:ext>
+                  </a:extLst>
+                </p:cNvPr>
+                <p:cNvCxnSpPr>
+                  <a:cxnSpLocks/>
+                </p:cNvCxnSpPr>
+                <p:nvPr/>
+              </p:nvCxnSpPr>
+              <p:spPr>
+                <a:xfrm flipV="1">
+                  <a:off x="2269000" y="407228"/>
+                  <a:ext cx="0" cy="369806"/>
+                </a:xfrm>
+                <a:prstGeom prst="straightConnector1">
+                  <a:avLst/>
+                </a:prstGeom>
+                <a:ln>
+                  <a:solidFill>
+                    <a:schemeClr val="tx1"/>
+                  </a:solidFill>
+                  <a:tailEnd type="triangle" w="sm" len="sm"/>
+                </a:ln>
+              </p:spPr>
+              <p:style>
+                <a:lnRef idx="1">
+                  <a:schemeClr val="accent1"/>
+                </a:lnRef>
+                <a:fillRef idx="0">
+                  <a:schemeClr val="accent1"/>
+                </a:fillRef>
+                <a:effectRef idx="0">
+                  <a:schemeClr val="accent1"/>
+                </a:effectRef>
+                <a:fontRef idx="minor">
+                  <a:schemeClr val="tx1"/>
+                </a:fontRef>
+              </p:style>
+            </p:cxnSp>
+            <p:cxnSp>
+              <p:nvCxnSpPr>
+                <p:cNvPr id="474" name="Straight Arrow Connector 473">
+                  <a:extLst>
+                    <a:ext uri="{FF2B5EF4-FFF2-40B4-BE49-F238E27FC236}">
+                      <a16:creationId xmlns:a16="http://schemas.microsoft.com/office/drawing/2014/main" id="{E49AE504-ED4C-4EAD-B33C-CA36CF8C8C2D}"/>
+                    </a:ext>
+                  </a:extLst>
+                </p:cNvPr>
+                <p:cNvCxnSpPr>
+                  <a:cxnSpLocks/>
+                </p:cNvCxnSpPr>
+                <p:nvPr/>
+              </p:nvCxnSpPr>
+              <p:spPr>
+                <a:xfrm flipV="1">
+                  <a:off x="2266448" y="777035"/>
+                  <a:ext cx="714834" cy="2454"/>
+                </a:xfrm>
+                <a:prstGeom prst="straightConnector1">
+                  <a:avLst/>
+                </a:prstGeom>
+                <a:ln>
+                  <a:solidFill>
+                    <a:schemeClr val="tx1"/>
+                  </a:solidFill>
+                  <a:tailEnd type="triangle" w="sm" len="sm"/>
+                </a:ln>
+              </p:spPr>
+              <p:style>
+                <a:lnRef idx="1">
+                  <a:schemeClr val="accent1"/>
+                </a:lnRef>
+                <a:fillRef idx="0">
+                  <a:schemeClr val="accent1"/>
+                </a:fillRef>
+                <a:effectRef idx="0">
+                  <a:schemeClr val="accent1"/>
+                </a:effectRef>
+                <a:fontRef idx="minor">
+                  <a:schemeClr val="tx1"/>
+                </a:fontRef>
+              </p:style>
+            </p:cxnSp>
+            <p:sp>
+              <p:nvSpPr>
+                <p:cNvPr id="475" name="Rectangle: Rounded Corners 474">
+                  <a:extLst>
+                    <a:ext uri="{FF2B5EF4-FFF2-40B4-BE49-F238E27FC236}">
+                      <a16:creationId xmlns:a16="http://schemas.microsoft.com/office/drawing/2014/main" id="{E719F99C-CAEC-4269-9F6B-61B061B7B40D}"/>
+                    </a:ext>
+                  </a:extLst>
+                </p:cNvPr>
+                <p:cNvSpPr/>
+                <p:nvPr/>
+              </p:nvSpPr>
+              <p:spPr>
+                <a:xfrm>
+                  <a:off x="2174511" y="780728"/>
+                  <a:ext cx="809321" cy="216387"/>
+                </a:xfrm>
+                <a:prstGeom prst="roundRect">
+                  <a:avLst/>
+                </a:prstGeom>
+                <a:noFill/>
+                <a:ln>
+                  <a:noFill/>
+                </a:ln>
+              </p:spPr>
+              <p:style>
+                <a:lnRef idx="2">
+                  <a:schemeClr val="accent1">
+                    <a:shade val="50000"/>
+                  </a:schemeClr>
+                </a:lnRef>
+                <a:fillRef idx="1">
+                  <a:schemeClr val="accent1"/>
+                </a:fillRef>
+                <a:effectRef idx="0">
+                  <a:schemeClr val="accent1"/>
+                </a:effectRef>
+                <a:fontRef idx="minor">
+                  <a:schemeClr val="lt1"/>
+                </a:fontRef>
+              </p:style>
+              <p:txBody>
+                <a:bodyPr rtlCol="0" anchor="ctr"/>
+                <a:lstStyle/>
+                <a:p>
+                  <a:pPr algn="ctr"/>
+                  <a:r>
+                    <a:rPr lang="en-US" sz="600" dirty="0">
+                      <a:solidFill>
+                        <a:schemeClr val="tx1"/>
+                      </a:solidFill>
+                    </a:rPr>
+                    <a:t>Thermodynamic properties</a:t>
+                  </a:r>
+                  <a:endParaRPr lang="en-MY" sz="600" dirty="0">
+                    <a:solidFill>
+                      <a:schemeClr val="tx1"/>
+                    </a:solidFill>
+                  </a:endParaRPr>
+                </a:p>
+              </p:txBody>
+            </p:sp>
+            <p:sp>
+              <p:nvSpPr>
+                <p:cNvPr id="476" name="Rectangle: Rounded Corners 475">
+                  <a:extLst>
+                    <a:ext uri="{FF2B5EF4-FFF2-40B4-BE49-F238E27FC236}">
+                      <a16:creationId xmlns:a16="http://schemas.microsoft.com/office/drawing/2014/main" id="{7890D5D6-B629-48D0-B980-FE2ADE93EDBD}"/>
+                    </a:ext>
+                  </a:extLst>
+                </p:cNvPr>
+                <p:cNvSpPr/>
+                <p:nvPr/>
+              </p:nvSpPr>
+              <p:spPr>
+                <a:xfrm rot="16200000">
+                  <a:off x="1814820" y="508822"/>
+                  <a:ext cx="736811" cy="216387"/>
+                </a:xfrm>
+                <a:prstGeom prst="roundRect">
+                  <a:avLst/>
+                </a:prstGeom>
+                <a:noFill/>
+                <a:ln>
+                  <a:noFill/>
+                </a:ln>
+              </p:spPr>
+              <p:style>
+                <a:lnRef idx="2">
+                  <a:schemeClr val="accent1">
+                    <a:shade val="50000"/>
+                  </a:schemeClr>
+                </a:lnRef>
+                <a:fillRef idx="1">
+                  <a:schemeClr val="accent1"/>
+                </a:fillRef>
+                <a:effectRef idx="0">
+                  <a:schemeClr val="accent1"/>
+                </a:effectRef>
+                <a:fontRef idx="minor">
+                  <a:schemeClr val="lt1"/>
+                </a:fontRef>
+              </p:style>
+              <p:txBody>
+                <a:bodyPr rtlCol="0" anchor="ctr"/>
+                <a:lstStyle/>
+                <a:p>
+                  <a:pPr algn="ctr"/>
+                  <a:r>
+                    <a:rPr lang="en-US" sz="600" dirty="0">
+                      <a:solidFill>
+                        <a:schemeClr val="tx1"/>
+                      </a:solidFill>
+                    </a:rPr>
+                    <a:t>Frequency</a:t>
+                  </a:r>
+                  <a:endParaRPr lang="en-MY" sz="600" dirty="0">
+                    <a:solidFill>
+                      <a:schemeClr val="tx1"/>
+                    </a:solidFill>
+                  </a:endParaRPr>
+                </a:p>
+              </p:txBody>
+            </p:sp>
+            <p:sp>
+              <p:nvSpPr>
+                <p:cNvPr id="477" name="Freeform: Shape 476">
+                  <a:extLst>
+                    <a:ext uri="{FF2B5EF4-FFF2-40B4-BE49-F238E27FC236}">
+                      <a16:creationId xmlns:a16="http://schemas.microsoft.com/office/drawing/2014/main" id="{A8F82308-967D-4ADE-8F7D-04B21F154D9E}"/>
+                    </a:ext>
+                  </a:extLst>
+                </p:cNvPr>
+                <p:cNvSpPr/>
+                <p:nvPr/>
+              </p:nvSpPr>
+              <p:spPr>
+                <a:xfrm>
+                  <a:off x="2281990" y="652511"/>
+                  <a:ext cx="577516" cy="121521"/>
+                </a:xfrm>
+                <a:custGeom>
+                  <a:avLst/>
+                  <a:gdLst>
+                    <a:gd name="connsiteX0" fmla="*/ 0 w 577516"/>
+                    <a:gd name="connsiteY0" fmla="*/ 117511 h 121521"/>
+                    <a:gd name="connsiteX1" fmla="*/ 120316 w 577516"/>
+                    <a:gd name="connsiteY1" fmla="*/ 1205 h 121521"/>
+                    <a:gd name="connsiteX2" fmla="*/ 236621 w 577516"/>
+                    <a:gd name="connsiteY2" fmla="*/ 57353 h 121521"/>
+                    <a:gd name="connsiteX3" fmla="*/ 352927 w 577516"/>
+                    <a:gd name="connsiteY3" fmla="*/ 65374 h 121521"/>
+                    <a:gd name="connsiteX4" fmla="*/ 485274 w 577516"/>
+                    <a:gd name="connsiteY4" fmla="*/ 101468 h 121521"/>
+                    <a:gd name="connsiteX5" fmla="*/ 577516 w 577516"/>
+                    <a:gd name="connsiteY5" fmla="*/ 121521 h 121521"/>
+                  </a:gdLst>
+                  <a:ahLst/>
+                  <a:cxnLst>
+                    <a:cxn ang="0">
+                      <a:pos x="connsiteX0" y="connsiteY0"/>
+                    </a:cxn>
+                    <a:cxn ang="0">
+                      <a:pos x="connsiteX1" y="connsiteY1"/>
+                    </a:cxn>
+                    <a:cxn ang="0">
+                      <a:pos x="connsiteX2" y="connsiteY2"/>
+                    </a:cxn>
+                    <a:cxn ang="0">
+                      <a:pos x="connsiteX3" y="connsiteY3"/>
+                    </a:cxn>
+                    <a:cxn ang="0">
+                      <a:pos x="connsiteX4" y="connsiteY4"/>
+                    </a:cxn>
+                    <a:cxn ang="0">
+                      <a:pos x="connsiteX5" y="connsiteY5"/>
+                    </a:cxn>
+                  </a:cxnLst>
+                  <a:rect l="l" t="t" r="r" b="b"/>
+                  <a:pathLst>
+                    <a:path w="577516" h="121521">
+                      <a:moveTo>
+                        <a:pt x="0" y="117511"/>
+                      </a:moveTo>
+                      <a:cubicBezTo>
+                        <a:pt x="40439" y="64371"/>
+                        <a:pt x="80879" y="11231"/>
+                        <a:pt x="120316" y="1205"/>
+                      </a:cubicBezTo>
+                      <a:cubicBezTo>
+                        <a:pt x="159753" y="-8821"/>
+                        <a:pt x="197853" y="46658"/>
+                        <a:pt x="236621" y="57353"/>
+                      </a:cubicBezTo>
+                      <a:cubicBezTo>
+                        <a:pt x="275389" y="68048"/>
+                        <a:pt x="311485" y="58022"/>
+                        <a:pt x="352927" y="65374"/>
+                      </a:cubicBezTo>
+                      <a:cubicBezTo>
+                        <a:pt x="394369" y="72726"/>
+                        <a:pt x="447843" y="92110"/>
+                        <a:pt x="485274" y="101468"/>
+                      </a:cubicBezTo>
+                      <a:cubicBezTo>
+                        <a:pt x="522705" y="110826"/>
+                        <a:pt x="550110" y="116173"/>
+                        <a:pt x="577516" y="121521"/>
+                      </a:cubicBezTo>
+                    </a:path>
+                  </a:pathLst>
+                </a:custGeom>
+                <a:noFill/>
+                <a:ln>
+                  <a:solidFill>
+                    <a:schemeClr val="accent2"/>
+                  </a:solidFill>
+                </a:ln>
+              </p:spPr>
+              <p:style>
+                <a:lnRef idx="2">
+                  <a:schemeClr val="accent1">
+                    <a:shade val="50000"/>
+                  </a:schemeClr>
+                </a:lnRef>
+                <a:fillRef idx="1">
+                  <a:schemeClr val="accent1"/>
+                </a:fillRef>
+                <a:effectRef idx="0">
+                  <a:schemeClr val="accent1"/>
+                </a:effectRef>
+                <a:fontRef idx="minor">
+                  <a:schemeClr val="lt1"/>
+                </a:fontRef>
+              </p:style>
+              <p:txBody>
+                <a:bodyPr rtlCol="0" anchor="ctr"/>
+                <a:lstStyle/>
+                <a:p>
+                  <a:pPr algn="ctr"/>
+                  <a:endParaRPr lang="en-MY"/>
+                </a:p>
+              </p:txBody>
+            </p:sp>
+            <p:sp>
+              <p:nvSpPr>
+                <p:cNvPr id="478" name="Freeform: Shape 477">
+                  <a:extLst>
+                    <a:ext uri="{FF2B5EF4-FFF2-40B4-BE49-F238E27FC236}">
+                      <a16:creationId xmlns:a16="http://schemas.microsoft.com/office/drawing/2014/main" id="{A3D2D62B-044E-42FD-B45C-8D35E7A49CE7}"/>
+                    </a:ext>
+                  </a:extLst>
+                </p:cNvPr>
+                <p:cNvSpPr/>
+                <p:nvPr/>
+              </p:nvSpPr>
+              <p:spPr>
+                <a:xfrm>
+                  <a:off x="2347592" y="560646"/>
+                  <a:ext cx="351492" cy="216387"/>
+                </a:xfrm>
+                <a:custGeom>
+                  <a:avLst/>
+                  <a:gdLst>
+                    <a:gd name="connsiteX0" fmla="*/ 0 w 577516"/>
+                    <a:gd name="connsiteY0" fmla="*/ 117511 h 121521"/>
+                    <a:gd name="connsiteX1" fmla="*/ 120316 w 577516"/>
+                    <a:gd name="connsiteY1" fmla="*/ 1205 h 121521"/>
+                    <a:gd name="connsiteX2" fmla="*/ 236621 w 577516"/>
+                    <a:gd name="connsiteY2" fmla="*/ 57353 h 121521"/>
+                    <a:gd name="connsiteX3" fmla="*/ 352927 w 577516"/>
+                    <a:gd name="connsiteY3" fmla="*/ 65374 h 121521"/>
+                    <a:gd name="connsiteX4" fmla="*/ 485274 w 577516"/>
+                    <a:gd name="connsiteY4" fmla="*/ 101468 h 121521"/>
+                    <a:gd name="connsiteX5" fmla="*/ 577516 w 577516"/>
+                    <a:gd name="connsiteY5" fmla="*/ 121521 h 121521"/>
+                  </a:gdLst>
+                  <a:ahLst/>
+                  <a:cxnLst>
+                    <a:cxn ang="0">
+                      <a:pos x="connsiteX0" y="connsiteY0"/>
+                    </a:cxn>
+                    <a:cxn ang="0">
+                      <a:pos x="connsiteX1" y="connsiteY1"/>
+                    </a:cxn>
+                    <a:cxn ang="0">
+                      <a:pos x="connsiteX2" y="connsiteY2"/>
+                    </a:cxn>
+                    <a:cxn ang="0">
+                      <a:pos x="connsiteX3" y="connsiteY3"/>
+                    </a:cxn>
+                    <a:cxn ang="0">
+                      <a:pos x="connsiteX4" y="connsiteY4"/>
+                    </a:cxn>
+                    <a:cxn ang="0">
+                      <a:pos x="connsiteX5" y="connsiteY5"/>
+                    </a:cxn>
+                  </a:cxnLst>
+                  <a:rect l="l" t="t" r="r" b="b"/>
+                  <a:pathLst>
+                    <a:path w="577516" h="121521">
+                      <a:moveTo>
+                        <a:pt x="0" y="117511"/>
+                      </a:moveTo>
+                      <a:cubicBezTo>
+                        <a:pt x="40439" y="64371"/>
+                        <a:pt x="80879" y="11231"/>
+                        <a:pt x="120316" y="1205"/>
+                      </a:cubicBezTo>
+                      <a:cubicBezTo>
+                        <a:pt x="159753" y="-8821"/>
+                        <a:pt x="197853" y="46658"/>
+                        <a:pt x="236621" y="57353"/>
+                      </a:cubicBezTo>
+                      <a:cubicBezTo>
+                        <a:pt x="275389" y="68048"/>
+                        <a:pt x="311485" y="58022"/>
+                        <a:pt x="352927" y="65374"/>
+                      </a:cubicBezTo>
+                      <a:cubicBezTo>
+                        <a:pt x="394369" y="72726"/>
+                        <a:pt x="447843" y="92110"/>
+                        <a:pt x="485274" y="101468"/>
+                      </a:cubicBezTo>
+                      <a:cubicBezTo>
+                        <a:pt x="522705" y="110826"/>
+                        <a:pt x="550110" y="116173"/>
+                        <a:pt x="577516" y="121521"/>
+                      </a:cubicBezTo>
+                    </a:path>
+                  </a:pathLst>
+                </a:custGeom>
+                <a:noFill/>
+                <a:ln>
+                  <a:solidFill>
+                    <a:srgbClr val="00B050"/>
+                  </a:solidFill>
+                </a:ln>
+              </p:spPr>
+              <p:style>
+                <a:lnRef idx="2">
+                  <a:schemeClr val="accent1">
+                    <a:shade val="50000"/>
+                  </a:schemeClr>
+                </a:lnRef>
+                <a:fillRef idx="1">
+                  <a:schemeClr val="accent1"/>
+                </a:fillRef>
+                <a:effectRef idx="0">
+                  <a:schemeClr val="accent1"/>
+                </a:effectRef>
+                <a:fontRef idx="minor">
+                  <a:schemeClr val="lt1"/>
+                </a:fontRef>
+              </p:style>
+              <p:txBody>
+                <a:bodyPr rtlCol="0" anchor="ctr"/>
+                <a:lstStyle/>
+                <a:p>
+                  <a:pPr algn="ctr"/>
+                  <a:endParaRPr lang="en-MY"/>
+                </a:p>
+              </p:txBody>
+            </p:sp>
+            <p:sp>
+              <p:nvSpPr>
+                <p:cNvPr id="479" name="Freeform: Shape 478">
+                  <a:extLst>
+                    <a:ext uri="{FF2B5EF4-FFF2-40B4-BE49-F238E27FC236}">
+                      <a16:creationId xmlns:a16="http://schemas.microsoft.com/office/drawing/2014/main" id="{8354494C-73FA-4F4A-A1D4-058D3C6CBFBD}"/>
+                    </a:ext>
+                  </a:extLst>
+                </p:cNvPr>
+                <p:cNvSpPr/>
+                <p:nvPr/>
+              </p:nvSpPr>
+              <p:spPr>
+                <a:xfrm>
+                  <a:off x="2457363" y="637249"/>
+                  <a:ext cx="433137" cy="139796"/>
+                </a:xfrm>
+                <a:custGeom>
+                  <a:avLst/>
+                  <a:gdLst>
+                    <a:gd name="connsiteX0" fmla="*/ 0 w 433137"/>
+                    <a:gd name="connsiteY0" fmla="*/ 132900 h 139796"/>
+                    <a:gd name="connsiteX1" fmla="*/ 136358 w 433137"/>
+                    <a:gd name="connsiteY1" fmla="*/ 124879 h 139796"/>
+                    <a:gd name="connsiteX2" fmla="*/ 236621 w 433137"/>
+                    <a:gd name="connsiteY2" fmla="*/ 552 h 139796"/>
+                    <a:gd name="connsiteX3" fmla="*/ 324853 w 433137"/>
+                    <a:gd name="connsiteY3" fmla="*/ 80763 h 139796"/>
+                    <a:gd name="connsiteX4" fmla="*/ 376990 w 433137"/>
+                    <a:gd name="connsiteY4" fmla="*/ 116857 h 139796"/>
+                    <a:gd name="connsiteX5" fmla="*/ 433137 w 433137"/>
+                    <a:gd name="connsiteY5" fmla="*/ 136910 h 139796"/>
+                  </a:gdLst>
+                  <a:ahLst/>
+                  <a:cxnLst>
+                    <a:cxn ang="0">
+                      <a:pos x="connsiteX0" y="connsiteY0"/>
+                    </a:cxn>
+                    <a:cxn ang="0">
+                      <a:pos x="connsiteX1" y="connsiteY1"/>
+                    </a:cxn>
+                    <a:cxn ang="0">
+                      <a:pos x="connsiteX2" y="connsiteY2"/>
+                    </a:cxn>
+                    <a:cxn ang="0">
+                      <a:pos x="connsiteX3" y="connsiteY3"/>
+                    </a:cxn>
+                    <a:cxn ang="0">
+                      <a:pos x="connsiteX4" y="connsiteY4"/>
+                    </a:cxn>
+                    <a:cxn ang="0">
+                      <a:pos x="connsiteX5" y="connsiteY5"/>
+                    </a:cxn>
+                  </a:cxnLst>
+                  <a:rect l="l" t="t" r="r" b="b"/>
+                  <a:pathLst>
+                    <a:path w="433137" h="139796">
+                      <a:moveTo>
+                        <a:pt x="0" y="132900"/>
+                      </a:moveTo>
+                      <a:cubicBezTo>
+                        <a:pt x="48460" y="139918"/>
+                        <a:pt x="96921" y="146937"/>
+                        <a:pt x="136358" y="124879"/>
+                      </a:cubicBezTo>
+                      <a:cubicBezTo>
+                        <a:pt x="175795" y="102821"/>
+                        <a:pt x="205205" y="7905"/>
+                        <a:pt x="236621" y="552"/>
+                      </a:cubicBezTo>
+                      <a:cubicBezTo>
+                        <a:pt x="268037" y="-6801"/>
+                        <a:pt x="301458" y="61379"/>
+                        <a:pt x="324853" y="80763"/>
+                      </a:cubicBezTo>
+                      <a:cubicBezTo>
+                        <a:pt x="348248" y="100147"/>
+                        <a:pt x="358943" y="107499"/>
+                        <a:pt x="376990" y="116857"/>
+                      </a:cubicBezTo>
+                      <a:cubicBezTo>
+                        <a:pt x="395037" y="126215"/>
+                        <a:pt x="414087" y="131562"/>
+                        <a:pt x="433137" y="136910"/>
+                      </a:cubicBezTo>
+                    </a:path>
+                  </a:pathLst>
+                </a:custGeom>
+                <a:noFill/>
+                <a:ln>
+                  <a:solidFill>
+                    <a:srgbClr val="7030A0"/>
+                  </a:solidFill>
+                </a:ln>
+              </p:spPr>
+              <p:style>
+                <a:lnRef idx="2">
+                  <a:schemeClr val="accent1">
+                    <a:shade val="50000"/>
+                  </a:schemeClr>
+                </a:lnRef>
+                <a:fillRef idx="1">
+                  <a:schemeClr val="accent1"/>
+                </a:fillRef>
+                <a:effectRef idx="0">
+                  <a:schemeClr val="accent1"/>
+                </a:effectRef>
+                <a:fontRef idx="minor">
+                  <a:schemeClr val="lt1"/>
+                </a:fontRef>
+              </p:style>
+              <p:txBody>
+                <a:bodyPr rtlCol="0" anchor="ctr"/>
+                <a:lstStyle/>
+                <a:p>
+                  <a:pPr algn="ctr"/>
+                  <a:endParaRPr lang="en-MY"/>
+                </a:p>
+              </p:txBody>
+            </p:sp>
+          </p:grpSp>
+          <p:sp>
+            <p:nvSpPr>
+              <p:cNvPr id="57" name="Rectangle 56">
+                <a:extLst>
+                  <a:ext uri="{FF2B5EF4-FFF2-40B4-BE49-F238E27FC236}">
+                    <a16:creationId xmlns:a16="http://schemas.microsoft.com/office/drawing/2014/main" id="{A7D985E0-503D-4B3B-BFB5-B50107A68001}"/>
+                  </a:ext>
+                </a:extLst>
+              </p:cNvPr>
+              <p:cNvSpPr/>
+              <p:nvPr/>
+            </p:nvSpPr>
+            <p:spPr>
+              <a:xfrm>
+                <a:off x="1354346" y="2249109"/>
+                <a:ext cx="45719" cy="351974"/>
+              </a:xfrm>
+              <a:prstGeom prst="rect">
+                <a:avLst/>
+              </a:prstGeom>
+              <a:solidFill>
+                <a:srgbClr val="C00000">
+                  <a:alpha val="40000"/>
+                </a:srgbClr>
+              </a:solidFill>
+              <a:ln>
+                <a:noFill/>
+              </a:ln>
+            </p:spPr>
+            <p:style>
+              <a:lnRef idx="2">
+                <a:schemeClr val="accent1">
+                  <a:shade val="50000"/>
+                </a:schemeClr>
+              </a:lnRef>
+              <a:fillRef idx="1">
+                <a:schemeClr val="accent1"/>
+              </a:fillRef>
+              <a:effectRef idx="0">
+                <a:schemeClr val="accent1"/>
+              </a:effectRef>
+              <a:fontRef idx="minor">
+                <a:schemeClr val="lt1"/>
+              </a:fontRef>
+            </p:style>
+            <p:txBody>
+              <a:bodyPr rtlCol="0" anchor="ctr"/>
+              <a:lstStyle/>
+              <a:p>
+                <a:pPr algn="ctr"/>
+                <a:endParaRPr lang="en-MY" dirty="0"/>
+              </a:p>
+            </p:txBody>
+          </p:sp>
+          <p:sp>
+            <p:nvSpPr>
+              <p:cNvPr id="482" name="Rectangle 481">
+                <a:extLst>
+                  <a:ext uri="{FF2B5EF4-FFF2-40B4-BE49-F238E27FC236}">
+                    <a16:creationId xmlns:a16="http://schemas.microsoft.com/office/drawing/2014/main" id="{B77C12FE-4E6B-4CAB-9641-A24BF9036C7D}"/>
+                  </a:ext>
+                </a:extLst>
+              </p:cNvPr>
+              <p:cNvSpPr/>
+              <p:nvPr/>
+            </p:nvSpPr>
+            <p:spPr>
+              <a:xfrm>
+                <a:off x="1565368" y="2251399"/>
+                <a:ext cx="45719" cy="351974"/>
+              </a:xfrm>
+              <a:prstGeom prst="rect">
+                <a:avLst/>
+              </a:prstGeom>
+              <a:solidFill>
+                <a:srgbClr val="FFC000">
+                  <a:alpha val="40000"/>
+                </a:srgbClr>
+              </a:solidFill>
+              <a:ln>
+                <a:noFill/>
+              </a:ln>
+            </p:spPr>
+            <p:style>
+              <a:lnRef idx="2">
+                <a:schemeClr val="accent1">
+                  <a:shade val="50000"/>
+                </a:schemeClr>
+              </a:lnRef>
+              <a:fillRef idx="1">
+                <a:schemeClr val="accent1"/>
+              </a:fillRef>
+              <a:effectRef idx="0">
+                <a:schemeClr val="accent1"/>
+              </a:effectRef>
+              <a:fontRef idx="minor">
+                <a:schemeClr val="lt1"/>
+              </a:fontRef>
+            </p:style>
+            <p:txBody>
+              <a:bodyPr rtlCol="0" anchor="ctr"/>
+              <a:lstStyle/>
+              <a:p>
+                <a:pPr algn="ctr"/>
+                <a:endParaRPr lang="en-MY"/>
+              </a:p>
+            </p:txBody>
+          </p:sp>
+          <p:sp>
+            <p:nvSpPr>
+              <p:cNvPr id="483" name="Rectangle 482">
+                <a:extLst>
+                  <a:ext uri="{FF2B5EF4-FFF2-40B4-BE49-F238E27FC236}">
+                    <a16:creationId xmlns:a16="http://schemas.microsoft.com/office/drawing/2014/main" id="{146EE773-EF86-45A5-8DAC-8EE1D2E08E7D}"/>
+                  </a:ext>
+                </a:extLst>
+              </p:cNvPr>
+              <p:cNvSpPr/>
+              <p:nvPr/>
+            </p:nvSpPr>
+            <p:spPr>
+              <a:xfrm>
+                <a:off x="1754194" y="2251501"/>
+                <a:ext cx="45719" cy="351974"/>
+              </a:xfrm>
+              <a:prstGeom prst="rect">
+                <a:avLst/>
+              </a:prstGeom>
+              <a:solidFill>
+                <a:srgbClr val="92D050">
+                  <a:alpha val="40000"/>
+                </a:srgbClr>
+              </a:solidFill>
+              <a:ln>
+                <a:noFill/>
+              </a:ln>
+            </p:spPr>
+            <p:style>
+              <a:lnRef idx="2">
+                <a:schemeClr val="accent1">
+                  <a:shade val="50000"/>
+                </a:schemeClr>
+              </a:lnRef>
+              <a:fillRef idx="1">
+                <a:schemeClr val="accent1"/>
+              </a:fillRef>
+              <a:effectRef idx="0">
+                <a:schemeClr val="accent1"/>
+              </a:effectRef>
+              <a:fontRef idx="minor">
+                <a:schemeClr val="lt1"/>
+              </a:fontRef>
+            </p:style>
+            <p:txBody>
+              <a:bodyPr rtlCol="0" anchor="ctr"/>
+              <a:lstStyle/>
+              <a:p>
+                <a:pPr algn="ctr"/>
+                <a:endParaRPr lang="en-MY"/>
+              </a:p>
+            </p:txBody>
+          </p:sp>
+        </p:grpSp>
+        <p:cxnSp>
+          <p:nvCxnSpPr>
+            <p:cNvPr id="91" name="Straight Arrow Connector 90">
+              <a:extLst>
+                <a:ext uri="{FF2B5EF4-FFF2-40B4-BE49-F238E27FC236}">
+                  <a16:creationId xmlns:a16="http://schemas.microsoft.com/office/drawing/2014/main" id="{7956D468-02D5-4FA0-928D-03F0D6BB102F}"/>
+                </a:ext>
+              </a:extLst>
+            </p:cNvPr>
+            <p:cNvCxnSpPr>
+              <a:cxnSpLocks/>
+            </p:cNvCxnSpPr>
+            <p:nvPr/>
+          </p:nvCxnSpPr>
+          <p:spPr>
+            <a:xfrm>
+              <a:off x="683112" y="896937"/>
+              <a:ext cx="0" cy="273638"/>
+            </a:xfrm>
+            <a:prstGeom prst="straightConnector1">
+              <a:avLst/>
+            </a:prstGeom>
+            <a:ln w="28575">
+              <a:solidFill>
+                <a:schemeClr val="accent2"/>
+              </a:solidFill>
+              <a:tailEnd type="triangle"/>
+            </a:ln>
+          </p:spPr>
+          <p:style>
+            <a:lnRef idx="1">
+              <a:schemeClr val="accent1"/>
+            </a:lnRef>
+            <a:fillRef idx="0">
+              <a:schemeClr val="accent1"/>
+            </a:fillRef>
+            <a:effectRef idx="0">
+              <a:schemeClr val="accent1"/>
+            </a:effectRef>
+            <a:fontRef idx="minor">
+              <a:schemeClr val="tx1"/>
+            </a:fontRef>
+          </p:style>
+        </p:cxnSp>
+        <p:cxnSp>
+          <p:nvCxnSpPr>
+            <p:cNvPr id="94" name="Straight Arrow Connector 93">
+              <a:extLst>
+                <a:ext uri="{FF2B5EF4-FFF2-40B4-BE49-F238E27FC236}">
+                  <a16:creationId xmlns:a16="http://schemas.microsoft.com/office/drawing/2014/main" id="{C9A329E5-45A1-401B-BE17-ADB03718EA2E}"/>
+                </a:ext>
+              </a:extLst>
+            </p:cNvPr>
+            <p:cNvCxnSpPr>
+              <a:cxnSpLocks/>
+            </p:cNvCxnSpPr>
+            <p:nvPr/>
+          </p:nvCxnSpPr>
+          <p:spPr>
+            <a:xfrm>
+              <a:off x="683112" y="1782261"/>
+              <a:ext cx="0" cy="273638"/>
+            </a:xfrm>
+            <a:prstGeom prst="straightConnector1">
+              <a:avLst/>
+            </a:prstGeom>
+            <a:ln w="28575">
+              <a:solidFill>
+                <a:schemeClr val="accent2"/>
+              </a:solidFill>
+              <a:tailEnd type="triangle"/>
+            </a:ln>
+          </p:spPr>
+          <p:style>
+            <a:lnRef idx="1">
+              <a:schemeClr val="accent1"/>
+            </a:lnRef>
+            <a:fillRef idx="0">
+              <a:schemeClr val="accent1"/>
+            </a:fillRef>
+            <a:effectRef idx="0">
+              <a:schemeClr val="accent1"/>
+            </a:effectRef>
+            <a:fontRef idx="minor">
+              <a:schemeClr val="tx1"/>
+            </a:fontRef>
+          </p:style>
+        </p:cxnSp>
+        <mc:AlternateContent xmlns:mc="http://schemas.openxmlformats.org/markup-compatibility/2006">
+          <mc:Choice xmlns:a14="http://schemas.microsoft.com/office/drawing/2010/main" Requires="a14">
+            <p:sp>
+              <p:nvSpPr>
+                <p:cNvPr id="95" name="Rectangle: Rounded Corners 94">
+                  <a:extLst>
+                    <a:ext uri="{FF2B5EF4-FFF2-40B4-BE49-F238E27FC236}">
+                      <a16:creationId xmlns:a16="http://schemas.microsoft.com/office/drawing/2014/main" id="{7CB7B696-DABC-499F-8BBF-B10BE41F5D46}"/>
+                    </a:ext>
+                  </a:extLst>
+                </p:cNvPr>
+                <p:cNvSpPr/>
+                <p:nvPr/>
+              </p:nvSpPr>
+              <p:spPr>
+                <a:xfrm>
+                  <a:off x="633268" y="890347"/>
+                  <a:ext cx="726329" cy="216387"/>
+                </a:xfrm>
+                <a:prstGeom prst="roundRect">
+                  <a:avLst/>
+                </a:prstGeom>
+                <a:noFill/>
+                <a:ln>
+                  <a:noFill/>
+                </a:ln>
+              </p:spPr>
+              <p:style>
+                <a:lnRef idx="2">
+                  <a:schemeClr val="accent1">
+                    <a:shade val="50000"/>
+                  </a:schemeClr>
+                </a:lnRef>
+                <a:fillRef idx="1">
+                  <a:schemeClr val="accent1"/>
+                </a:fillRef>
+                <a:effectRef idx="0">
+                  <a:schemeClr val="accent1"/>
+                </a:effectRef>
+                <a:fontRef idx="minor">
+                  <a:schemeClr val="lt1"/>
+                </a:fontRef>
+              </p:style>
+              <p:txBody>
+                <a:bodyPr rtlCol="0" anchor="ctr"/>
+                <a:lstStyle/>
+                <a:p>
+                  <a:r>
+                    <a:rPr lang="en-US" sz="600" dirty="0">
+                      <a:solidFill>
+                        <a:schemeClr val="accent2"/>
+                      </a:solidFill>
+                    </a:rPr>
+                    <a:t>Thermodynamic “</a:t>
+                  </a:r>
+                  <a14:m>
+                    <m:oMath xmlns:m="http://schemas.openxmlformats.org/officeDocument/2006/math">
+                      <m:r>
+                        <a:rPr lang="en-US" sz="600" i="1" smtClean="0">
+                          <a:solidFill>
+                            <a:schemeClr val="accent2"/>
+                          </a:solidFill>
+                          <a:latin typeface="Cambria Math" panose="02040503050406030204" pitchFamily="18" charset="0"/>
+                          <a:ea typeface="Cambria Math" panose="02040503050406030204" pitchFamily="18" charset="0"/>
+                        </a:rPr>
+                        <m:t>𝜆</m:t>
+                      </m:r>
+                    </m:oMath>
+                  </a14:m>
+                  <a:r>
+                    <a:rPr lang="en-MY" sz="600" dirty="0">
+                      <a:solidFill>
+                        <a:schemeClr val="accent2"/>
+                      </a:solidFill>
+                    </a:rPr>
+                    <a:t>” model</a:t>
+                  </a:r>
+                </a:p>
+              </p:txBody>
+            </p:sp>
+          </mc:Choice>
+          <mc:Fallback>
+            <p:sp>
+              <p:nvSpPr>
+                <p:cNvPr id="95" name="Rectangle: Rounded Corners 94">
+                  <a:extLst>
+                    <a:ext uri="{FF2B5EF4-FFF2-40B4-BE49-F238E27FC236}">
+                      <a16:creationId xmlns:a16="http://schemas.microsoft.com/office/drawing/2014/main" id="{7CB7B696-DABC-499F-8BBF-B10BE41F5D46}"/>
+                    </a:ext>
+                  </a:extLst>
+                </p:cNvPr>
+                <p:cNvSpPr>
+                  <a:spLocks noRot="1" noChangeAspect="1" noMove="1" noResize="1" noEditPoints="1" noAdjustHandles="1" noChangeArrowheads="1" noChangeShapeType="1" noTextEdit="1"/>
+                </p:cNvSpPr>
+                <p:nvPr/>
+              </p:nvSpPr>
+              <p:spPr>
+                <a:xfrm>
+                  <a:off x="633268" y="890347"/>
+                  <a:ext cx="726329" cy="216387"/>
+                </a:xfrm>
+                <a:prstGeom prst="roundRect">
+                  <a:avLst/>
+                </a:prstGeom>
+                <a:blipFill>
+                  <a:blip r:embed="rId2"/>
+                  <a:stretch>
+                    <a:fillRect t="-8333" b="-13889"/>
+                  </a:stretch>
+                </a:blipFill>
+                <a:ln>
+                  <a:noFill/>
+                </a:ln>
+              </p:spPr>
+              <p:txBody>
+                <a:bodyPr/>
+                <a:lstStyle/>
+                <a:p>
+                  <a:r>
+                    <a:rPr lang="en-US">
+                      <a:noFill/>
+                    </a:rPr>
+                    <a:t> </a:t>
+                  </a:r>
+                </a:p>
+              </p:txBody>
+            </p:sp>
+          </mc:Fallback>
+        </mc:AlternateContent>
+        <p:sp>
+          <p:nvSpPr>
+            <p:cNvPr id="96" name="Rectangle: Rounded Corners 95">
+              <a:extLst>
+                <a:ext uri="{FF2B5EF4-FFF2-40B4-BE49-F238E27FC236}">
+                  <a16:creationId xmlns:a16="http://schemas.microsoft.com/office/drawing/2014/main" id="{8431D85C-7999-41E1-B680-2D9568C88614}"/>
+                </a:ext>
+              </a:extLst>
+            </p:cNvPr>
+            <p:cNvSpPr/>
+            <p:nvPr/>
+          </p:nvSpPr>
+          <p:spPr>
+            <a:xfrm>
+              <a:off x="633268" y="1792424"/>
+              <a:ext cx="726329" cy="216387"/>
+            </a:xfrm>
+            <a:prstGeom prst="roundRect">
+              <a:avLst/>
+            </a:prstGeom>
+            <a:noFill/>
+            <a:ln>
+              <a:noFill/>
+            </a:ln>
+          </p:spPr>
+          <p:style>
+            <a:lnRef idx="2">
+              <a:schemeClr val="accent1">
+                <a:shade val="50000"/>
+              </a:schemeClr>
+            </a:lnRef>
+            <a:fillRef idx="1">
+              <a:schemeClr val="accent1"/>
+            </a:fillRef>
+            <a:effectRef idx="0">
+              <a:schemeClr val="accent1"/>
+            </a:effectRef>
+            <a:fontRef idx="minor">
+              <a:schemeClr val="lt1"/>
+            </a:fontRef>
+          </p:style>
+          <p:txBody>
+            <a:bodyPr rtlCol="0" anchor="ctr"/>
+            <a:lstStyle/>
+            <a:p>
+              <a:r>
+                <a:rPr lang="en-US" sz="600" dirty="0">
+                  <a:solidFill>
+                    <a:schemeClr val="accent2"/>
+                  </a:solidFill>
+                </a:rPr>
+                <a:t>Data-driven modeling</a:t>
+              </a:r>
+              <a:endParaRPr lang="en-MY" sz="600" dirty="0">
+                <a:solidFill>
+                  <a:schemeClr val="accent2"/>
+                </a:solidFill>
+              </a:endParaRPr>
+            </a:p>
+          </p:txBody>
+        </p:sp>
+        <p:cxnSp>
+          <p:nvCxnSpPr>
+            <p:cNvPr id="6" name="Connector: Curved 5">
+              <a:extLst>
+                <a:ext uri="{FF2B5EF4-FFF2-40B4-BE49-F238E27FC236}">
+                  <a16:creationId xmlns:a16="http://schemas.microsoft.com/office/drawing/2014/main" id="{6B011C6F-0CD1-427F-856D-03FD6037B3DB}"/>
+                </a:ext>
+              </a:extLst>
+            </p:cNvPr>
+            <p:cNvCxnSpPr>
+              <a:cxnSpLocks/>
+              <a:stCxn id="482" idx="0"/>
+              <a:endCxn id="368" idx="0"/>
+            </p:cNvCxnSpPr>
+            <p:nvPr/>
+          </p:nvCxnSpPr>
+          <p:spPr>
+            <a:xfrm rot="5400000" flipH="1" flipV="1">
+              <a:off x="1150937" y="1220095"/>
+              <a:ext cx="554358" cy="1433670"/>
+            </a:xfrm>
+            <a:prstGeom prst="curvedConnector3">
+              <a:avLst>
+                <a:gd name="adj1" fmla="val 26152"/>
+              </a:avLst>
+            </a:prstGeom>
+            <a:ln w="12700">
+              <a:solidFill>
+                <a:schemeClr val="accent2"/>
+              </a:solidFill>
+              <a:tailEnd type="triangle" w="sm" len="sm"/>
+            </a:ln>
+          </p:spPr>
+          <p:style>
+            <a:lnRef idx="1">
+              <a:schemeClr val="accent1"/>
+            </a:lnRef>
+            <a:fillRef idx="0">
+              <a:schemeClr val="accent1"/>
+            </a:fillRef>
+            <a:effectRef idx="0">
+              <a:schemeClr val="accent1"/>
+            </a:effectRef>
+            <a:fontRef idx="minor">
+              <a:schemeClr val="tx1"/>
+            </a:fontRef>
+          </p:style>
+        </p:cxnSp>
+        <p:cxnSp>
+          <p:nvCxnSpPr>
+            <p:cNvPr id="13" name="Connector: Curved 12">
+              <a:extLst>
+                <a:ext uri="{FF2B5EF4-FFF2-40B4-BE49-F238E27FC236}">
+                  <a16:creationId xmlns:a16="http://schemas.microsoft.com/office/drawing/2014/main" id="{C6485855-3D61-4CEA-A0FF-17574A9C84B4}"/>
+                </a:ext>
+              </a:extLst>
+            </p:cNvPr>
+            <p:cNvCxnSpPr>
+              <a:cxnSpLocks/>
+              <a:stCxn id="483" idx="0"/>
+            </p:cNvCxnSpPr>
+            <p:nvPr/>
+          </p:nvCxnSpPr>
+          <p:spPr>
+            <a:xfrm rot="5400000" flipH="1" flipV="1">
+              <a:off x="1042610" y="1932160"/>
+              <a:ext cx="139549" cy="424554"/>
+            </a:xfrm>
+            <a:prstGeom prst="curvedConnector2">
+              <a:avLst/>
+            </a:prstGeom>
+            <a:ln w="12700">
+              <a:solidFill>
+                <a:schemeClr val="accent2"/>
+              </a:solidFill>
+            </a:ln>
+          </p:spPr>
+          <p:style>
+            <a:lnRef idx="1">
+              <a:schemeClr val="accent1"/>
+            </a:lnRef>
+            <a:fillRef idx="0">
+              <a:schemeClr val="accent1"/>
+            </a:fillRef>
+            <a:effectRef idx="0">
+              <a:schemeClr val="accent1"/>
+            </a:effectRef>
+            <a:fontRef idx="minor">
+              <a:schemeClr val="tx1"/>
+            </a:fontRef>
+          </p:style>
+        </p:cxnSp>
+        <p:cxnSp>
+          <p:nvCxnSpPr>
+            <p:cNvPr id="115" name="Connector: Curved 114">
+              <a:extLst>
+                <a:ext uri="{FF2B5EF4-FFF2-40B4-BE49-F238E27FC236}">
+                  <a16:creationId xmlns:a16="http://schemas.microsoft.com/office/drawing/2014/main" id="{464C995C-707E-4C63-8E74-F25F39B7295F}"/>
+                </a:ext>
+              </a:extLst>
+            </p:cNvPr>
+            <p:cNvCxnSpPr>
+              <a:cxnSpLocks/>
+              <a:stCxn id="57" idx="0"/>
+            </p:cNvCxnSpPr>
+            <p:nvPr/>
+          </p:nvCxnSpPr>
+          <p:spPr>
+            <a:xfrm rot="5400000" flipH="1" flipV="1">
+              <a:off x="842382" y="1729538"/>
+              <a:ext cx="140158" cy="824405"/>
+            </a:xfrm>
+            <a:prstGeom prst="curvedConnector2">
+              <a:avLst/>
+            </a:prstGeom>
+            <a:ln w="12700">
+              <a:solidFill>
+                <a:schemeClr val="accent2"/>
+              </a:solidFill>
+            </a:ln>
+          </p:spPr>
+          <p:style>
+            <a:lnRef idx="1">
+              <a:schemeClr val="accent1"/>
+            </a:lnRef>
+            <a:fillRef idx="0">
+              <a:schemeClr val="accent1"/>
+            </a:fillRef>
+            <a:effectRef idx="0">
+              <a:schemeClr val="accent1"/>
+            </a:effectRef>
+            <a:fontRef idx="minor">
+              <a:schemeClr val="tx1"/>
+            </a:fontRef>
+          </p:style>
+        </p:cxnSp>
+        <p:sp>
+          <p:nvSpPr>
+            <p:cNvPr id="119" name="Rectangle: Rounded Corners 118">
+              <a:extLst>
+                <a:ext uri="{FF2B5EF4-FFF2-40B4-BE49-F238E27FC236}">
+                  <a16:creationId xmlns:a16="http://schemas.microsoft.com/office/drawing/2014/main" id="{CBD9BC47-DD22-4B58-9F6D-9C53E156AFDD}"/>
+                </a:ext>
+              </a:extLst>
+            </p:cNvPr>
+            <p:cNvSpPr/>
+            <p:nvPr/>
+          </p:nvSpPr>
+          <p:spPr>
+            <a:xfrm rot="20404134">
+              <a:off x="1356914" y="1810134"/>
+              <a:ext cx="726329" cy="216387"/>
+            </a:xfrm>
+            <a:prstGeom prst="roundRect">
+              <a:avLst/>
+            </a:prstGeom>
+            <a:noFill/>
+            <a:ln>
+              <a:noFill/>
+            </a:ln>
+          </p:spPr>
+          <p:style>
+            <a:lnRef idx="2">
+              <a:schemeClr val="accent1">
+                <a:shade val="50000"/>
+              </a:schemeClr>
+            </a:lnRef>
+            <a:fillRef idx="1">
+              <a:schemeClr val="accent1"/>
+            </a:fillRef>
+            <a:effectRef idx="0">
+              <a:schemeClr val="accent1"/>
+            </a:effectRef>
+            <a:fontRef idx="minor">
+              <a:schemeClr val="lt1"/>
+            </a:fontRef>
+          </p:style>
+          <p:txBody>
+            <a:bodyPr rtlCol="0" anchor="ctr"/>
+            <a:lstStyle/>
+            <a:p>
+              <a:pPr algn="ctr"/>
+              <a:r>
+                <a:rPr lang="en-US" sz="600" dirty="0">
+                  <a:solidFill>
+                    <a:schemeClr val="accent2"/>
+                  </a:solidFill>
+                </a:rPr>
+                <a:t>OM molecular signatures</a:t>
+              </a:r>
+              <a:endParaRPr lang="en-MY" sz="600" dirty="0">
+                <a:solidFill>
+                  <a:schemeClr val="accent2"/>
+                </a:solidFill>
+              </a:endParaRPr>
+            </a:p>
+          </p:txBody>
+        </p:sp>
+      </p:grpSp>
+    </p:spTree>
+    <p:extLst>
+      <p:ext uri="{BB962C8B-B14F-4D97-AF65-F5344CB8AC3E}">
+        <p14:creationId xmlns:p14="http://schemas.microsoft.com/office/powerpoint/2010/main" val="1731914088"/>
+      </p:ext>
+    </p:extLst>
+  </p:cSld>
+  <p:clrMapOvr>
+    <a:masterClrMapping/>
+  </p:clrMapOvr>
+</p:sld>
+</file>
+
+<file path=ppt/slides/slide2.xml><?xml version="1.0" encoding="utf-8"?>
+<p:sld xmlns:a="http://schemas.openxmlformats.org/drawingml/2006/main" xmlns:r="http://schemas.openxmlformats.org/officeDocument/2006/relationships" xmlns:p="http://schemas.openxmlformats.org/presentationml/2006/main">
+  <p:cSld>
+    <p:spTree>
+      <p:nvGrpSpPr>
+        <p:cNvPr id="1" name=""/>
+        <p:cNvGrpSpPr/>
+        <p:nvPr/>
+      </p:nvGrpSpPr>
+      <p:grpSpPr>
+        <a:xfrm>
+          <a:off x="0" y="0"/>
+          <a:ext cx="0" cy="0"/>
+          <a:chOff x="0" y="0"/>
+          <a:chExt cx="0" cy="0"/>
+        </a:xfrm>
+      </p:grpSpPr>
+      <p:pic>
+        <p:nvPicPr>
+          <p:cNvPr id="3" name="Picture 2">
+            <a:extLst>
+              <a:ext uri="{FF2B5EF4-FFF2-40B4-BE49-F238E27FC236}">
+                <a16:creationId xmlns:a16="http://schemas.microsoft.com/office/drawing/2014/main" id="{F403DEA9-E5E5-4BBD-A7C8-85146474615E}"/>
+              </a:ext>
+            </a:extLst>
+          </p:cNvPr>
+          <p:cNvPicPr>
+            <a:picLocks noChangeAspect="1"/>
+          </p:cNvPicPr>
+          <p:nvPr/>
+        </p:nvPicPr>
+        <p:blipFill>
+          <a:blip r:embed="rId2">
+            <a:extLst>
+              <a:ext uri="{28A0092B-C50C-407E-A947-70E740481C1C}">
+                <a14:useLocalDpi xmlns:a14="http://schemas.microsoft.com/office/drawing/2010/main" val="0"/>
+              </a:ext>
+            </a:extLst>
+          </a:blip>
+          <a:stretch>
+            <a:fillRect/>
+          </a:stretch>
+        </p:blipFill>
+        <p:spPr>
+          <a:xfrm>
+            <a:off x="0" y="0"/>
+            <a:ext cx="3060700" cy="3060700"/>
+          </a:xfrm>
+          <a:prstGeom prst="rect">
+            <a:avLst/>
+          </a:prstGeom>
+        </p:spPr>
+      </p:pic>
+    </p:spTree>
+    <p:extLst>
+      <p:ext uri="{BB962C8B-B14F-4D97-AF65-F5344CB8AC3E}">
+        <p14:creationId xmlns:p14="http://schemas.microsoft.com/office/powerpoint/2010/main" val="2408328518"/>
+      </p:ext>
+    </p:extLst>
+  </p:cSld>
+  <p:clrMapOvr>
+    <a:masterClrMapping/>
+  </p:clrMapOvr>
+</p:sld>
+</file>
+
+<file path=ppt/slides/slide3.xml><?xml version="1.0" encoding="utf-8"?>
 <p:sld xmlns:a="http://schemas.openxmlformats.org/drawingml/2006/main" xmlns:r="http://schemas.openxmlformats.org/officeDocument/2006/relationships" xmlns:p="http://schemas.openxmlformats.org/presentationml/2006/main">
   <p:cSld>
     <p:spTree>
@@ -18595,7 +23140,7 @@
 </p:sld>
 </file>
 
-<file path=ppt/slides/slide2.xml><?xml version="1.0" encoding="utf-8"?>
+<file path=ppt/slides/slide4.xml><?xml version="1.0" encoding="utf-8"?>
 <p:sld xmlns:a="http://schemas.openxmlformats.org/drawingml/2006/main" xmlns:r="http://schemas.openxmlformats.org/officeDocument/2006/relationships" xmlns:p="http://schemas.openxmlformats.org/presentationml/2006/main">
   <p:cSld>
     <p:spTree>
@@ -18661,7 +23206,7 @@
 </p:sld>
 </file>
 
-<file path=ppt/slides/slide3.xml><?xml version="1.0" encoding="utf-8"?>
+<file path=ppt/slides/slide5.xml><?xml version="1.0" encoding="utf-8"?>
 <p:sld xmlns:a="http://schemas.openxmlformats.org/drawingml/2006/main" xmlns:r="http://schemas.openxmlformats.org/officeDocument/2006/relationships" xmlns:p="http://schemas.openxmlformats.org/presentationml/2006/main">
   <p:cSld>
     <p:spTree>
@@ -23608,7 +28153,7 @@
 </p:sld>
 </file>
 
-<file path=ppt/slides/slide4.xml><?xml version="1.0" encoding="utf-8"?>
+<file path=ppt/slides/slide6.xml><?xml version="1.0" encoding="utf-8"?>
 <p:sld xmlns:a="http://schemas.openxmlformats.org/drawingml/2006/main" xmlns:r="http://schemas.openxmlformats.org/officeDocument/2006/relationships" xmlns:p="http://schemas.openxmlformats.org/presentationml/2006/main">
   <p:cSld>
     <p:spTree>

</xml_diff>